<commit_message>
presentation - adds agenda
</commit_message>
<xml_diff>
--- a/presentation.pptx
+++ b/presentation.pptx
@@ -6,7 +6,14 @@
   </p:sldMasterIdLst>
   <p:sldIdLst>
     <p:sldId id="256" r:id="rId2"/>
-    <p:sldId id="257" r:id="rId3"/>
+    <p:sldId id="259" r:id="rId3"/>
+    <p:sldId id="258" r:id="rId4"/>
+    <p:sldId id="263" r:id="rId5"/>
+    <p:sldId id="260" r:id="rId6"/>
+    <p:sldId id="261" r:id="rId7"/>
+    <p:sldId id="262" r:id="rId8"/>
+    <p:sldId id="264" r:id="rId9"/>
+    <p:sldId id="265" r:id="rId10"/>
   </p:sldIdLst>
   <p:sldSz cx="12192000" cy="6858000"/>
   <p:notesSz cx="6858000" cy="9144000"/>
@@ -105,6 +112,11 @@
       </a:defRPr>
     </a:lvl9pPr>
   </p:defaultTextStyle>
+  <p:extLst>
+    <p:ext uri="{EFAFB233-063F-42B5-8137-9DF3F51BA10A}">
+      <p15:sldGuideLst xmlns:p15="http://schemas.microsoft.com/office/powerpoint/2012/main"/>
+    </p:ext>
+  </p:extLst>
 </p:presentation>
 </file>
 
@@ -255,7 +267,7 @@
           <a:p>
             <a:fld id="{9A9EE0DF-98F0-4CDA-8CE0-31BE5E6FE5D7}" type="datetimeFigureOut">
               <a:rPr lang="en-US" smtClean="0"/>
-              <a:t>11/27/2019</a:t>
+              <a:t>11/30/2019</a:t>
             </a:fld>
             <a:endParaRPr lang="en-US"/>
           </a:p>
@@ -453,7 +465,7 @@
           <a:p>
             <a:fld id="{9A9EE0DF-98F0-4CDA-8CE0-31BE5E6FE5D7}" type="datetimeFigureOut">
               <a:rPr lang="en-US" smtClean="0"/>
-              <a:t>11/27/2019</a:t>
+              <a:t>11/30/2019</a:t>
             </a:fld>
             <a:endParaRPr lang="en-US"/>
           </a:p>
@@ -661,7 +673,7 @@
           <a:p>
             <a:fld id="{9A9EE0DF-98F0-4CDA-8CE0-31BE5E6FE5D7}" type="datetimeFigureOut">
               <a:rPr lang="en-US" smtClean="0"/>
-              <a:t>11/27/2019</a:t>
+              <a:t>11/30/2019</a:t>
             </a:fld>
             <a:endParaRPr lang="en-US"/>
           </a:p>
@@ -859,7 +871,7 @@
           <a:p>
             <a:fld id="{9A9EE0DF-98F0-4CDA-8CE0-31BE5E6FE5D7}" type="datetimeFigureOut">
               <a:rPr lang="en-US" smtClean="0"/>
-              <a:t>11/27/2019</a:t>
+              <a:t>11/30/2019</a:t>
             </a:fld>
             <a:endParaRPr lang="en-US"/>
           </a:p>
@@ -1134,7 +1146,7 @@
           <a:p>
             <a:fld id="{9A9EE0DF-98F0-4CDA-8CE0-31BE5E6FE5D7}" type="datetimeFigureOut">
               <a:rPr lang="en-US" smtClean="0"/>
-              <a:t>11/27/2019</a:t>
+              <a:t>11/30/2019</a:t>
             </a:fld>
             <a:endParaRPr lang="en-US"/>
           </a:p>
@@ -1399,7 +1411,7 @@
           <a:p>
             <a:fld id="{9A9EE0DF-98F0-4CDA-8CE0-31BE5E6FE5D7}" type="datetimeFigureOut">
               <a:rPr lang="en-US" smtClean="0"/>
-              <a:t>11/27/2019</a:t>
+              <a:t>11/30/2019</a:t>
             </a:fld>
             <a:endParaRPr lang="en-US"/>
           </a:p>
@@ -1811,7 +1823,7 @@
           <a:p>
             <a:fld id="{9A9EE0DF-98F0-4CDA-8CE0-31BE5E6FE5D7}" type="datetimeFigureOut">
               <a:rPr lang="en-US" smtClean="0"/>
-              <a:t>11/27/2019</a:t>
+              <a:t>11/30/2019</a:t>
             </a:fld>
             <a:endParaRPr lang="en-US"/>
           </a:p>
@@ -1952,7 +1964,7 @@
           <a:p>
             <a:fld id="{9A9EE0DF-98F0-4CDA-8CE0-31BE5E6FE5D7}" type="datetimeFigureOut">
               <a:rPr lang="en-US" smtClean="0"/>
-              <a:t>11/27/2019</a:t>
+              <a:t>11/30/2019</a:t>
             </a:fld>
             <a:endParaRPr lang="en-US"/>
           </a:p>
@@ -2065,7 +2077,7 @@
           <a:p>
             <a:fld id="{9A9EE0DF-98F0-4CDA-8CE0-31BE5E6FE5D7}" type="datetimeFigureOut">
               <a:rPr lang="en-US" smtClean="0"/>
-              <a:t>11/27/2019</a:t>
+              <a:t>11/30/2019</a:t>
             </a:fld>
             <a:endParaRPr lang="en-US"/>
           </a:p>
@@ -2376,7 +2388,7 @@
           <a:p>
             <a:fld id="{9A9EE0DF-98F0-4CDA-8CE0-31BE5E6FE5D7}" type="datetimeFigureOut">
               <a:rPr lang="en-US" smtClean="0"/>
-              <a:t>11/27/2019</a:t>
+              <a:t>11/30/2019</a:t>
             </a:fld>
             <a:endParaRPr lang="en-US"/>
           </a:p>
@@ -2664,7 +2676,7 @@
           <a:p>
             <a:fld id="{9A9EE0DF-98F0-4CDA-8CE0-31BE5E6FE5D7}" type="datetimeFigureOut">
               <a:rPr lang="en-US" smtClean="0"/>
-              <a:t>11/27/2019</a:t>
+              <a:t>11/30/2019</a:t>
             </a:fld>
             <a:endParaRPr lang="en-US"/>
           </a:p>
@@ -2905,7 +2917,7 @@
           <a:p>
             <a:fld id="{9A9EE0DF-98F0-4CDA-8CE0-31BE5E6FE5D7}" type="datetimeFigureOut">
               <a:rPr lang="en-US" smtClean="0"/>
-              <a:t>11/27/2019</a:t>
+              <a:t>11/30/2019</a:t>
             </a:fld>
             <a:endParaRPr lang="en-US"/>
           </a:p>
@@ -3338,40 +3350,288 @@
             <p:ph type="ctrTitle"/>
           </p:nvPr>
         </p:nvSpPr>
-        <p:spPr/>
-        <p:txBody>
-          <a:bodyPr/>
-          <a:lstStyle/>
-          <a:p>
-            <a:endParaRPr lang="en-US"/>
-          </a:p>
-        </p:txBody>
-      </p:sp>
-      <p:sp>
-        <p:nvSpPr>
-          <p:cNvPr id="3" name="Subtitle 2">
-            <a:extLst>
-              <a:ext uri="{FF2B5EF4-FFF2-40B4-BE49-F238E27FC236}">
-                <a16:creationId xmlns:a16="http://schemas.microsoft.com/office/drawing/2014/main" id="{E0357D71-E7DC-4DC1-9775-F636C9ACBD70}"/>
-              </a:ext>
-            </a:extLst>
-          </p:cNvPr>
-          <p:cNvSpPr>
-            <a:spLocks noGrp="1"/>
-          </p:cNvSpPr>
-          <p:nvPr>
-            <p:ph type="subTitle" idx="1"/>
-          </p:nvPr>
-        </p:nvSpPr>
-        <p:spPr/>
-        <p:txBody>
-          <a:bodyPr/>
-          <a:lstStyle/>
-          <a:p>
-            <a:endParaRPr lang="en-US"/>
-          </a:p>
-        </p:txBody>
-      </p:sp>
+        <p:spPr>
+          <a:xfrm>
+            <a:off x="0" y="2596293"/>
+            <a:ext cx="12192000" cy="5008155"/>
+          </a:xfrm>
+        </p:spPr>
+        <p:txBody>
+          <a:bodyPr anchor="ctr">
+            <a:normAutofit fontScale="90000"/>
+          </a:bodyPr>
+          <a:lstStyle/>
+          <a:p>
+            <a:pPr>
+              <a:lnSpc>
+                <a:spcPct val="100000"/>
+              </a:lnSpc>
+            </a:pPr>
+            <a:r>
+              <a:rPr lang="en-US" sz="3100" dirty="0">
+                <a:solidFill>
+                  <a:schemeClr val="accent1">
+                    <a:lumMod val="50000"/>
+                  </a:schemeClr>
+                </a:solidFill>
+                <a:latin typeface="Georgia Pro Cond" panose="02040506050405020303" pitchFamily="18" charset="0"/>
+              </a:rPr>
+              <a:t>CDS501 Principles and Practices of Data Science and Analytics</a:t>
+            </a:r>
+            <a:br>
+              <a:rPr lang="en-US" sz="3200" dirty="0">
+                <a:solidFill>
+                  <a:schemeClr val="accent1">
+                    <a:lumMod val="50000"/>
+                  </a:schemeClr>
+                </a:solidFill>
+                <a:latin typeface="Georgia Pro Cond" panose="02040506050405020303" pitchFamily="18" charset="0"/>
+              </a:rPr>
+            </a:br>
+            <a:r>
+              <a:rPr lang="en-US" sz="2400" dirty="0">
+                <a:solidFill>
+                  <a:schemeClr val="accent1">
+                    <a:lumMod val="50000"/>
+                  </a:schemeClr>
+                </a:solidFill>
+                <a:latin typeface="Georgia Pro Cond" panose="02040506050405020303" pitchFamily="18" charset="0"/>
+              </a:rPr>
+              <a:t>Semester 1, 2019/2020</a:t>
+            </a:r>
+            <a:br>
+              <a:rPr lang="en-US" sz="2400" dirty="0">
+                <a:solidFill>
+                  <a:schemeClr val="accent1">
+                    <a:lumMod val="50000"/>
+                  </a:schemeClr>
+                </a:solidFill>
+                <a:latin typeface="Georgia Pro Cond" panose="02040506050405020303" pitchFamily="18" charset="0"/>
+              </a:rPr>
+            </a:br>
+            <a:br>
+              <a:rPr lang="en-US" sz="2400" dirty="0">
+                <a:solidFill>
+                  <a:schemeClr val="accent1">
+                    <a:lumMod val="50000"/>
+                  </a:schemeClr>
+                </a:solidFill>
+                <a:latin typeface="Georgia Pro Cond" panose="02040506050405020303" pitchFamily="18" charset="0"/>
+              </a:rPr>
+            </a:br>
+            <a:r>
+              <a:rPr lang="en-US" sz="3600" dirty="0">
+                <a:solidFill>
+                  <a:schemeClr val="accent1">
+                    <a:lumMod val="50000"/>
+                  </a:schemeClr>
+                </a:solidFill>
+                <a:latin typeface="Georgia Pro Cond" panose="02040506050405020303" pitchFamily="18" charset="0"/>
+              </a:rPr>
+              <a:t>Predicting Cardiovascular Disease With Better Accuracy</a:t>
+            </a:r>
+            <a:br>
+              <a:rPr lang="en-US" sz="2400" dirty="0">
+                <a:solidFill>
+                  <a:schemeClr val="accent1">
+                    <a:lumMod val="50000"/>
+                  </a:schemeClr>
+                </a:solidFill>
+                <a:latin typeface="Georgia Pro Cond" panose="02040506050405020303" pitchFamily="18" charset="0"/>
+              </a:rPr>
+            </a:br>
+            <a:br>
+              <a:rPr lang="en-US" sz="2400" dirty="0">
+                <a:solidFill>
+                  <a:schemeClr val="accent1">
+                    <a:lumMod val="50000"/>
+                  </a:schemeClr>
+                </a:solidFill>
+                <a:latin typeface="Georgia Pro Cond" panose="02040506050405020303" pitchFamily="18" charset="0"/>
+              </a:rPr>
+            </a:br>
+            <a:r>
+              <a:rPr lang="en-US" sz="2400" i="1" dirty="0">
+                <a:solidFill>
+                  <a:schemeClr val="accent1">
+                    <a:lumMod val="50000"/>
+                  </a:schemeClr>
+                </a:solidFill>
+                <a:latin typeface="Georgia Pro Cond" panose="02040506050405020303" pitchFamily="18" charset="0"/>
+              </a:rPr>
+              <a:t>By</a:t>
+            </a:r>
+            <a:br>
+              <a:rPr lang="en-US" sz="2400" dirty="0">
+                <a:solidFill>
+                  <a:schemeClr val="accent1">
+                    <a:lumMod val="50000"/>
+                  </a:schemeClr>
+                </a:solidFill>
+                <a:latin typeface="Georgia Pro Cond" panose="02040506050405020303" pitchFamily="18" charset="0"/>
+              </a:rPr>
+            </a:br>
+            <a:r>
+              <a:rPr lang="en-US" sz="2700" dirty="0">
+                <a:solidFill>
+                  <a:schemeClr val="accent1">
+                    <a:lumMod val="50000"/>
+                  </a:schemeClr>
+                </a:solidFill>
+                <a:latin typeface="Georgia Pro Cond Light" panose="02040306050405020303" pitchFamily="18" charset="0"/>
+              </a:rPr>
+              <a:t>Lee Kar Choon (P-COM0130/19)</a:t>
+            </a:r>
+            <a:br>
+              <a:rPr lang="en-US" sz="2700" dirty="0">
+                <a:solidFill>
+                  <a:schemeClr val="accent1">
+                    <a:lumMod val="50000"/>
+                  </a:schemeClr>
+                </a:solidFill>
+                <a:latin typeface="Georgia Pro Cond Light" panose="02040306050405020303" pitchFamily="18" charset="0"/>
+              </a:rPr>
+            </a:br>
+            <a:r>
+              <a:rPr lang="en-US" sz="2700" dirty="0">
+                <a:solidFill>
+                  <a:schemeClr val="accent1">
+                    <a:lumMod val="50000"/>
+                  </a:schemeClr>
+                </a:solidFill>
+                <a:latin typeface="Georgia Pro Cond Light" panose="02040306050405020303" pitchFamily="18" charset="0"/>
+              </a:rPr>
+              <a:t>Lee Jing Wen (P-COM0087/19)</a:t>
+            </a:r>
+            <a:br>
+              <a:rPr lang="en-US" sz="2700" dirty="0">
+                <a:solidFill>
+                  <a:schemeClr val="accent1">
+                    <a:lumMod val="50000"/>
+                  </a:schemeClr>
+                </a:solidFill>
+                <a:latin typeface="Georgia Pro Cond Light" panose="02040306050405020303" pitchFamily="18" charset="0"/>
+              </a:rPr>
+            </a:br>
+            <a:r>
+              <a:rPr lang="en-US" sz="2700" dirty="0">
+                <a:solidFill>
+                  <a:schemeClr val="accent1">
+                    <a:lumMod val="50000"/>
+                  </a:schemeClr>
+                </a:solidFill>
+                <a:latin typeface="Georgia Pro Cond Light" panose="02040306050405020303" pitchFamily="18" charset="0"/>
+              </a:rPr>
+              <a:t>Sammak Musabbir Hasan (P-COM0092/19)</a:t>
+            </a:r>
+            <a:br>
+              <a:rPr lang="en-US" sz="2700" dirty="0">
+                <a:solidFill>
+                  <a:schemeClr val="accent1">
+                    <a:lumMod val="50000"/>
+                  </a:schemeClr>
+                </a:solidFill>
+                <a:latin typeface="Georgia Pro Cond Light" panose="02040306050405020303" pitchFamily="18" charset="0"/>
+              </a:rPr>
+            </a:br>
+            <a:r>
+              <a:rPr lang="en-US" sz="2700" dirty="0">
+                <a:solidFill>
+                  <a:schemeClr val="accent1">
+                    <a:lumMod val="50000"/>
+                  </a:schemeClr>
+                </a:solidFill>
+                <a:latin typeface="Georgia Pro Cond Light" panose="02040306050405020303" pitchFamily="18" charset="0"/>
+              </a:rPr>
+              <a:t>Wang Huaixu (P-COM0103/19)</a:t>
+            </a:r>
+            <a:br>
+              <a:rPr lang="en-US" sz="2700" dirty="0">
+                <a:solidFill>
+                  <a:schemeClr val="accent1">
+                    <a:lumMod val="50000"/>
+                  </a:schemeClr>
+                </a:solidFill>
+                <a:latin typeface="Georgia Pro Cond Light" panose="02040306050405020303" pitchFamily="18" charset="0"/>
+              </a:rPr>
+            </a:br>
+            <a:br>
+              <a:rPr lang="en-US" sz="2400" dirty="0">
+                <a:solidFill>
+                  <a:schemeClr val="accent1">
+                    <a:lumMod val="50000"/>
+                  </a:schemeClr>
+                </a:solidFill>
+                <a:latin typeface="Georgia Pro Cond" panose="02040506050405020303" pitchFamily="18" charset="0"/>
+              </a:rPr>
+            </a:br>
+            <a:br>
+              <a:rPr lang="en-US" sz="2400" dirty="0">
+                <a:solidFill>
+                  <a:schemeClr val="accent1">
+                    <a:lumMod val="50000"/>
+                  </a:schemeClr>
+                </a:solidFill>
+                <a:latin typeface="Georgia Pro Cond" panose="02040506050405020303" pitchFamily="18" charset="0"/>
+              </a:rPr>
+            </a:br>
+            <a:br>
+              <a:rPr lang="en-US" sz="2400" dirty="0">
+                <a:solidFill>
+                  <a:schemeClr val="accent1">
+                    <a:lumMod val="50000"/>
+                  </a:schemeClr>
+                </a:solidFill>
+                <a:latin typeface="Georgia Pro Cond" panose="02040506050405020303" pitchFamily="18" charset="0"/>
+              </a:rPr>
+            </a:br>
+            <a:endParaRPr lang="en-US" sz="2400" dirty="0">
+              <a:solidFill>
+                <a:schemeClr val="accent1">
+                  <a:lumMod val="50000"/>
+                </a:schemeClr>
+              </a:solidFill>
+              <a:latin typeface="Georgia Pro Cond" panose="02040506050405020303" pitchFamily="18" charset="0"/>
+            </a:endParaRPr>
+          </a:p>
+        </p:txBody>
+      </p:sp>
+      <p:pic>
+        <p:nvPicPr>
+          <p:cNvPr id="5" name="Picture 4" descr="A close up of a sign&#10;&#10;Description automatically generated">
+            <a:extLst>
+              <a:ext uri="{FF2B5EF4-FFF2-40B4-BE49-F238E27FC236}">
+                <a16:creationId xmlns:a16="http://schemas.microsoft.com/office/drawing/2014/main" id="{7DCCAB3F-B4D9-4A7D-8DF2-AF51CD728133}"/>
+              </a:ext>
+            </a:extLst>
+          </p:cNvPr>
+          <p:cNvPicPr>
+            <a:picLocks noChangeAspect="1"/>
+          </p:cNvPicPr>
+          <p:nvPr/>
+        </p:nvPicPr>
+        <p:blipFill>
+          <a:blip r:embed="rId2">
+            <a:extLst>
+              <a:ext uri="{28A0092B-C50C-407E-A947-70E740481C1C}">
+                <a14:useLocalDpi xmlns:a14="http://schemas.microsoft.com/office/drawing/2010/main" val="0"/>
+              </a:ext>
+            </a:extLst>
+          </a:blip>
+          <a:stretch>
+            <a:fillRect/>
+          </a:stretch>
+        </p:blipFill>
+        <p:spPr>
+          <a:xfrm>
+            <a:off x="4415550" y="177283"/>
+            <a:ext cx="3360900" cy="2364354"/>
+          </a:xfrm>
+          <a:prstGeom prst="rect">
+            <a:avLst/>
+          </a:prstGeom>
+        </p:spPr>
+      </p:pic>
     </p:spTree>
     <p:extLst>
       <p:ext uri="{BB962C8B-B14F-4D97-AF65-F5344CB8AC3E}">
@@ -3404,18 +3664,18 @@
       </p:grpSpPr>
       <p:sp>
         <p:nvSpPr>
-          <p:cNvPr id="3" name="Content Placeholder 2">
-            <a:extLst>
-              <a:ext uri="{FF2B5EF4-FFF2-40B4-BE49-F238E27FC236}">
-                <a16:creationId xmlns:a16="http://schemas.microsoft.com/office/drawing/2014/main" id="{EA5BF3E3-EF18-4E62-B94D-3C9642776B6C}"/>
-              </a:ext>
-            </a:extLst>
-          </p:cNvPr>
-          <p:cNvSpPr>
-            <a:spLocks noGrp="1"/>
-          </p:cNvSpPr>
-          <p:nvPr>
-            <p:ph idx="1"/>
+          <p:cNvPr id="2" name="Title 1">
+            <a:extLst>
+              <a:ext uri="{FF2B5EF4-FFF2-40B4-BE49-F238E27FC236}">
+                <a16:creationId xmlns:a16="http://schemas.microsoft.com/office/drawing/2014/main" id="{BB0D0921-96AE-4FEC-B1D7-21D5580C3F23}"/>
+              </a:ext>
+            </a:extLst>
+          </p:cNvPr>
+          <p:cNvSpPr>
+            <a:spLocks noGrp="1"/>
+          </p:cNvSpPr>
+          <p:nvPr>
+            <p:ph type="title"/>
           </p:nvPr>
         </p:nvSpPr>
         <p:spPr/>
@@ -3425,12 +3685,16 @@
           </a:bodyPr>
           <a:lstStyle/>
           <a:p>
-            <a:pPr marL="0" indent="0" algn="ctr">
-              <a:buNone/>
-            </a:pPr>
-            <a:r>
-              <a:rPr lang="en-MY" sz="4400" dirty="0"/>
-              <a:t>A presentation to your peers generally has the following structure: introduce the problem, discuss related work, discuss your approach, give results and findings, discuss future work.</a:t>
+            <a:r>
+              <a:rPr lang="en-US" sz="3200" dirty="0">
+                <a:solidFill>
+                  <a:schemeClr val="accent1">
+                    <a:lumMod val="50000"/>
+                  </a:schemeClr>
+                </a:solidFill>
+                <a:latin typeface="Georgia Pro Cond" panose="02040506050405020303" pitchFamily="18" charset="0"/>
+              </a:rPr>
+              <a:t>INTRODUCTION</a:t>
             </a:r>
           </a:p>
         </p:txBody>
@@ -3438,7 +3702,512 @@
     </p:spTree>
     <p:extLst>
       <p:ext uri="{BB962C8B-B14F-4D97-AF65-F5344CB8AC3E}">
-        <p14:creationId xmlns:p14="http://schemas.microsoft.com/office/powerpoint/2010/main" val="1262938076"/>
+        <p14:creationId xmlns:p14="http://schemas.microsoft.com/office/powerpoint/2010/main" val="2261210053"/>
+      </p:ext>
+    </p:extLst>
+  </p:cSld>
+  <p:clrMapOvr>
+    <a:masterClrMapping/>
+  </p:clrMapOvr>
+</p:sld>
+</file>
+
+<file path=ppt/slides/slide3.xml><?xml version="1.0" encoding="utf-8"?>
+<p:sld xmlns:a="http://schemas.openxmlformats.org/drawingml/2006/main" xmlns:r="http://schemas.openxmlformats.org/officeDocument/2006/relationships" xmlns:p="http://schemas.openxmlformats.org/presentationml/2006/main">
+  <p:cSld>
+    <p:spTree>
+      <p:nvGrpSpPr>
+        <p:cNvPr id="1" name=""/>
+        <p:cNvGrpSpPr/>
+        <p:nvPr/>
+      </p:nvGrpSpPr>
+      <p:grpSpPr>
+        <a:xfrm>
+          <a:off x="0" y="0"/>
+          <a:ext cx="0" cy="0"/>
+          <a:chOff x="0" y="0"/>
+          <a:chExt cx="0" cy="0"/>
+        </a:xfrm>
+      </p:grpSpPr>
+      <p:sp>
+        <p:nvSpPr>
+          <p:cNvPr id="2" name="Title 1">
+            <a:extLst>
+              <a:ext uri="{FF2B5EF4-FFF2-40B4-BE49-F238E27FC236}">
+                <a16:creationId xmlns:a16="http://schemas.microsoft.com/office/drawing/2014/main" id="{2A6D8031-6CAD-4206-8B5E-1B17FFFC8DFE}"/>
+              </a:ext>
+            </a:extLst>
+          </p:cNvPr>
+          <p:cNvSpPr>
+            <a:spLocks noGrp="1"/>
+          </p:cNvSpPr>
+          <p:nvPr>
+            <p:ph type="title"/>
+          </p:nvPr>
+        </p:nvSpPr>
+        <p:spPr/>
+        <p:txBody>
+          <a:bodyPr>
+            <a:normAutofit/>
+          </a:bodyPr>
+          <a:lstStyle/>
+          <a:p>
+            <a:r>
+              <a:rPr lang="en-US" sz="3200" dirty="0">
+                <a:solidFill>
+                  <a:schemeClr val="accent1">
+                    <a:lumMod val="50000"/>
+                  </a:schemeClr>
+                </a:solidFill>
+                <a:latin typeface="Georgia Pro Cond" panose="02040506050405020303" pitchFamily="18" charset="0"/>
+              </a:rPr>
+              <a:t>GOAL</a:t>
+            </a:r>
+          </a:p>
+        </p:txBody>
+      </p:sp>
+    </p:spTree>
+    <p:extLst>
+      <p:ext uri="{BB962C8B-B14F-4D97-AF65-F5344CB8AC3E}">
+        <p14:creationId xmlns:p14="http://schemas.microsoft.com/office/powerpoint/2010/main" val="3247969666"/>
+      </p:ext>
+    </p:extLst>
+  </p:cSld>
+  <p:clrMapOvr>
+    <a:masterClrMapping/>
+  </p:clrMapOvr>
+</p:sld>
+</file>
+
+<file path=ppt/slides/slide4.xml><?xml version="1.0" encoding="utf-8"?>
+<p:sld xmlns:a="http://schemas.openxmlformats.org/drawingml/2006/main" xmlns:r="http://schemas.openxmlformats.org/officeDocument/2006/relationships" xmlns:p="http://schemas.openxmlformats.org/presentationml/2006/main">
+  <p:cSld>
+    <p:spTree>
+      <p:nvGrpSpPr>
+        <p:cNvPr id="1" name=""/>
+        <p:cNvGrpSpPr/>
+        <p:nvPr/>
+      </p:nvGrpSpPr>
+      <p:grpSpPr>
+        <a:xfrm>
+          <a:off x="0" y="0"/>
+          <a:ext cx="0" cy="0"/>
+          <a:chOff x="0" y="0"/>
+          <a:chExt cx="0" cy="0"/>
+        </a:xfrm>
+      </p:grpSpPr>
+      <p:sp>
+        <p:nvSpPr>
+          <p:cNvPr id="2" name="Title 1">
+            <a:extLst>
+              <a:ext uri="{FF2B5EF4-FFF2-40B4-BE49-F238E27FC236}">
+                <a16:creationId xmlns:a16="http://schemas.microsoft.com/office/drawing/2014/main" id="{EA2F0C2D-74EE-4821-9AC1-70B57F0C8241}"/>
+              </a:ext>
+            </a:extLst>
+          </p:cNvPr>
+          <p:cNvSpPr>
+            <a:spLocks noGrp="1"/>
+          </p:cNvSpPr>
+          <p:nvPr>
+            <p:ph type="title"/>
+          </p:nvPr>
+        </p:nvSpPr>
+        <p:spPr/>
+        <p:txBody>
+          <a:bodyPr>
+            <a:normAutofit/>
+          </a:bodyPr>
+          <a:lstStyle/>
+          <a:p>
+            <a:r>
+              <a:rPr lang="en-US" sz="3200" dirty="0">
+                <a:solidFill>
+                  <a:schemeClr val="accent1">
+                    <a:lumMod val="50000"/>
+                  </a:schemeClr>
+                </a:solidFill>
+                <a:latin typeface="Georgia Pro Cond" panose="02040506050405020303" pitchFamily="18" charset="0"/>
+              </a:rPr>
+              <a:t>RELATED WORK</a:t>
+            </a:r>
+          </a:p>
+        </p:txBody>
+      </p:sp>
+    </p:spTree>
+    <p:extLst>
+      <p:ext uri="{BB962C8B-B14F-4D97-AF65-F5344CB8AC3E}">
+        <p14:creationId xmlns:p14="http://schemas.microsoft.com/office/powerpoint/2010/main" val="2270088967"/>
+      </p:ext>
+    </p:extLst>
+  </p:cSld>
+  <p:clrMapOvr>
+    <a:masterClrMapping/>
+  </p:clrMapOvr>
+</p:sld>
+</file>
+
+<file path=ppt/slides/slide5.xml><?xml version="1.0" encoding="utf-8"?>
+<p:sld xmlns:a="http://schemas.openxmlformats.org/drawingml/2006/main" xmlns:r="http://schemas.openxmlformats.org/officeDocument/2006/relationships" xmlns:p="http://schemas.openxmlformats.org/presentationml/2006/main">
+  <p:cSld>
+    <p:spTree>
+      <p:nvGrpSpPr>
+        <p:cNvPr id="1" name=""/>
+        <p:cNvGrpSpPr/>
+        <p:nvPr/>
+      </p:nvGrpSpPr>
+      <p:grpSpPr>
+        <a:xfrm>
+          <a:off x="0" y="0"/>
+          <a:ext cx="0" cy="0"/>
+          <a:chOff x="0" y="0"/>
+          <a:chExt cx="0" cy="0"/>
+        </a:xfrm>
+      </p:grpSpPr>
+      <p:sp>
+        <p:nvSpPr>
+          <p:cNvPr id="2" name="Title 1">
+            <a:extLst>
+              <a:ext uri="{FF2B5EF4-FFF2-40B4-BE49-F238E27FC236}">
+                <a16:creationId xmlns:a16="http://schemas.microsoft.com/office/drawing/2014/main" id="{3840BD1E-A22B-40DD-B7C7-F977845C1437}"/>
+              </a:ext>
+            </a:extLst>
+          </p:cNvPr>
+          <p:cNvSpPr>
+            <a:spLocks noGrp="1"/>
+          </p:cNvSpPr>
+          <p:nvPr>
+            <p:ph type="title"/>
+          </p:nvPr>
+        </p:nvSpPr>
+        <p:spPr/>
+        <p:txBody>
+          <a:bodyPr>
+            <a:normAutofit/>
+          </a:bodyPr>
+          <a:lstStyle/>
+          <a:p>
+            <a:r>
+              <a:rPr lang="en-US" sz="3200" dirty="0">
+                <a:solidFill>
+                  <a:schemeClr val="accent1">
+                    <a:lumMod val="50000"/>
+                  </a:schemeClr>
+                </a:solidFill>
+                <a:latin typeface="Georgia Pro Cond" panose="02040506050405020303" pitchFamily="18" charset="0"/>
+              </a:rPr>
+              <a:t>DATA COLLECTION &amp; MANAGEMENT</a:t>
+            </a:r>
+          </a:p>
+        </p:txBody>
+      </p:sp>
+    </p:spTree>
+    <p:extLst>
+      <p:ext uri="{BB962C8B-B14F-4D97-AF65-F5344CB8AC3E}">
+        <p14:creationId xmlns:p14="http://schemas.microsoft.com/office/powerpoint/2010/main" val="821192843"/>
+      </p:ext>
+    </p:extLst>
+  </p:cSld>
+  <p:clrMapOvr>
+    <a:masterClrMapping/>
+  </p:clrMapOvr>
+</p:sld>
+</file>
+
+<file path=ppt/slides/slide6.xml><?xml version="1.0" encoding="utf-8"?>
+<p:sld xmlns:a="http://schemas.openxmlformats.org/drawingml/2006/main" xmlns:r="http://schemas.openxmlformats.org/officeDocument/2006/relationships" xmlns:p="http://schemas.openxmlformats.org/presentationml/2006/main">
+  <p:cSld>
+    <p:spTree>
+      <p:nvGrpSpPr>
+        <p:cNvPr id="1" name=""/>
+        <p:cNvGrpSpPr/>
+        <p:nvPr/>
+      </p:nvGrpSpPr>
+      <p:grpSpPr>
+        <a:xfrm>
+          <a:off x="0" y="0"/>
+          <a:ext cx="0" cy="0"/>
+          <a:chOff x="0" y="0"/>
+          <a:chExt cx="0" cy="0"/>
+        </a:xfrm>
+      </p:grpSpPr>
+      <p:sp>
+        <p:nvSpPr>
+          <p:cNvPr id="2" name="Title 1">
+            <a:extLst>
+              <a:ext uri="{FF2B5EF4-FFF2-40B4-BE49-F238E27FC236}">
+                <a16:creationId xmlns:a16="http://schemas.microsoft.com/office/drawing/2014/main" id="{512EA9F0-EACB-4E34-ADF6-58C865CC56FE}"/>
+              </a:ext>
+            </a:extLst>
+          </p:cNvPr>
+          <p:cNvSpPr>
+            <a:spLocks noGrp="1"/>
+          </p:cNvSpPr>
+          <p:nvPr>
+            <p:ph type="title"/>
+          </p:nvPr>
+        </p:nvSpPr>
+        <p:spPr/>
+        <p:txBody>
+          <a:bodyPr>
+            <a:normAutofit/>
+          </a:bodyPr>
+          <a:lstStyle/>
+          <a:p>
+            <a:r>
+              <a:rPr lang="en-US" sz="3200" dirty="0">
+                <a:solidFill>
+                  <a:schemeClr val="accent1">
+                    <a:lumMod val="50000"/>
+                  </a:schemeClr>
+                </a:solidFill>
+                <a:latin typeface="Georgia Pro Cond" panose="02040506050405020303" pitchFamily="18" charset="0"/>
+              </a:rPr>
+              <a:t>DATA EXPLORATION</a:t>
+            </a:r>
+          </a:p>
+        </p:txBody>
+      </p:sp>
+    </p:spTree>
+    <p:extLst>
+      <p:ext uri="{BB962C8B-B14F-4D97-AF65-F5344CB8AC3E}">
+        <p14:creationId xmlns:p14="http://schemas.microsoft.com/office/powerpoint/2010/main" val="3088394074"/>
+      </p:ext>
+    </p:extLst>
+  </p:cSld>
+  <p:clrMapOvr>
+    <a:masterClrMapping/>
+  </p:clrMapOvr>
+</p:sld>
+</file>
+
+<file path=ppt/slides/slide7.xml><?xml version="1.0" encoding="utf-8"?>
+<p:sld xmlns:a="http://schemas.openxmlformats.org/drawingml/2006/main" xmlns:r="http://schemas.openxmlformats.org/officeDocument/2006/relationships" xmlns:p="http://schemas.openxmlformats.org/presentationml/2006/main">
+  <p:cSld>
+    <p:spTree>
+      <p:nvGrpSpPr>
+        <p:cNvPr id="1" name=""/>
+        <p:cNvGrpSpPr/>
+        <p:nvPr/>
+      </p:nvGrpSpPr>
+      <p:grpSpPr>
+        <a:xfrm>
+          <a:off x="0" y="0"/>
+          <a:ext cx="0" cy="0"/>
+          <a:chOff x="0" y="0"/>
+          <a:chExt cx="0" cy="0"/>
+        </a:xfrm>
+      </p:grpSpPr>
+      <p:sp>
+        <p:nvSpPr>
+          <p:cNvPr id="2" name="Title 1">
+            <a:extLst>
+              <a:ext uri="{FF2B5EF4-FFF2-40B4-BE49-F238E27FC236}">
+                <a16:creationId xmlns:a16="http://schemas.microsoft.com/office/drawing/2014/main" id="{5E1A2851-B6DE-443C-B478-A5CE31ED592D}"/>
+              </a:ext>
+            </a:extLst>
+          </p:cNvPr>
+          <p:cNvSpPr>
+            <a:spLocks noGrp="1"/>
+          </p:cNvSpPr>
+          <p:nvPr>
+            <p:ph type="title"/>
+          </p:nvPr>
+        </p:nvSpPr>
+        <p:spPr/>
+        <p:txBody>
+          <a:bodyPr>
+            <a:normAutofit/>
+          </a:bodyPr>
+          <a:lstStyle/>
+          <a:p>
+            <a:r>
+              <a:rPr lang="en-US" sz="3200" dirty="0">
+                <a:solidFill>
+                  <a:schemeClr val="accent1">
+                    <a:lumMod val="50000"/>
+                  </a:schemeClr>
+                </a:solidFill>
+                <a:latin typeface="Georgia Pro Cond" panose="02040506050405020303" pitchFamily="18" charset="0"/>
+              </a:rPr>
+              <a:t>DATA CLEANING</a:t>
+            </a:r>
+          </a:p>
+        </p:txBody>
+      </p:sp>
+    </p:spTree>
+    <p:extLst>
+      <p:ext uri="{BB962C8B-B14F-4D97-AF65-F5344CB8AC3E}">
+        <p14:creationId xmlns:p14="http://schemas.microsoft.com/office/powerpoint/2010/main" val="1894981707"/>
+      </p:ext>
+    </p:extLst>
+  </p:cSld>
+  <p:clrMapOvr>
+    <a:masterClrMapping/>
+  </p:clrMapOvr>
+</p:sld>
+</file>
+
+<file path=ppt/slides/slide8.xml><?xml version="1.0" encoding="utf-8"?>
+<p:sld xmlns:a="http://schemas.openxmlformats.org/drawingml/2006/main" xmlns:r="http://schemas.openxmlformats.org/officeDocument/2006/relationships" xmlns:p="http://schemas.openxmlformats.org/presentationml/2006/main">
+  <p:cSld>
+    <p:spTree>
+      <p:nvGrpSpPr>
+        <p:cNvPr id="1" name=""/>
+        <p:cNvGrpSpPr/>
+        <p:nvPr/>
+      </p:nvGrpSpPr>
+      <p:grpSpPr>
+        <a:xfrm>
+          <a:off x="0" y="0"/>
+          <a:ext cx="0" cy="0"/>
+          <a:chOff x="0" y="0"/>
+          <a:chExt cx="0" cy="0"/>
+        </a:xfrm>
+      </p:grpSpPr>
+      <p:sp>
+        <p:nvSpPr>
+          <p:cNvPr id="2" name="Title 1">
+            <a:extLst>
+              <a:ext uri="{FF2B5EF4-FFF2-40B4-BE49-F238E27FC236}">
+                <a16:creationId xmlns:a16="http://schemas.microsoft.com/office/drawing/2014/main" id="{5E1A2851-B6DE-443C-B478-A5CE31ED592D}"/>
+              </a:ext>
+            </a:extLst>
+          </p:cNvPr>
+          <p:cNvSpPr>
+            <a:spLocks noGrp="1"/>
+          </p:cNvSpPr>
+          <p:nvPr>
+            <p:ph type="title"/>
+          </p:nvPr>
+        </p:nvSpPr>
+        <p:spPr/>
+        <p:txBody>
+          <a:bodyPr>
+            <a:normAutofit/>
+          </a:bodyPr>
+          <a:lstStyle/>
+          <a:p>
+            <a:r>
+              <a:rPr lang="en-US" sz="3200" dirty="0">
+                <a:solidFill>
+                  <a:schemeClr val="accent1">
+                    <a:lumMod val="50000"/>
+                  </a:schemeClr>
+                </a:solidFill>
+                <a:latin typeface="Georgia Pro Cond" panose="02040506050405020303" pitchFamily="18" charset="0"/>
+              </a:rPr>
+              <a:t>MODELLING</a:t>
+            </a:r>
+          </a:p>
+        </p:txBody>
+      </p:sp>
+    </p:spTree>
+    <p:extLst>
+      <p:ext uri="{BB962C8B-B14F-4D97-AF65-F5344CB8AC3E}">
+        <p14:creationId xmlns:p14="http://schemas.microsoft.com/office/powerpoint/2010/main" val="1422923119"/>
+      </p:ext>
+    </p:extLst>
+  </p:cSld>
+  <p:clrMapOvr>
+    <a:masterClrMapping/>
+  </p:clrMapOvr>
+</p:sld>
+</file>
+
+<file path=ppt/slides/slide9.xml><?xml version="1.0" encoding="utf-8"?>
+<p:sld xmlns:a="http://schemas.openxmlformats.org/drawingml/2006/main" xmlns:r="http://schemas.openxmlformats.org/officeDocument/2006/relationships" xmlns:p="http://schemas.openxmlformats.org/presentationml/2006/main">
+  <p:cSld>
+    <p:spTree>
+      <p:nvGrpSpPr>
+        <p:cNvPr id="1" name=""/>
+        <p:cNvGrpSpPr/>
+        <p:nvPr/>
+      </p:nvGrpSpPr>
+      <p:grpSpPr>
+        <a:xfrm>
+          <a:off x="0" y="0"/>
+          <a:ext cx="0" cy="0"/>
+          <a:chOff x="0" y="0"/>
+          <a:chExt cx="0" cy="0"/>
+        </a:xfrm>
+      </p:grpSpPr>
+      <p:sp>
+        <p:nvSpPr>
+          <p:cNvPr id="2" name="Title 1">
+            <a:extLst>
+              <a:ext uri="{FF2B5EF4-FFF2-40B4-BE49-F238E27FC236}">
+                <a16:creationId xmlns:a16="http://schemas.microsoft.com/office/drawing/2014/main" id="{5E1A2851-B6DE-443C-B478-A5CE31ED592D}"/>
+              </a:ext>
+            </a:extLst>
+          </p:cNvPr>
+          <p:cNvSpPr>
+            <a:spLocks noGrp="1"/>
+          </p:cNvSpPr>
+          <p:nvPr>
+            <p:ph type="title"/>
+          </p:nvPr>
+        </p:nvSpPr>
+        <p:spPr/>
+        <p:txBody>
+          <a:bodyPr>
+            <a:normAutofit/>
+          </a:bodyPr>
+          <a:lstStyle/>
+          <a:p>
+            <a:r>
+              <a:rPr lang="en-US" sz="3200" dirty="0">
+                <a:solidFill>
+                  <a:schemeClr val="accent1">
+                    <a:lumMod val="50000"/>
+                  </a:schemeClr>
+                </a:solidFill>
+                <a:latin typeface="Georgia Pro Cond" panose="02040506050405020303" pitchFamily="18" charset="0"/>
+              </a:rPr>
+              <a:t>EVALUATION</a:t>
+            </a:r>
+          </a:p>
+        </p:txBody>
+      </p:sp>
+      <p:sp>
+        <p:nvSpPr>
+          <p:cNvPr id="3" name="TextBox 2">
+            <a:extLst>
+              <a:ext uri="{FF2B5EF4-FFF2-40B4-BE49-F238E27FC236}">
+                <a16:creationId xmlns:a16="http://schemas.microsoft.com/office/drawing/2014/main" id="{3DBE9DA8-D33E-4936-8C6E-0AB0DC333089}"/>
+              </a:ext>
+            </a:extLst>
+          </p:cNvPr>
+          <p:cNvSpPr txBox="1"/>
+          <p:nvPr/>
+        </p:nvSpPr>
+        <p:spPr>
+          <a:xfrm>
+            <a:off x="1866122" y="2705878"/>
+            <a:ext cx="7800392" cy="1477328"/>
+          </a:xfrm>
+          <a:prstGeom prst="rect">
+            <a:avLst/>
+          </a:prstGeom>
+          <a:noFill/>
+        </p:spPr>
+        <p:txBody>
+          <a:bodyPr wrap="square" rtlCol="0">
+            <a:spAutoFit/>
+          </a:bodyPr>
+          <a:lstStyle/>
+          <a:p>
+            <a:r>
+              <a:rPr lang="en-MY"/>
+              <a:t>How should they interpret the model? What does the model output look like? If the model provides a trace of which rules in the decision tree executed, how do they read that? If the model provides a confidence score in addition to a classification, how should they use the confidence score? When might they potentially overrule the model?</a:t>
+            </a:r>
+            <a:endParaRPr lang="en-US" dirty="0"/>
+          </a:p>
+        </p:txBody>
+      </p:sp>
+    </p:spTree>
+    <p:extLst>
+      <p:ext uri="{BB962C8B-B14F-4D97-AF65-F5344CB8AC3E}">
+        <p14:creationId xmlns:p14="http://schemas.microsoft.com/office/powerpoint/2010/main" val="4180691502"/>
       </p:ext>
     </p:extLst>
   </p:cSld>

</xml_diff>

<commit_message>
project.Rmd - adds bayes rate calculation
</commit_message>
<xml_diff>
--- a/presentation.pptx
+++ b/presentation.pptx
@@ -9154,7 +9154,7 @@
         <p:spPr>
           <a:xfrm>
             <a:off x="838200" y="1586204"/>
-            <a:ext cx="10993016" cy="4893647"/>
+            <a:ext cx="10993016" cy="5262979"/>
           </a:xfrm>
           <a:prstGeom prst="rect">
             <a:avLst/>
@@ -9180,7 +9180,7 @@
                 </a:solidFill>
                 <a:latin typeface="Rockwell Nova" panose="02060503020205020403" pitchFamily="18" charset="0"/>
               </a:rPr>
-              <a:t>We want to improve the sensitivity of cardiovascular disease prediction model from 61.11% to …</a:t>
+              <a:t>We want to improve the sensitivity of cardiovascular disease prediction model at least 1% from 61.11%.</a:t>
             </a:r>
           </a:p>
           <a:p>
@@ -9231,7 +9231,7 @@
                 </a:solidFill>
                 <a:latin typeface="Rockwell Nova" panose="02060503020205020403" pitchFamily="18" charset="0"/>
               </a:rPr>
-              <a:t>We set the null model or lower bound to be the highest recall achieved by any single feature, which was 61.11% by systolic blood pressure.</a:t>
+              <a:t>We set the null model or lower bound to be the highest recall achieved by any single feature, which was 61.11% sensitivity by systolic blood pressure.</a:t>
             </a:r>
           </a:p>
           <a:p>
@@ -9248,7 +9248,7 @@
                 </a:solidFill>
                 <a:latin typeface="Rockwell Nova" panose="02060503020205020403" pitchFamily="18" charset="0"/>
               </a:rPr>
-              <a:t>We used KNN to select the Bayes Rate or upper bound which was … </a:t>
+              <a:t>We used KNN to select the Bayes Rate or upper bound which was 66.96% sensitivity.</a:t>
             </a:r>
           </a:p>
           <a:p>

</xml_diff>

<commit_message>
presentation - slide 8 - features list
</commit_message>
<xml_diff>
--- a/presentation.pptx
+++ b/presentation.pptx
@@ -5,7 +5,7 @@
     <p:sldMasterId id="2147483648" r:id="rId1"/>
   </p:sldMasterIdLst>
   <p:notesMasterIdLst>
-    <p:notesMasterId r:id="rId23"/>
+    <p:notesMasterId r:id="rId24"/>
   </p:notesMasterIdLst>
   <p:sldIdLst>
     <p:sldId id="256" r:id="rId2"/>
@@ -15,20 +15,21 @@
     <p:sldId id="268" r:id="rId6"/>
     <p:sldId id="269" r:id="rId7"/>
     <p:sldId id="270" r:id="rId8"/>
-    <p:sldId id="261" r:id="rId9"/>
-    <p:sldId id="271" r:id="rId10"/>
-    <p:sldId id="272" r:id="rId11"/>
-    <p:sldId id="273" r:id="rId12"/>
-    <p:sldId id="274" r:id="rId13"/>
-    <p:sldId id="275" r:id="rId14"/>
-    <p:sldId id="276" r:id="rId15"/>
-    <p:sldId id="277" r:id="rId16"/>
-    <p:sldId id="278" r:id="rId17"/>
-    <p:sldId id="280" r:id="rId18"/>
-    <p:sldId id="281" r:id="rId19"/>
-    <p:sldId id="279" r:id="rId20"/>
-    <p:sldId id="264" r:id="rId21"/>
-    <p:sldId id="265" r:id="rId22"/>
+    <p:sldId id="282" r:id="rId9"/>
+    <p:sldId id="261" r:id="rId10"/>
+    <p:sldId id="271" r:id="rId11"/>
+    <p:sldId id="272" r:id="rId12"/>
+    <p:sldId id="273" r:id="rId13"/>
+    <p:sldId id="274" r:id="rId14"/>
+    <p:sldId id="275" r:id="rId15"/>
+    <p:sldId id="276" r:id="rId16"/>
+    <p:sldId id="277" r:id="rId17"/>
+    <p:sldId id="278" r:id="rId18"/>
+    <p:sldId id="280" r:id="rId19"/>
+    <p:sldId id="281" r:id="rId20"/>
+    <p:sldId id="279" r:id="rId21"/>
+    <p:sldId id="264" r:id="rId22"/>
+    <p:sldId id="265" r:id="rId23"/>
   </p:sldIdLst>
   <p:sldSz cx="12192000" cy="6858000"/>
   <p:notesSz cx="6858000" cy="9144000"/>
@@ -217,7 +218,7 @@
           <a:p>
             <a:fld id="{9497BB87-7304-4E2A-A942-4D5A8291D4AA}" type="datetimeFigureOut">
               <a:rPr lang="en-US" smtClean="0"/>
-              <a:t>12/3/2019</a:t>
+              <a:t>12/4/2019</a:t>
             </a:fld>
             <a:endParaRPr lang="en-US"/>
           </a:p>
@@ -633,7 +634,7 @@
           <a:p>
             <a:fld id="{CF8315F9-90FD-4DB5-9225-8838ABDCEE34}" type="slidenum">
               <a:rPr lang="en-US" smtClean="0"/>
-              <a:t>8</a:t>
+              <a:t>9</a:t>
             </a:fld>
             <a:endParaRPr lang="en-US"/>
           </a:p>
@@ -717,7 +718,7 @@
           <a:p>
             <a:fld id="{CF8315F9-90FD-4DB5-9225-8838ABDCEE34}" type="slidenum">
               <a:rPr lang="en-US" smtClean="0"/>
-              <a:t>9</a:t>
+              <a:t>10</a:t>
             </a:fld>
             <a:endParaRPr lang="en-US"/>
           </a:p>
@@ -801,7 +802,7 @@
           <a:p>
             <a:fld id="{CF8315F9-90FD-4DB5-9225-8838ABDCEE34}" type="slidenum">
               <a:rPr lang="en-US" smtClean="0"/>
-              <a:t>10</a:t>
+              <a:t>11</a:t>
             </a:fld>
             <a:endParaRPr lang="en-US"/>
           </a:p>
@@ -885,7 +886,7 @@
           <a:p>
             <a:fld id="{CF8315F9-90FD-4DB5-9225-8838ABDCEE34}" type="slidenum">
               <a:rPr lang="en-US" smtClean="0"/>
-              <a:t>11</a:t>
+              <a:t>12</a:t>
             </a:fld>
             <a:endParaRPr lang="en-US"/>
           </a:p>
@@ -969,7 +970,7 @@
           <a:p>
             <a:fld id="{CF8315F9-90FD-4DB5-9225-8838ABDCEE34}" type="slidenum">
               <a:rPr lang="en-US" smtClean="0"/>
-              <a:t>12</a:t>
+              <a:t>13</a:t>
             </a:fld>
             <a:endParaRPr lang="en-US"/>
           </a:p>
@@ -1053,7 +1054,7 @@
           <a:p>
             <a:fld id="{CF8315F9-90FD-4DB5-9225-8838ABDCEE34}" type="slidenum">
               <a:rPr lang="en-US" smtClean="0"/>
-              <a:t>13</a:t>
+              <a:t>14</a:t>
             </a:fld>
             <a:endParaRPr lang="en-US"/>
           </a:p>
@@ -1137,7 +1138,7 @@
           <a:p>
             <a:fld id="{CF8315F9-90FD-4DB5-9225-8838ABDCEE34}" type="slidenum">
               <a:rPr lang="en-US" smtClean="0"/>
-              <a:t>14</a:t>
+              <a:t>15</a:t>
             </a:fld>
             <a:endParaRPr lang="en-US"/>
           </a:p>
@@ -1221,7 +1222,7 @@
           <a:p>
             <a:fld id="{CF8315F9-90FD-4DB5-9225-8838ABDCEE34}" type="slidenum">
               <a:rPr lang="en-US" smtClean="0"/>
-              <a:t>15</a:t>
+              <a:t>16</a:t>
             </a:fld>
             <a:endParaRPr lang="en-US"/>
           </a:p>
@@ -4945,7 +4946,7 @@
       </p:sp>
       <p:pic>
         <p:nvPicPr>
-          <p:cNvPr id="7" name="Picture 6">
+          <p:cNvPr id="7" name="Picture 6" descr="A close up of a map&#10;&#10;Description automatically generated">
             <a:extLst>
               <a:ext uri="{FF2B5EF4-FFF2-40B4-BE49-F238E27FC236}">
                 <a16:creationId xmlns:a16="http://schemas.microsoft.com/office/drawing/2014/main" id="{7FD27441-CD8B-42CE-897E-1AC67F16DECC}"/>
@@ -4965,8 +4966,9 @@
               </a:ext>
             </a:extLst>
           </a:blip>
-          <a:srcRect/>
-          <a:stretch/>
+          <a:stretch>
+            <a:fillRect/>
+          </a:stretch>
         </p:blipFill>
         <p:spPr>
           <a:xfrm>
@@ -4980,7 +4982,7 @@
       </p:pic>
       <p:pic>
         <p:nvPicPr>
-          <p:cNvPr id="9" name="Picture 8">
+          <p:cNvPr id="9" name="Picture 8" descr="A close up of a map&#10;&#10;Description automatically generated">
             <a:extLst>
               <a:ext uri="{FF2B5EF4-FFF2-40B4-BE49-F238E27FC236}">
                 <a16:creationId xmlns:a16="http://schemas.microsoft.com/office/drawing/2014/main" id="{DC1F3836-0DDE-404F-B5D5-0E57EBF1F712}"/>
@@ -5000,8 +5002,9 @@
               </a:ext>
             </a:extLst>
           </a:blip>
-          <a:srcRect/>
-          <a:stretch/>
+          <a:stretch>
+            <a:fillRect/>
+          </a:stretch>
         </p:blipFill>
         <p:spPr>
           <a:xfrm>
@@ -5050,7 +5053,7 @@
                 </a:solidFill>
                 <a:latin typeface="Rockwell Nova" panose="02060503020205020403" pitchFamily="18" charset="0"/>
               </a:rPr>
-              <a:t>Mean weight of patients with CVDs was little higher than those without. Distribution of BMI was normal, and mean was slightly higher if not the same for patients with CVD.</a:t>
+              <a:t>Mean age of patients with CVDs was higher than those without. However, distribution of Height was normal and remained same for both classes.</a:t>
             </a:r>
           </a:p>
         </p:txBody>
@@ -5058,7 +5061,7 @@
     </p:spTree>
     <p:extLst>
       <p:ext uri="{BB962C8B-B14F-4D97-AF65-F5344CB8AC3E}">
-        <p14:creationId xmlns:p14="http://schemas.microsoft.com/office/powerpoint/2010/main" val="380651462"/>
+        <p14:creationId xmlns:p14="http://schemas.microsoft.com/office/powerpoint/2010/main" val="273446683"/>
       </p:ext>
     </p:extLst>
   </p:cSld>
@@ -5320,7 +5323,7 @@
                 </a:solidFill>
                 <a:latin typeface="Rockwell Nova" panose="02060503020205020403" pitchFamily="18" charset="0"/>
               </a:rPr>
-              <a:t>Both Systole and Diastole featured a lot of outliers and invalid values that need to be taken care of. The mean Systolic blood pressure was slightly high in CVD affected patients.</a:t>
+              <a:t>Mean weight of patients with CVDs was little higher than those without. Distribution of BMI was normal, and mean was slightly higher if not the same for patients with CVD.</a:t>
             </a:r>
           </a:p>
         </p:txBody>
@@ -5328,7 +5331,7 @@
     </p:spTree>
     <p:extLst>
       <p:ext uri="{BB962C8B-B14F-4D97-AF65-F5344CB8AC3E}">
-        <p14:creationId xmlns:p14="http://schemas.microsoft.com/office/powerpoint/2010/main" val="785239704"/>
+        <p14:creationId xmlns:p14="http://schemas.microsoft.com/office/powerpoint/2010/main" val="380651462"/>
       </p:ext>
     </p:extLst>
   </p:cSld>
@@ -5403,7 +5406,7 @@
                 </a:solidFill>
                 <a:latin typeface="Rockwell Nova" panose="02060503020205020403" pitchFamily="18" charset="0"/>
               </a:rPr>
-              <a:t>(Side-by-side Bar Charts)</a:t>
+              <a:t>(Density Plots)</a:t>
             </a:r>
             <a:endParaRPr lang="en-US" sz="2000" dirty="0">
               <a:solidFill>
@@ -5568,7 +5571,7 @@
         <p:spPr>
           <a:xfrm>
             <a:off x="838200" y="5058485"/>
-            <a:ext cx="10515600" cy="830997"/>
+            <a:ext cx="10515600" cy="1200329"/>
           </a:xfrm>
           <a:prstGeom prst="rect">
             <a:avLst/>
@@ -5590,7 +5593,7 @@
                 </a:solidFill>
                 <a:latin typeface="Rockwell Nova" panose="02060503020205020403" pitchFamily="18" charset="0"/>
               </a:rPr>
-              <a:t>There was no identifiable association between Smoking and CVDs or between Alcohol consumption and CVDs in the population.</a:t>
+              <a:t>Both Systole and Diastole featured a lot of outliers and invalid values that need to be taken care of. The mean Systolic blood pressure was slightly high in CVD affected patients.</a:t>
             </a:r>
           </a:p>
         </p:txBody>
@@ -5598,7 +5601,7 @@
     </p:spTree>
     <p:extLst>
       <p:ext uri="{BB962C8B-B14F-4D97-AF65-F5344CB8AC3E}">
-        <p14:creationId xmlns:p14="http://schemas.microsoft.com/office/powerpoint/2010/main" val="1903730238"/>
+        <p14:creationId xmlns:p14="http://schemas.microsoft.com/office/powerpoint/2010/main" val="785239704"/>
       </p:ext>
     </p:extLst>
   </p:cSld>
@@ -5838,7 +5841,7 @@
         <p:spPr>
           <a:xfrm>
             <a:off x="838200" y="5058485"/>
-            <a:ext cx="10515600" cy="1200329"/>
+            <a:ext cx="10515600" cy="830997"/>
           </a:xfrm>
           <a:prstGeom prst="rect">
             <a:avLst/>
@@ -5860,7 +5863,7 @@
                 </a:solidFill>
                 <a:latin typeface="Rockwell Nova" panose="02060503020205020403" pitchFamily="18" charset="0"/>
               </a:rPr>
-              <a:t>Patients with high blood pressure had significantly higher rate of CVD. Also, frequency of disease was slightly higher in physically inactive patients.</a:t>
+              <a:t>There was no identifiable association between Smoking and CVDs or between Alcohol consumption and CVDs in the population.</a:t>
             </a:r>
           </a:p>
         </p:txBody>
@@ -5868,7 +5871,7 @@
     </p:spTree>
     <p:extLst>
       <p:ext uri="{BB962C8B-B14F-4D97-AF65-F5344CB8AC3E}">
-        <p14:creationId xmlns:p14="http://schemas.microsoft.com/office/powerpoint/2010/main" val="2373048899"/>
+        <p14:creationId xmlns:p14="http://schemas.microsoft.com/office/powerpoint/2010/main" val="1903730238"/>
       </p:ext>
     </p:extLst>
   </p:cSld>
@@ -6108,7 +6111,7 @@
         <p:spPr>
           <a:xfrm>
             <a:off x="838200" y="5058485"/>
-            <a:ext cx="10515600" cy="830997"/>
+            <a:ext cx="10515600" cy="1200329"/>
           </a:xfrm>
           <a:prstGeom prst="rect">
             <a:avLst/>
@@ -6130,7 +6133,7 @@
                 </a:solidFill>
                 <a:latin typeface="Rockwell Nova" panose="02060503020205020403" pitchFamily="18" charset="0"/>
               </a:rPr>
-              <a:t>Patients with cholesterol and glucose levels above and well above normal were more susceptible to cardiovascular diseases.</a:t>
+              <a:t>Patients with high blood pressure had significantly higher rate of CVD. Also, frequency of disease was slightly higher in physically inactive patients.</a:t>
             </a:r>
           </a:p>
         </p:txBody>
@@ -6138,7 +6141,7 @@
     </p:spTree>
     <p:extLst>
       <p:ext uri="{BB962C8B-B14F-4D97-AF65-F5344CB8AC3E}">
-        <p14:creationId xmlns:p14="http://schemas.microsoft.com/office/powerpoint/2010/main" val="128156238"/>
+        <p14:creationId xmlns:p14="http://schemas.microsoft.com/office/powerpoint/2010/main" val="2373048899"/>
       </p:ext>
     </p:extLst>
   </p:cSld>
@@ -6400,7 +6403,7 @@
                 </a:solidFill>
                 <a:latin typeface="Rockwell Nova" panose="02060503020205020403" pitchFamily="18" charset="0"/>
               </a:rPr>
-              <a:t>CVDs were slightly more prevalent in male patients than their counterparts. Class distribution in the dataset was well balanced.</a:t>
+              <a:t>Patients with cholesterol and glucose levels above and well above normal were more susceptible to cardiovascular diseases.</a:t>
             </a:r>
           </a:p>
         </p:txBody>
@@ -6408,7 +6411,7 @@
     </p:spTree>
     <p:extLst>
       <p:ext uri="{BB962C8B-B14F-4D97-AF65-F5344CB8AC3E}">
-        <p14:creationId xmlns:p14="http://schemas.microsoft.com/office/powerpoint/2010/main" val="2402339791"/>
+        <p14:creationId xmlns:p14="http://schemas.microsoft.com/office/powerpoint/2010/main" val="128156238"/>
       </p:ext>
     </p:extLst>
   </p:cSld>
@@ -6440,6 +6443,276 @@
           <p:cNvPr id="2" name="Title 1">
             <a:extLst>
               <a:ext uri="{FF2B5EF4-FFF2-40B4-BE49-F238E27FC236}">
+                <a16:creationId xmlns:a16="http://schemas.microsoft.com/office/drawing/2014/main" id="{512EA9F0-EACB-4E34-ADF6-58C865CC56FE}"/>
+              </a:ext>
+            </a:extLst>
+          </p:cNvPr>
+          <p:cNvSpPr>
+            <a:spLocks noGrp="1"/>
+          </p:cNvSpPr>
+          <p:nvPr>
+            <p:ph type="title"/>
+          </p:nvPr>
+        </p:nvSpPr>
+        <p:spPr>
+          <a:xfrm>
+            <a:off x="838200" y="365125"/>
+            <a:ext cx="10515600" cy="1325563"/>
+          </a:xfrm>
+        </p:spPr>
+        <p:txBody>
+          <a:bodyPr>
+            <a:normAutofit/>
+          </a:bodyPr>
+          <a:lstStyle/>
+          <a:p>
+            <a:r>
+              <a:rPr lang="en-US" sz="3200" dirty="0">
+                <a:solidFill>
+                  <a:schemeClr val="accent1">
+                    <a:lumMod val="50000"/>
+                  </a:schemeClr>
+                </a:solidFill>
+                <a:latin typeface="Rockwell Nova" panose="02060503020205020403" pitchFamily="18" charset="0"/>
+              </a:rPr>
+              <a:t>DATA EXPLORATION </a:t>
+            </a:r>
+            <a:r>
+              <a:rPr lang="en-US" sz="2000" dirty="0">
+                <a:solidFill>
+                  <a:schemeClr val="accent1">
+                    <a:lumMod val="50000"/>
+                  </a:schemeClr>
+                </a:solidFill>
+                <a:latin typeface="Rockwell Nova" panose="02060503020205020403" pitchFamily="18" charset="0"/>
+              </a:rPr>
+              <a:t>(Side-by-side Bar Charts)</a:t>
+            </a:r>
+            <a:endParaRPr lang="en-US" sz="2000" dirty="0">
+              <a:solidFill>
+                <a:schemeClr val="accent1">
+                  <a:lumMod val="50000"/>
+                </a:schemeClr>
+              </a:solidFill>
+              <a:latin typeface="Georgia Pro Cond" panose="02040506050405020303" pitchFamily="18" charset="0"/>
+            </a:endParaRPr>
+          </a:p>
+        </p:txBody>
+      </p:sp>
+      <p:sp>
+        <p:nvSpPr>
+          <p:cNvPr id="3" name="Date Placeholder 2">
+            <a:extLst>
+              <a:ext uri="{FF2B5EF4-FFF2-40B4-BE49-F238E27FC236}">
+                <a16:creationId xmlns:a16="http://schemas.microsoft.com/office/drawing/2014/main" id="{23C3AC0D-1883-489E-94CC-C78C43267E4B}"/>
+              </a:ext>
+            </a:extLst>
+          </p:cNvPr>
+          <p:cNvSpPr>
+            <a:spLocks noGrp="1"/>
+          </p:cNvSpPr>
+          <p:nvPr>
+            <p:ph type="dt" sz="half" idx="10"/>
+          </p:nvPr>
+        </p:nvSpPr>
+        <p:spPr>
+          <a:xfrm>
+            <a:off x="838200" y="6356350"/>
+            <a:ext cx="2743200" cy="365125"/>
+          </a:xfrm>
+        </p:spPr>
+        <p:txBody>
+          <a:bodyPr/>
+          <a:lstStyle/>
+          <a:p>
+            <a:r>
+              <a:rPr lang="en-US"/>
+              <a:t>12/4/2019</a:t>
+            </a:r>
+          </a:p>
+        </p:txBody>
+      </p:sp>
+      <p:sp>
+        <p:nvSpPr>
+          <p:cNvPr id="5" name="Slide Number Placeholder 4">
+            <a:extLst>
+              <a:ext uri="{FF2B5EF4-FFF2-40B4-BE49-F238E27FC236}">
+                <a16:creationId xmlns:a16="http://schemas.microsoft.com/office/drawing/2014/main" id="{6A598B4C-F27D-4381-AE08-1CF3CADEB7C4}"/>
+              </a:ext>
+            </a:extLst>
+          </p:cNvPr>
+          <p:cNvSpPr>
+            <a:spLocks noGrp="1"/>
+          </p:cNvSpPr>
+          <p:nvPr>
+            <p:ph type="sldNum" sz="quarter" idx="12"/>
+          </p:nvPr>
+        </p:nvSpPr>
+        <p:spPr>
+          <a:xfrm>
+            <a:off x="8610600" y="6356350"/>
+            <a:ext cx="2743200" cy="365125"/>
+          </a:xfrm>
+        </p:spPr>
+        <p:txBody>
+          <a:bodyPr/>
+          <a:lstStyle/>
+          <a:p>
+            <a:fld id="{87963F98-C10F-4FC1-8017-0839D2AC7CA3}" type="slidenum">
+              <a:rPr lang="en-US" smtClean="0"/>
+              <a:t>16</a:t>
+            </a:fld>
+            <a:endParaRPr lang="en-US"/>
+          </a:p>
+        </p:txBody>
+      </p:sp>
+      <p:pic>
+        <p:nvPicPr>
+          <p:cNvPr id="7" name="Picture 6">
+            <a:extLst>
+              <a:ext uri="{FF2B5EF4-FFF2-40B4-BE49-F238E27FC236}">
+                <a16:creationId xmlns:a16="http://schemas.microsoft.com/office/drawing/2014/main" id="{7FD27441-CD8B-42CE-897E-1AC67F16DECC}"/>
+              </a:ext>
+            </a:extLst>
+          </p:cNvPr>
+          <p:cNvPicPr>
+            <a:picLocks noChangeAspect="1"/>
+          </p:cNvPicPr>
+          <p:nvPr/>
+        </p:nvPicPr>
+        <p:blipFill>
+          <a:blip r:embed="rId3">
+            <a:extLst>
+              <a:ext uri="{28A0092B-C50C-407E-A947-70E740481C1C}">
+                <a14:useLocalDpi xmlns:a14="http://schemas.microsoft.com/office/drawing/2010/main" val="0"/>
+              </a:ext>
+            </a:extLst>
+          </a:blip>
+          <a:srcRect/>
+          <a:stretch/>
+        </p:blipFill>
+        <p:spPr>
+          <a:xfrm>
+            <a:off x="723900" y="1656641"/>
+            <a:ext cx="5715000" cy="3333750"/>
+          </a:xfrm>
+          <a:prstGeom prst="rect">
+            <a:avLst/>
+          </a:prstGeom>
+        </p:spPr>
+      </p:pic>
+      <p:pic>
+        <p:nvPicPr>
+          <p:cNvPr id="9" name="Picture 8">
+            <a:extLst>
+              <a:ext uri="{FF2B5EF4-FFF2-40B4-BE49-F238E27FC236}">
+                <a16:creationId xmlns:a16="http://schemas.microsoft.com/office/drawing/2014/main" id="{DC1F3836-0DDE-404F-B5D5-0E57EBF1F712}"/>
+              </a:ext>
+            </a:extLst>
+          </p:cNvPr>
+          <p:cNvPicPr>
+            <a:picLocks noChangeAspect="1"/>
+          </p:cNvPicPr>
+          <p:nvPr/>
+        </p:nvPicPr>
+        <p:blipFill>
+          <a:blip r:embed="rId4">
+            <a:extLst>
+              <a:ext uri="{28A0092B-C50C-407E-A947-70E740481C1C}">
+                <a14:useLocalDpi xmlns:a14="http://schemas.microsoft.com/office/drawing/2010/main" val="0"/>
+              </a:ext>
+            </a:extLst>
+          </a:blip>
+          <a:srcRect/>
+          <a:stretch/>
+        </p:blipFill>
+        <p:spPr>
+          <a:xfrm>
+            <a:off x="6438900" y="1690688"/>
+            <a:ext cx="5715000" cy="3333750"/>
+          </a:xfrm>
+          <a:prstGeom prst="rect">
+            <a:avLst/>
+          </a:prstGeom>
+        </p:spPr>
+      </p:pic>
+      <p:sp>
+        <p:nvSpPr>
+          <p:cNvPr id="8" name="TextBox 7">
+            <a:extLst>
+              <a:ext uri="{FF2B5EF4-FFF2-40B4-BE49-F238E27FC236}">
+                <a16:creationId xmlns:a16="http://schemas.microsoft.com/office/drawing/2014/main" id="{30CD9B6C-A177-4E3F-8EF3-12CE11BDE130}"/>
+              </a:ext>
+            </a:extLst>
+          </p:cNvPr>
+          <p:cNvSpPr txBox="1"/>
+          <p:nvPr/>
+        </p:nvSpPr>
+        <p:spPr>
+          <a:xfrm>
+            <a:off x="838200" y="5058485"/>
+            <a:ext cx="10515600" cy="830997"/>
+          </a:xfrm>
+          <a:prstGeom prst="rect">
+            <a:avLst/>
+          </a:prstGeom>
+          <a:noFill/>
+        </p:spPr>
+        <p:txBody>
+          <a:bodyPr wrap="square" rtlCol="0">
+            <a:spAutoFit/>
+          </a:bodyPr>
+          <a:lstStyle/>
+          <a:p>
+            <a:r>
+              <a:rPr lang="en-US" sz="2400" dirty="0">
+                <a:solidFill>
+                  <a:schemeClr val="bg2">
+                    <a:lumMod val="25000"/>
+                  </a:schemeClr>
+                </a:solidFill>
+                <a:latin typeface="Rockwell Nova" panose="02060503020205020403" pitchFamily="18" charset="0"/>
+              </a:rPr>
+              <a:t>CVDs were slightly more prevalent in male patients than their counterparts. Class distribution in the dataset was well balanced.</a:t>
+            </a:r>
+          </a:p>
+        </p:txBody>
+      </p:sp>
+    </p:spTree>
+    <p:extLst>
+      <p:ext uri="{BB962C8B-B14F-4D97-AF65-F5344CB8AC3E}">
+        <p14:creationId xmlns:p14="http://schemas.microsoft.com/office/powerpoint/2010/main" val="2402339791"/>
+      </p:ext>
+    </p:extLst>
+  </p:cSld>
+  <p:clrMapOvr>
+    <a:masterClrMapping/>
+  </p:clrMapOvr>
+</p:sld>
+</file>
+
+<file path=ppt/slides/slide17.xml><?xml version="1.0" encoding="utf-8"?>
+<p:sld xmlns:a="http://schemas.openxmlformats.org/drawingml/2006/main" xmlns:r="http://schemas.openxmlformats.org/officeDocument/2006/relationships" xmlns:p="http://schemas.openxmlformats.org/presentationml/2006/main">
+  <p:cSld>
+    <p:spTree>
+      <p:nvGrpSpPr>
+        <p:cNvPr id="1" name=""/>
+        <p:cNvGrpSpPr/>
+        <p:nvPr/>
+      </p:nvGrpSpPr>
+      <p:grpSpPr>
+        <a:xfrm>
+          <a:off x="0" y="0"/>
+          <a:ext cx="0" cy="0"/>
+          <a:chOff x="0" y="0"/>
+          <a:chExt cx="0" cy="0"/>
+        </a:xfrm>
+      </p:grpSpPr>
+      <p:sp>
+        <p:nvSpPr>
+          <p:cNvPr id="2" name="Title 1">
+            <a:extLst>
+              <a:ext uri="{FF2B5EF4-FFF2-40B4-BE49-F238E27FC236}">
                 <a16:creationId xmlns:a16="http://schemas.microsoft.com/office/drawing/2014/main" id="{BB0D0921-96AE-4FEC-B1D7-21D5580C3F23}"/>
               </a:ext>
             </a:extLst>
@@ -6651,7 +6924,7 @@
           <a:p>
             <a:fld id="{87963F98-C10F-4FC1-8017-0839D2AC7CA3}" type="slidenum">
               <a:rPr lang="en-US" smtClean="0"/>
-              <a:t>16</a:t>
+              <a:t>17</a:t>
             </a:fld>
             <a:endParaRPr lang="en-US"/>
           </a:p>
@@ -6670,7 +6943,7 @@
 </p:sld>
 </file>
 
-<file path=ppt/slides/slide17.xml><?xml version="1.0" encoding="utf-8"?>
+<file path=ppt/slides/slide18.xml><?xml version="1.0" encoding="utf-8"?>
 <p:sld xmlns:a="http://schemas.openxmlformats.org/drawingml/2006/main" xmlns:r="http://schemas.openxmlformats.org/officeDocument/2006/relationships" xmlns:p="http://schemas.openxmlformats.org/presentationml/2006/main">
   <p:cSld>
     <p:bg>
@@ -6868,7 +7141,7 @@
                   <a:spcPts val="600"/>
                 </a:spcAft>
               </a:pPr>
-              <a:t>17</a:t>
+              <a:t>18</a:t>
             </a:fld>
             <a:endParaRPr lang="en-US"/>
           </a:p>
@@ -6887,7 +7160,7 @@
 </p:sld>
 </file>
 
-<file path=ppt/slides/slide18.xml><?xml version="1.0" encoding="utf-8"?>
+<file path=ppt/slides/slide19.xml><?xml version="1.0" encoding="utf-8"?>
 <p:sld xmlns:a="http://schemas.openxmlformats.org/drawingml/2006/main" xmlns:r="http://schemas.openxmlformats.org/officeDocument/2006/relationships" xmlns:p="http://schemas.openxmlformats.org/presentationml/2006/main">
   <p:cSld>
     <p:bg>
@@ -7325,7 +7598,7 @@
                   <a:spcPts val="600"/>
                 </a:spcAft>
               </a:pPr>
-              <a:t>18</a:t>
+              <a:t>19</a:t>
             </a:fld>
             <a:endParaRPr lang="en-US">
               <a:solidFill>
@@ -7342,255 +7615,6 @@
     <p:extLst>
       <p:ext uri="{BB962C8B-B14F-4D97-AF65-F5344CB8AC3E}">
         <p14:creationId xmlns:p14="http://schemas.microsoft.com/office/powerpoint/2010/main" val="2291633294"/>
-      </p:ext>
-    </p:extLst>
-  </p:cSld>
-  <p:clrMapOvr>
-    <a:masterClrMapping/>
-  </p:clrMapOvr>
-</p:sld>
-</file>
-
-<file path=ppt/slides/slide19.xml><?xml version="1.0" encoding="utf-8"?>
-<p:sld xmlns:a="http://schemas.openxmlformats.org/drawingml/2006/main" xmlns:r="http://schemas.openxmlformats.org/officeDocument/2006/relationships" xmlns:p="http://schemas.openxmlformats.org/presentationml/2006/main">
-  <p:cSld>
-    <p:spTree>
-      <p:nvGrpSpPr>
-        <p:cNvPr id="1" name=""/>
-        <p:cNvGrpSpPr/>
-        <p:nvPr/>
-      </p:nvGrpSpPr>
-      <p:grpSpPr>
-        <a:xfrm>
-          <a:off x="0" y="0"/>
-          <a:ext cx="0" cy="0"/>
-          <a:chOff x="0" y="0"/>
-          <a:chExt cx="0" cy="0"/>
-        </a:xfrm>
-      </p:grpSpPr>
-      <p:sp>
-        <p:nvSpPr>
-          <p:cNvPr id="2" name="Title 1">
-            <a:extLst>
-              <a:ext uri="{FF2B5EF4-FFF2-40B4-BE49-F238E27FC236}">
-                <a16:creationId xmlns:a16="http://schemas.microsoft.com/office/drawing/2014/main" id="{BB0D0921-96AE-4FEC-B1D7-21D5580C3F23}"/>
-              </a:ext>
-            </a:extLst>
-          </p:cNvPr>
-          <p:cNvSpPr>
-            <a:spLocks noGrp="1"/>
-          </p:cNvSpPr>
-          <p:nvPr>
-            <p:ph type="title"/>
-          </p:nvPr>
-        </p:nvSpPr>
-        <p:spPr/>
-        <p:txBody>
-          <a:bodyPr>
-            <a:normAutofit/>
-          </a:bodyPr>
-          <a:lstStyle/>
-          <a:p>
-            <a:r>
-              <a:rPr lang="en-US" sz="3200" dirty="0">
-                <a:solidFill>
-                  <a:schemeClr val="accent1">
-                    <a:lumMod val="50000"/>
-                  </a:schemeClr>
-                </a:solidFill>
-                <a:latin typeface="Rockwell Nova" panose="02060503020205020403" pitchFamily="18" charset="0"/>
-              </a:rPr>
-              <a:t>FEATURE SELECTION</a:t>
-            </a:r>
-          </a:p>
-        </p:txBody>
-      </p:sp>
-      <p:sp>
-        <p:nvSpPr>
-          <p:cNvPr id="3" name="TextBox 2">
-            <a:extLst>
-              <a:ext uri="{FF2B5EF4-FFF2-40B4-BE49-F238E27FC236}">
-                <a16:creationId xmlns:a16="http://schemas.microsoft.com/office/drawing/2014/main" id="{844C0F2F-D499-47DB-987F-E7D869D73F1C}"/>
-              </a:ext>
-            </a:extLst>
-          </p:cNvPr>
-          <p:cNvSpPr txBox="1"/>
-          <p:nvPr/>
-        </p:nvSpPr>
-        <p:spPr>
-          <a:xfrm>
-            <a:off x="838200" y="1586204"/>
-            <a:ext cx="10993016" cy="4154984"/>
-          </a:xfrm>
-          <a:prstGeom prst="rect">
-            <a:avLst/>
-          </a:prstGeom>
-          <a:noFill/>
-        </p:spPr>
-        <p:txBody>
-          <a:bodyPr wrap="square" rtlCol="0">
-            <a:spAutoFit/>
-          </a:bodyPr>
-          <a:lstStyle/>
-          <a:p>
-            <a:pPr marL="342900" indent="-342900">
-              <a:buFont typeface="Courier New" panose="02070309020205020404" pitchFamily="49" charset="0"/>
-              <a:buChar char="o"/>
-            </a:pPr>
-            <a:r>
-              <a:rPr lang="en-US" sz="2400" dirty="0">
-                <a:solidFill>
-                  <a:schemeClr val="bg2">
-                    <a:lumMod val="25000"/>
-                  </a:schemeClr>
-                </a:solidFill>
-                <a:latin typeface="Rockwell Nova" panose="02060503020205020403" pitchFamily="18" charset="0"/>
-              </a:rPr>
-              <a:t>From the exploratory analysis part, we found that Cholesterol, Blood Pressure, Weight, and Age explains the outcomes better.</a:t>
-            </a:r>
-          </a:p>
-          <a:p>
-            <a:pPr marL="342900" indent="-342900">
-              <a:buFont typeface="Courier New" panose="02070309020205020404" pitchFamily="49" charset="0"/>
-              <a:buChar char="o"/>
-            </a:pPr>
-            <a:r>
-              <a:rPr lang="en-US" sz="2400" dirty="0">
-                <a:solidFill>
-                  <a:schemeClr val="bg2">
-                    <a:lumMod val="25000"/>
-                  </a:schemeClr>
-                </a:solidFill>
-                <a:latin typeface="Rockwell Nova" panose="02060503020205020403" pitchFamily="18" charset="0"/>
-              </a:rPr>
-              <a:t>However, individual evaluation and filtering of features can not discover hidden interactions between features.</a:t>
-            </a:r>
-          </a:p>
-          <a:p>
-            <a:pPr marL="342900" indent="-342900">
-              <a:buFont typeface="Courier New" panose="02070309020205020404" pitchFamily="49" charset="0"/>
-              <a:buChar char="o"/>
-            </a:pPr>
-            <a:r>
-              <a:rPr lang="en-US" sz="2400" dirty="0">
-                <a:solidFill>
-                  <a:schemeClr val="bg2">
-                    <a:lumMod val="25000"/>
-                  </a:schemeClr>
-                </a:solidFill>
-                <a:latin typeface="Rockwell Nova" panose="02060503020205020403" pitchFamily="18" charset="0"/>
-              </a:rPr>
-              <a:t>As precaution, we used Recursive Feature Elimination technique to select best features.</a:t>
-            </a:r>
-          </a:p>
-          <a:p>
-            <a:pPr marL="342900" indent="-342900">
-              <a:buFont typeface="Courier New" panose="02070309020205020404" pitchFamily="49" charset="0"/>
-              <a:buChar char="o"/>
-            </a:pPr>
-            <a:r>
-              <a:rPr lang="en-US" sz="2400" dirty="0">
-                <a:solidFill>
-                  <a:schemeClr val="bg2">
-                    <a:lumMod val="25000"/>
-                  </a:schemeClr>
-                </a:solidFill>
-                <a:latin typeface="Rockwell Nova" panose="02060503020205020403" pitchFamily="18" charset="0"/>
-              </a:rPr>
-              <a:t>We trained and evaluated a Random Forest &amp; a Naïve Bayes model with 10-fold cross validation with different subsets of features &amp; selected the best one from them.</a:t>
-            </a:r>
-          </a:p>
-          <a:p>
-            <a:pPr marL="342900" indent="-342900">
-              <a:buFont typeface="Courier New" panose="02070309020205020404" pitchFamily="49" charset="0"/>
-              <a:buChar char="o"/>
-            </a:pPr>
-            <a:endParaRPr lang="en-US" sz="2400" dirty="0">
-              <a:solidFill>
-                <a:schemeClr val="bg2">
-                  <a:lumMod val="25000"/>
-                </a:schemeClr>
-              </a:solidFill>
-              <a:latin typeface="Rockwell Nova" panose="02060503020205020403" pitchFamily="18" charset="0"/>
-            </a:endParaRPr>
-          </a:p>
-          <a:p>
-            <a:pPr marL="342900" indent="-342900">
-              <a:buFont typeface="Courier New" panose="02070309020205020404" pitchFamily="49" charset="0"/>
-              <a:buChar char="o"/>
-            </a:pPr>
-            <a:endParaRPr lang="en-US" sz="2400" dirty="0">
-              <a:solidFill>
-                <a:schemeClr val="bg2">
-                  <a:lumMod val="25000"/>
-                </a:schemeClr>
-              </a:solidFill>
-              <a:latin typeface="Rockwell Nova" panose="02060503020205020403" pitchFamily="18" charset="0"/>
-            </a:endParaRPr>
-          </a:p>
-        </p:txBody>
-      </p:sp>
-      <p:sp>
-        <p:nvSpPr>
-          <p:cNvPr id="4" name="Date Placeholder 3">
-            <a:extLst>
-              <a:ext uri="{FF2B5EF4-FFF2-40B4-BE49-F238E27FC236}">
-                <a16:creationId xmlns:a16="http://schemas.microsoft.com/office/drawing/2014/main" id="{073D39D9-F71A-4C1E-A18F-01247A980266}"/>
-              </a:ext>
-            </a:extLst>
-          </p:cNvPr>
-          <p:cNvSpPr>
-            <a:spLocks noGrp="1"/>
-          </p:cNvSpPr>
-          <p:nvPr>
-            <p:ph type="dt" sz="half" idx="10"/>
-          </p:nvPr>
-        </p:nvSpPr>
-        <p:spPr/>
-        <p:txBody>
-          <a:bodyPr/>
-          <a:lstStyle/>
-          <a:p>
-            <a:r>
-              <a:rPr lang="en-US"/>
-              <a:t>12/4/2019</a:t>
-            </a:r>
-          </a:p>
-        </p:txBody>
-      </p:sp>
-      <p:sp>
-        <p:nvSpPr>
-          <p:cNvPr id="5" name="Slide Number Placeholder 4">
-            <a:extLst>
-              <a:ext uri="{FF2B5EF4-FFF2-40B4-BE49-F238E27FC236}">
-                <a16:creationId xmlns:a16="http://schemas.microsoft.com/office/drawing/2014/main" id="{B83B5B8B-B2BB-42F0-8C9F-0A36A51E1253}"/>
-              </a:ext>
-            </a:extLst>
-          </p:cNvPr>
-          <p:cNvSpPr>
-            <a:spLocks noGrp="1"/>
-          </p:cNvSpPr>
-          <p:nvPr>
-            <p:ph type="sldNum" sz="quarter" idx="12"/>
-          </p:nvPr>
-        </p:nvSpPr>
-        <p:spPr/>
-        <p:txBody>
-          <a:bodyPr/>
-          <a:lstStyle/>
-          <a:p>
-            <a:fld id="{87963F98-C10F-4FC1-8017-0839D2AC7CA3}" type="slidenum">
-              <a:rPr lang="en-US" smtClean="0"/>
-              <a:t>19</a:t>
-            </a:fld>
-            <a:endParaRPr lang="en-US"/>
-          </a:p>
-        </p:txBody>
-      </p:sp>
-    </p:spTree>
-    <p:extLst>
-      <p:ext uri="{BB962C8B-B14F-4D97-AF65-F5344CB8AC3E}">
-        <p14:creationId xmlns:p14="http://schemas.microsoft.com/office/powerpoint/2010/main" val="3571161464"/>
       </p:ext>
     </p:extLst>
   </p:cSld>
@@ -7952,7 +7976,7 @@
           <p:cNvPr id="2" name="Title 1">
             <a:extLst>
               <a:ext uri="{FF2B5EF4-FFF2-40B4-BE49-F238E27FC236}">
-                <a16:creationId xmlns:a16="http://schemas.microsoft.com/office/drawing/2014/main" id="{5E1A2851-B6DE-443C-B478-A5CE31ED592D}"/>
+                <a16:creationId xmlns:a16="http://schemas.microsoft.com/office/drawing/2014/main" id="{BB0D0921-96AE-4FEC-B1D7-21D5580C3F23}"/>
               </a:ext>
             </a:extLst>
           </p:cNvPr>
@@ -7977,19 +8001,144 @@
                     <a:lumMod val="50000"/>
                   </a:schemeClr>
                 </a:solidFill>
-                <a:latin typeface="Georgia Pro Cond" panose="02040506050405020303" pitchFamily="18" charset="0"/>
-              </a:rPr>
-              <a:t>MODELLING</a:t>
-            </a:r>
-          </a:p>
-        </p:txBody>
-      </p:sp>
-      <p:sp>
-        <p:nvSpPr>
-          <p:cNvPr id="3" name="Date Placeholder 2">
-            <a:extLst>
-              <a:ext uri="{FF2B5EF4-FFF2-40B4-BE49-F238E27FC236}">
-                <a16:creationId xmlns:a16="http://schemas.microsoft.com/office/drawing/2014/main" id="{6202BB9D-80AD-44A1-B3CA-66E5054E0B7C}"/>
+                <a:latin typeface="Rockwell Nova" panose="02060503020205020403" pitchFamily="18" charset="0"/>
+              </a:rPr>
+              <a:t>FEATURE SELECTION</a:t>
+            </a:r>
+          </a:p>
+        </p:txBody>
+      </p:sp>
+      <p:sp>
+        <p:nvSpPr>
+          <p:cNvPr id="3" name="TextBox 2">
+            <a:extLst>
+              <a:ext uri="{FF2B5EF4-FFF2-40B4-BE49-F238E27FC236}">
+                <a16:creationId xmlns:a16="http://schemas.microsoft.com/office/drawing/2014/main" id="{844C0F2F-D499-47DB-987F-E7D869D73F1C}"/>
+              </a:ext>
+            </a:extLst>
+          </p:cNvPr>
+          <p:cNvSpPr txBox="1"/>
+          <p:nvPr/>
+        </p:nvSpPr>
+        <p:spPr>
+          <a:xfrm>
+            <a:off x="838200" y="1586204"/>
+            <a:ext cx="10993016" cy="4154984"/>
+          </a:xfrm>
+          <a:prstGeom prst="rect">
+            <a:avLst/>
+          </a:prstGeom>
+          <a:noFill/>
+        </p:spPr>
+        <p:txBody>
+          <a:bodyPr wrap="square" rtlCol="0">
+            <a:spAutoFit/>
+          </a:bodyPr>
+          <a:lstStyle/>
+          <a:p>
+            <a:pPr marL="342900" indent="-342900">
+              <a:buFont typeface="Courier New" panose="02070309020205020404" pitchFamily="49" charset="0"/>
+              <a:buChar char="o"/>
+            </a:pPr>
+            <a:r>
+              <a:rPr lang="en-US" sz="2400" dirty="0">
+                <a:solidFill>
+                  <a:schemeClr val="bg2">
+                    <a:lumMod val="25000"/>
+                  </a:schemeClr>
+                </a:solidFill>
+                <a:latin typeface="Rockwell Nova" panose="02060503020205020403" pitchFamily="18" charset="0"/>
+              </a:rPr>
+              <a:t>From the exploratory analysis part, we found that Cholesterol, Blood Pressure, Weight, and Age explains the outcomes better.</a:t>
+            </a:r>
+          </a:p>
+          <a:p>
+            <a:pPr marL="342900" indent="-342900">
+              <a:buFont typeface="Courier New" panose="02070309020205020404" pitchFamily="49" charset="0"/>
+              <a:buChar char="o"/>
+            </a:pPr>
+            <a:r>
+              <a:rPr lang="en-US" sz="2400" dirty="0">
+                <a:solidFill>
+                  <a:schemeClr val="bg2">
+                    <a:lumMod val="25000"/>
+                  </a:schemeClr>
+                </a:solidFill>
+                <a:latin typeface="Rockwell Nova" panose="02060503020205020403" pitchFamily="18" charset="0"/>
+              </a:rPr>
+              <a:t>However, individual evaluation and filtering of features can not discover hidden interactions between features.</a:t>
+            </a:r>
+          </a:p>
+          <a:p>
+            <a:pPr marL="342900" indent="-342900">
+              <a:buFont typeface="Courier New" panose="02070309020205020404" pitchFamily="49" charset="0"/>
+              <a:buChar char="o"/>
+            </a:pPr>
+            <a:r>
+              <a:rPr lang="en-US" sz="2400" dirty="0">
+                <a:solidFill>
+                  <a:schemeClr val="bg2">
+                    <a:lumMod val="25000"/>
+                  </a:schemeClr>
+                </a:solidFill>
+                <a:latin typeface="Rockwell Nova" panose="02060503020205020403" pitchFamily="18" charset="0"/>
+              </a:rPr>
+              <a:t>As precaution, we used Recursive Feature Elimination technique to select best features.</a:t>
+            </a:r>
+          </a:p>
+          <a:p>
+            <a:pPr marL="342900" indent="-342900">
+              <a:buFont typeface="Courier New" panose="02070309020205020404" pitchFamily="49" charset="0"/>
+              <a:buChar char="o"/>
+            </a:pPr>
+            <a:r>
+              <a:rPr lang="en-US" sz="2400" dirty="0">
+                <a:solidFill>
+                  <a:schemeClr val="bg2">
+                    <a:lumMod val="25000"/>
+                  </a:schemeClr>
+                </a:solidFill>
+                <a:latin typeface="Rockwell Nova" panose="02060503020205020403" pitchFamily="18" charset="0"/>
+              </a:rPr>
+              <a:t>We trained and evaluated a Random Forest &amp; a Naïve Bayes model with 10-fold cross validation with different subsets of features &amp; selected the best one from them.</a:t>
+            </a:r>
+          </a:p>
+          <a:p>
+            <a:pPr marL="342900" indent="-342900">
+              <a:buFont typeface="Courier New" panose="02070309020205020404" pitchFamily="49" charset="0"/>
+              <a:buChar char="o"/>
+            </a:pPr>
+            <a:endParaRPr lang="en-US" sz="2400" dirty="0">
+              <a:solidFill>
+                <a:schemeClr val="bg2">
+                  <a:lumMod val="25000"/>
+                </a:schemeClr>
+              </a:solidFill>
+              <a:latin typeface="Rockwell Nova" panose="02060503020205020403" pitchFamily="18" charset="0"/>
+            </a:endParaRPr>
+          </a:p>
+          <a:p>
+            <a:pPr marL="342900" indent="-342900">
+              <a:buFont typeface="Courier New" panose="02070309020205020404" pitchFamily="49" charset="0"/>
+              <a:buChar char="o"/>
+            </a:pPr>
+            <a:endParaRPr lang="en-US" sz="2400" dirty="0">
+              <a:solidFill>
+                <a:schemeClr val="bg2">
+                  <a:lumMod val="25000"/>
+                </a:schemeClr>
+              </a:solidFill>
+              <a:latin typeface="Rockwell Nova" panose="02060503020205020403" pitchFamily="18" charset="0"/>
+            </a:endParaRPr>
+          </a:p>
+        </p:txBody>
+      </p:sp>
+      <p:sp>
+        <p:nvSpPr>
+          <p:cNvPr id="4" name="Date Placeholder 3">
+            <a:extLst>
+              <a:ext uri="{FF2B5EF4-FFF2-40B4-BE49-F238E27FC236}">
+                <a16:creationId xmlns:a16="http://schemas.microsoft.com/office/drawing/2014/main" id="{073D39D9-F71A-4C1E-A18F-01247A980266}"/>
               </a:ext>
             </a:extLst>
           </p:cNvPr>
@@ -8017,7 +8166,7 @@
           <p:cNvPr id="5" name="Slide Number Placeholder 4">
             <a:extLst>
               <a:ext uri="{FF2B5EF4-FFF2-40B4-BE49-F238E27FC236}">
-                <a16:creationId xmlns:a16="http://schemas.microsoft.com/office/drawing/2014/main" id="{4646DC2E-D261-4A96-ACC8-B6992B7CB69A}"/>
+                <a16:creationId xmlns:a16="http://schemas.microsoft.com/office/drawing/2014/main" id="{B83B5B8B-B2BB-42F0-8C9F-0A36A51E1253}"/>
               </a:ext>
             </a:extLst>
           </p:cNvPr>
@@ -8044,7 +8193,7 @@
     </p:spTree>
     <p:extLst>
       <p:ext uri="{BB962C8B-B14F-4D97-AF65-F5344CB8AC3E}">
-        <p14:creationId xmlns:p14="http://schemas.microsoft.com/office/powerpoint/2010/main" val="1422923119"/>
+        <p14:creationId xmlns:p14="http://schemas.microsoft.com/office/powerpoint/2010/main" val="3571161464"/>
       </p:ext>
     </p:extLst>
   </p:cSld>
@@ -8103,6 +8252,130 @@
                 </a:solidFill>
                 <a:latin typeface="Georgia Pro Cond" panose="02040506050405020303" pitchFamily="18" charset="0"/>
               </a:rPr>
+              <a:t>MODELLING</a:t>
+            </a:r>
+          </a:p>
+        </p:txBody>
+      </p:sp>
+      <p:sp>
+        <p:nvSpPr>
+          <p:cNvPr id="3" name="Date Placeholder 2">
+            <a:extLst>
+              <a:ext uri="{FF2B5EF4-FFF2-40B4-BE49-F238E27FC236}">
+                <a16:creationId xmlns:a16="http://schemas.microsoft.com/office/drawing/2014/main" id="{6202BB9D-80AD-44A1-B3CA-66E5054E0B7C}"/>
+              </a:ext>
+            </a:extLst>
+          </p:cNvPr>
+          <p:cNvSpPr>
+            <a:spLocks noGrp="1"/>
+          </p:cNvSpPr>
+          <p:nvPr>
+            <p:ph type="dt" sz="half" idx="10"/>
+          </p:nvPr>
+        </p:nvSpPr>
+        <p:spPr/>
+        <p:txBody>
+          <a:bodyPr/>
+          <a:lstStyle/>
+          <a:p>
+            <a:r>
+              <a:rPr lang="en-US"/>
+              <a:t>12/4/2019</a:t>
+            </a:r>
+          </a:p>
+        </p:txBody>
+      </p:sp>
+      <p:sp>
+        <p:nvSpPr>
+          <p:cNvPr id="5" name="Slide Number Placeholder 4">
+            <a:extLst>
+              <a:ext uri="{FF2B5EF4-FFF2-40B4-BE49-F238E27FC236}">
+                <a16:creationId xmlns:a16="http://schemas.microsoft.com/office/drawing/2014/main" id="{4646DC2E-D261-4A96-ACC8-B6992B7CB69A}"/>
+              </a:ext>
+            </a:extLst>
+          </p:cNvPr>
+          <p:cNvSpPr>
+            <a:spLocks noGrp="1"/>
+          </p:cNvSpPr>
+          <p:nvPr>
+            <p:ph type="sldNum" sz="quarter" idx="12"/>
+          </p:nvPr>
+        </p:nvSpPr>
+        <p:spPr/>
+        <p:txBody>
+          <a:bodyPr/>
+          <a:lstStyle/>
+          <a:p>
+            <a:fld id="{87963F98-C10F-4FC1-8017-0839D2AC7CA3}" type="slidenum">
+              <a:rPr lang="en-US" smtClean="0"/>
+              <a:t>21</a:t>
+            </a:fld>
+            <a:endParaRPr lang="en-US"/>
+          </a:p>
+        </p:txBody>
+      </p:sp>
+    </p:spTree>
+    <p:extLst>
+      <p:ext uri="{BB962C8B-B14F-4D97-AF65-F5344CB8AC3E}">
+        <p14:creationId xmlns:p14="http://schemas.microsoft.com/office/powerpoint/2010/main" val="1422923119"/>
+      </p:ext>
+    </p:extLst>
+  </p:cSld>
+  <p:clrMapOvr>
+    <a:masterClrMapping/>
+  </p:clrMapOvr>
+</p:sld>
+</file>
+
+<file path=ppt/slides/slide22.xml><?xml version="1.0" encoding="utf-8"?>
+<p:sld xmlns:a="http://schemas.openxmlformats.org/drawingml/2006/main" xmlns:r="http://schemas.openxmlformats.org/officeDocument/2006/relationships" xmlns:p="http://schemas.openxmlformats.org/presentationml/2006/main">
+  <p:cSld>
+    <p:spTree>
+      <p:nvGrpSpPr>
+        <p:cNvPr id="1" name=""/>
+        <p:cNvGrpSpPr/>
+        <p:nvPr/>
+      </p:nvGrpSpPr>
+      <p:grpSpPr>
+        <a:xfrm>
+          <a:off x="0" y="0"/>
+          <a:ext cx="0" cy="0"/>
+          <a:chOff x="0" y="0"/>
+          <a:chExt cx="0" cy="0"/>
+        </a:xfrm>
+      </p:grpSpPr>
+      <p:sp>
+        <p:nvSpPr>
+          <p:cNvPr id="2" name="Title 1">
+            <a:extLst>
+              <a:ext uri="{FF2B5EF4-FFF2-40B4-BE49-F238E27FC236}">
+                <a16:creationId xmlns:a16="http://schemas.microsoft.com/office/drawing/2014/main" id="{5E1A2851-B6DE-443C-B478-A5CE31ED592D}"/>
+              </a:ext>
+            </a:extLst>
+          </p:cNvPr>
+          <p:cNvSpPr>
+            <a:spLocks noGrp="1"/>
+          </p:cNvSpPr>
+          <p:nvPr>
+            <p:ph type="title"/>
+          </p:nvPr>
+        </p:nvSpPr>
+        <p:spPr/>
+        <p:txBody>
+          <a:bodyPr>
+            <a:normAutofit/>
+          </a:bodyPr>
+          <a:lstStyle/>
+          <a:p>
+            <a:r>
+              <a:rPr lang="en-US" sz="3200" dirty="0">
+                <a:solidFill>
+                  <a:schemeClr val="accent1">
+                    <a:lumMod val="50000"/>
+                  </a:schemeClr>
+                </a:solidFill>
+                <a:latin typeface="Georgia Pro Cond" panose="02040506050405020303" pitchFamily="18" charset="0"/>
+              </a:rPr>
               <a:t>EVALUATION</a:t>
             </a:r>
           </a:p>
@@ -8195,7 +8468,7 @@
           <a:p>
             <a:fld id="{87963F98-C10F-4FC1-8017-0839D2AC7CA3}" type="slidenum">
               <a:rPr lang="en-US" smtClean="0"/>
-              <a:t>21</a:t>
+              <a:t>22</a:t>
             </a:fld>
             <a:endParaRPr lang="en-US"/>
           </a:p>
@@ -9180,7 +9453,7 @@
                 </a:solidFill>
                 <a:latin typeface="Rockwell Nova" panose="02060503020205020403" pitchFamily="18" charset="0"/>
               </a:rPr>
-              <a:t>We want to improve the sensitivity of cardiovascular disease prediction model at least 1% from 61.11%.</a:t>
+              <a:t>We want to improve the sensitivity of cardiovascular disease prediction model at least 1% from 61.17%.</a:t>
             </a:r>
           </a:p>
           <a:p>
@@ -9709,7 +9982,7 @@
           <p:cNvPr id="2" name="Title 1">
             <a:extLst>
               <a:ext uri="{FF2B5EF4-FFF2-40B4-BE49-F238E27FC236}">
-                <a16:creationId xmlns:a16="http://schemas.microsoft.com/office/drawing/2014/main" id="{512EA9F0-EACB-4E34-ADF6-58C865CC56FE}"/>
+                <a16:creationId xmlns:a16="http://schemas.microsoft.com/office/drawing/2014/main" id="{BB0D0921-96AE-4FEC-B1D7-21D5580C3F23}"/>
               </a:ext>
             </a:extLst>
           </p:cNvPr>
@@ -9720,12 +9993,7 @@
             <p:ph type="title"/>
           </p:nvPr>
         </p:nvSpPr>
-        <p:spPr>
-          <a:xfrm>
-            <a:off x="838200" y="365125"/>
-            <a:ext cx="10515600" cy="1325563"/>
-          </a:xfrm>
-        </p:spPr>
+        <p:spPr/>
         <p:txBody>
           <a:bodyPr>
             <a:normAutofit/>
@@ -9741,36 +10009,17 @@
                 </a:solidFill>
                 <a:latin typeface="Rockwell Nova" panose="02060503020205020403" pitchFamily="18" charset="0"/>
               </a:rPr>
-              <a:t>DATA EXPLORATION </a:t>
-            </a:r>
-            <a:r>
-              <a:rPr lang="en-US" sz="2000" dirty="0">
-                <a:solidFill>
-                  <a:schemeClr val="accent1">
-                    <a:lumMod val="50000"/>
-                  </a:schemeClr>
-                </a:solidFill>
-                <a:latin typeface="Rockwell Nova" panose="02060503020205020403" pitchFamily="18" charset="0"/>
-              </a:rPr>
-              <a:t>(Summary Statistics)</a:t>
-            </a:r>
-            <a:endParaRPr lang="en-US" sz="3200" dirty="0">
-              <a:solidFill>
-                <a:schemeClr val="accent1">
-                  <a:lumMod val="50000"/>
-                </a:schemeClr>
-              </a:solidFill>
-              <a:latin typeface="Rockwell Nova" panose="02060503020205020403" pitchFamily="18" charset="0"/>
-            </a:endParaRPr>
-          </a:p>
-        </p:txBody>
-      </p:sp>
-      <p:sp>
-        <p:nvSpPr>
-          <p:cNvPr id="3" name="Date Placeholder 2">
-            <a:extLst>
-              <a:ext uri="{FF2B5EF4-FFF2-40B4-BE49-F238E27FC236}">
-                <a16:creationId xmlns:a16="http://schemas.microsoft.com/office/drawing/2014/main" id="{23C3AC0D-1883-489E-94CC-C78C43267E4B}"/>
+              <a:t>DATA COLLECTION &amp; PREPROCESSING</a:t>
+            </a:r>
+          </a:p>
+        </p:txBody>
+      </p:sp>
+      <p:sp>
+        <p:nvSpPr>
+          <p:cNvPr id="4" name="Date Placeholder 3">
+            <a:extLst>
+              <a:ext uri="{FF2B5EF4-FFF2-40B4-BE49-F238E27FC236}">
+                <a16:creationId xmlns:a16="http://schemas.microsoft.com/office/drawing/2014/main" id="{073D39D9-F71A-4C1E-A18F-01247A980266}"/>
               </a:ext>
             </a:extLst>
           </p:cNvPr>
@@ -9781,12 +10030,7 @@
             <p:ph type="dt" sz="half" idx="10"/>
           </p:nvPr>
         </p:nvSpPr>
-        <p:spPr>
-          <a:xfrm>
-            <a:off x="838200" y="6356350"/>
-            <a:ext cx="2743200" cy="365125"/>
-          </a:xfrm>
-        </p:spPr>
+        <p:spPr/>
         <p:txBody>
           <a:bodyPr/>
           <a:lstStyle/>
@@ -9803,7 +10047,7 @@
           <p:cNvPr id="5" name="Slide Number Placeholder 4">
             <a:extLst>
               <a:ext uri="{FF2B5EF4-FFF2-40B4-BE49-F238E27FC236}">
-                <a16:creationId xmlns:a16="http://schemas.microsoft.com/office/drawing/2014/main" id="{6A598B4C-F27D-4381-AE08-1CF3CADEB7C4}"/>
+                <a16:creationId xmlns:a16="http://schemas.microsoft.com/office/drawing/2014/main" id="{B83B5B8B-B2BB-42F0-8C9F-0A36A51E1253}"/>
               </a:ext>
             </a:extLst>
           </p:cNvPr>
@@ -9814,12 +10058,7 @@
             <p:ph type="sldNum" sz="quarter" idx="12"/>
           </p:nvPr>
         </p:nvSpPr>
-        <p:spPr>
-          <a:xfrm>
-            <a:off x="8610600" y="6356350"/>
-            <a:ext cx="2743200" cy="365125"/>
-          </a:xfrm>
-        </p:spPr>
+        <p:spPr/>
         <p:txBody>
           <a:bodyPr/>
           <a:lstStyle/>
@@ -9832,88 +10071,716 @@
           </a:p>
         </p:txBody>
       </p:sp>
-      <p:pic>
-        <p:nvPicPr>
-          <p:cNvPr id="11" name="Picture 10" descr="A screenshot of a cell phone&#10;&#10;Description automatically generated">
-            <a:extLst>
-              <a:ext uri="{FF2B5EF4-FFF2-40B4-BE49-F238E27FC236}">
-                <a16:creationId xmlns:a16="http://schemas.microsoft.com/office/drawing/2014/main" id="{E057102B-D1A5-4868-9E59-EE64B3EB5D3A}"/>
-              </a:ext>
-            </a:extLst>
-          </p:cNvPr>
-          <p:cNvPicPr>
-            <a:picLocks noChangeAspect="1"/>
-          </p:cNvPicPr>
-          <p:nvPr/>
-        </p:nvPicPr>
-        <p:blipFill>
-          <a:blip r:embed="rId3">
-            <a:extLst>
-              <a:ext uri="{28A0092B-C50C-407E-A947-70E740481C1C}">
-                <a14:useLocalDpi xmlns:a14="http://schemas.microsoft.com/office/drawing/2010/main" val="0"/>
-              </a:ext>
-            </a:extLst>
-          </a:blip>
-          <a:stretch>
-            <a:fillRect/>
-          </a:stretch>
-        </p:blipFill>
-        <p:spPr>
-          <a:xfrm>
-            <a:off x="898373" y="1690688"/>
-            <a:ext cx="10455427" cy="3078738"/>
-          </a:xfrm>
-          <a:prstGeom prst="rect">
-            <a:avLst/>
-          </a:prstGeom>
-        </p:spPr>
-      </p:pic>
-      <p:sp>
-        <p:nvSpPr>
-          <p:cNvPr id="13" name="TextBox 12">
-            <a:extLst>
-              <a:ext uri="{FF2B5EF4-FFF2-40B4-BE49-F238E27FC236}">
-                <a16:creationId xmlns:a16="http://schemas.microsoft.com/office/drawing/2014/main" id="{DF6940E6-3A9C-47AC-B7C7-F29F83BEB94E}"/>
-              </a:ext>
-            </a:extLst>
-          </p:cNvPr>
-          <p:cNvSpPr txBox="1"/>
-          <p:nvPr/>
-        </p:nvSpPr>
-        <p:spPr>
-          <a:xfrm>
-            <a:off x="898373" y="4973216"/>
-            <a:ext cx="10515600" cy="830997"/>
-          </a:xfrm>
-          <a:prstGeom prst="rect">
-            <a:avLst/>
-          </a:prstGeom>
-          <a:noFill/>
-        </p:spPr>
-        <p:txBody>
-          <a:bodyPr wrap="square" rtlCol="0">
-            <a:spAutoFit/>
-          </a:bodyPr>
-          <a:lstStyle/>
-          <a:p>
-            <a:r>
-              <a:rPr lang="en-US" sz="2400" dirty="0">
-                <a:solidFill>
-                  <a:schemeClr val="bg2">
-                    <a:lumMod val="25000"/>
-                  </a:schemeClr>
-                </a:solidFill>
-                <a:latin typeface="Rockwell Nova" panose="02060503020205020403" pitchFamily="18" charset="0"/>
-              </a:rPr>
-              <a:t>It was evident from summary statistics that “Systole” &amp; “Diastole” had invalid negative values, and BMI had outliers.</a:t>
-            </a:r>
-          </a:p>
-        </p:txBody>
-      </p:sp>
+      <p:graphicFrame>
+        <p:nvGraphicFramePr>
+          <p:cNvPr id="6" name="Table 6">
+            <a:extLst>
+              <a:ext uri="{FF2B5EF4-FFF2-40B4-BE49-F238E27FC236}">
+                <a16:creationId xmlns:a16="http://schemas.microsoft.com/office/drawing/2014/main" id="{ECA31362-4F02-414D-94B5-65C85A22471F}"/>
+              </a:ext>
+            </a:extLst>
+          </p:cNvPr>
+          <p:cNvGraphicFramePr>
+            <a:graphicFrameLocks noGrp="1"/>
+          </p:cNvGraphicFramePr>
+          <p:nvPr>
+            <p:extLst>
+              <p:ext uri="{D42A27DB-BD31-4B8C-83A1-F6EECF244321}">
+                <p14:modId xmlns:p14="http://schemas.microsoft.com/office/powerpoint/2010/main" val="4214043149"/>
+              </p:ext>
+            </p:extLst>
+          </p:nvPr>
+        </p:nvGraphicFramePr>
+        <p:xfrm>
+          <a:off x="6096000" y="1446467"/>
+          <a:ext cx="4803712" cy="4796013"/>
+        </p:xfrm>
+        <a:graphic>
+          <a:graphicData uri="http://schemas.openxmlformats.org/drawingml/2006/table">
+            <a:tbl>
+              <a:tblPr firstRow="1" bandRow="1">
+                <a:tableStyleId>{5C22544A-7EE6-4342-B048-85BDC9FD1C3A}</a:tableStyleId>
+              </a:tblPr>
+              <a:tblGrid>
+                <a:gridCol w="2401856">
+                  <a:extLst>
+                    <a:ext uri="{9D8B030D-6E8A-4147-A177-3AD203B41FA5}">
+                      <a16:colId xmlns:a16="http://schemas.microsoft.com/office/drawing/2014/main" val="2061229163"/>
+                    </a:ext>
+                  </a:extLst>
+                </a:gridCol>
+                <a:gridCol w="2401856">
+                  <a:extLst>
+                    <a:ext uri="{9D8B030D-6E8A-4147-A177-3AD203B41FA5}">
+                      <a16:colId xmlns:a16="http://schemas.microsoft.com/office/drawing/2014/main" val="194036185"/>
+                    </a:ext>
+                  </a:extLst>
+                </a:gridCol>
+              </a:tblGrid>
+              <a:tr h="429055">
+                <a:tc>
+                  <a:txBody>
+                    <a:bodyPr/>
+                    <a:lstStyle/>
+                    <a:p>
+                      <a:r>
+                        <a:rPr lang="en-US" dirty="0">
+                          <a:latin typeface="Rockwell Nova" panose="02060503020205020403" pitchFamily="18" charset="0"/>
+                        </a:rPr>
+                        <a:t>Feature</a:t>
+                      </a:r>
+                    </a:p>
+                  </a:txBody>
+                  <a:tcPr/>
+                </a:tc>
+                <a:tc>
+                  <a:txBody>
+                    <a:bodyPr/>
+                    <a:lstStyle/>
+                    <a:p>
+                      <a:r>
+                        <a:rPr lang="en-US" dirty="0">
+                          <a:latin typeface="Rockwell Nova" panose="02060503020205020403" pitchFamily="18" charset="0"/>
+                        </a:rPr>
+                        <a:t>Data Type</a:t>
+                      </a:r>
+                    </a:p>
+                  </a:txBody>
+                  <a:tcPr/>
+                </a:tc>
+                <a:extLst>
+                  <a:ext uri="{0D108BD9-81ED-4DB2-BD59-A6C34878D82A}">
+                    <a16:rowId xmlns:a16="http://schemas.microsoft.com/office/drawing/2014/main" val="3030823547"/>
+                  </a:ext>
+                </a:extLst>
+              </a:tr>
+              <a:tr h="429055">
+                <a:tc>
+                  <a:txBody>
+                    <a:bodyPr/>
+                    <a:lstStyle/>
+                    <a:p>
+                      <a:r>
+                        <a:rPr lang="en-US" dirty="0">
+                          <a:latin typeface="Rockwell Nova" panose="02060503020205020403" pitchFamily="18" charset="0"/>
+                        </a:rPr>
+                        <a:t>Age (Years)</a:t>
+                      </a:r>
+                    </a:p>
+                  </a:txBody>
+                  <a:tcPr/>
+                </a:tc>
+                <a:tc>
+                  <a:txBody>
+                    <a:bodyPr/>
+                    <a:lstStyle/>
+                    <a:p>
+                      <a:r>
+                        <a:rPr lang="en-US" dirty="0">
+                          <a:latin typeface="Rockwell Nova" panose="02060503020205020403" pitchFamily="18" charset="0"/>
+                        </a:rPr>
+                        <a:t>Numeric</a:t>
+                      </a:r>
+                    </a:p>
+                  </a:txBody>
+                  <a:tcPr/>
+                </a:tc>
+                <a:extLst>
+                  <a:ext uri="{0D108BD9-81ED-4DB2-BD59-A6C34878D82A}">
+                    <a16:rowId xmlns:a16="http://schemas.microsoft.com/office/drawing/2014/main" val="4098308417"/>
+                  </a:ext>
+                </a:extLst>
+              </a:tr>
+              <a:tr h="429055">
+                <a:tc>
+                  <a:txBody>
+                    <a:bodyPr/>
+                    <a:lstStyle/>
+                    <a:p>
+                      <a:r>
+                        <a:rPr lang="en-US" dirty="0">
+                          <a:latin typeface="Rockwell Nova" panose="02060503020205020403" pitchFamily="18" charset="0"/>
+                        </a:rPr>
+                        <a:t>Height (CM)</a:t>
+                      </a:r>
+                    </a:p>
+                  </a:txBody>
+                  <a:tcPr/>
+                </a:tc>
+                <a:tc>
+                  <a:txBody>
+                    <a:bodyPr/>
+                    <a:lstStyle/>
+                    <a:p>
+                      <a:r>
+                        <a:rPr lang="en-US" dirty="0">
+                          <a:latin typeface="Rockwell Nova" panose="02060503020205020403" pitchFamily="18" charset="0"/>
+                        </a:rPr>
+                        <a:t>Numeric</a:t>
+                      </a:r>
+                    </a:p>
+                  </a:txBody>
+                  <a:tcPr/>
+                </a:tc>
+                <a:extLst>
+                  <a:ext uri="{0D108BD9-81ED-4DB2-BD59-A6C34878D82A}">
+                    <a16:rowId xmlns:a16="http://schemas.microsoft.com/office/drawing/2014/main" val="3184452191"/>
+                  </a:ext>
+                </a:extLst>
+              </a:tr>
+              <a:tr h="429055">
+                <a:tc>
+                  <a:txBody>
+                    <a:bodyPr/>
+                    <a:lstStyle/>
+                    <a:p>
+                      <a:r>
+                        <a:rPr lang="en-US" dirty="0">
+                          <a:latin typeface="Rockwell Nova" panose="02060503020205020403" pitchFamily="18" charset="0"/>
+                        </a:rPr>
+                        <a:t>Weight (KG)</a:t>
+                      </a:r>
+                    </a:p>
+                  </a:txBody>
+                  <a:tcPr/>
+                </a:tc>
+                <a:tc>
+                  <a:txBody>
+                    <a:bodyPr/>
+                    <a:lstStyle/>
+                    <a:p>
+                      <a:r>
+                        <a:rPr lang="en-US" dirty="0">
+                          <a:latin typeface="Rockwell Nova" panose="02060503020205020403" pitchFamily="18" charset="0"/>
+                        </a:rPr>
+                        <a:t>Numeric</a:t>
+                      </a:r>
+                    </a:p>
+                  </a:txBody>
+                  <a:tcPr/>
+                </a:tc>
+                <a:extLst>
+                  <a:ext uri="{0D108BD9-81ED-4DB2-BD59-A6C34878D82A}">
+                    <a16:rowId xmlns:a16="http://schemas.microsoft.com/office/drawing/2014/main" val="2652165683"/>
+                  </a:ext>
+                </a:extLst>
+              </a:tr>
+              <a:tr h="429055">
+                <a:tc>
+                  <a:txBody>
+                    <a:bodyPr/>
+                    <a:lstStyle/>
+                    <a:p>
+                      <a:r>
+                        <a:rPr lang="en-US" dirty="0">
+                          <a:latin typeface="Rockwell Nova" panose="02060503020205020403" pitchFamily="18" charset="0"/>
+                        </a:rPr>
+                        <a:t>Systole (mmHg)</a:t>
+                      </a:r>
+                    </a:p>
+                  </a:txBody>
+                  <a:tcPr/>
+                </a:tc>
+                <a:tc>
+                  <a:txBody>
+                    <a:bodyPr/>
+                    <a:lstStyle/>
+                    <a:p>
+                      <a:r>
+                        <a:rPr lang="en-US" dirty="0">
+                          <a:latin typeface="Rockwell Nova" panose="02060503020205020403" pitchFamily="18" charset="0"/>
+                        </a:rPr>
+                        <a:t>Numeric</a:t>
+                      </a:r>
+                    </a:p>
+                  </a:txBody>
+                  <a:tcPr/>
+                </a:tc>
+                <a:extLst>
+                  <a:ext uri="{0D108BD9-81ED-4DB2-BD59-A6C34878D82A}">
+                    <a16:rowId xmlns:a16="http://schemas.microsoft.com/office/drawing/2014/main" val="2817221947"/>
+                  </a:ext>
+                </a:extLst>
+              </a:tr>
+              <a:tr h="740561">
+                <a:tc>
+                  <a:txBody>
+                    <a:bodyPr/>
+                    <a:lstStyle/>
+                    <a:p>
+                      <a:r>
+                        <a:rPr lang="en-US" dirty="0">
+                          <a:latin typeface="Rockwell Nova" panose="02060503020205020403" pitchFamily="18" charset="0"/>
+                        </a:rPr>
+                        <a:t>Diastole (mmHg)</a:t>
+                      </a:r>
+                    </a:p>
+                  </a:txBody>
+                  <a:tcPr/>
+                </a:tc>
+                <a:tc>
+                  <a:txBody>
+                    <a:bodyPr/>
+                    <a:lstStyle/>
+                    <a:p>
+                      <a:r>
+                        <a:rPr lang="en-US" dirty="0">
+                          <a:latin typeface="Rockwell Nova" panose="02060503020205020403" pitchFamily="18" charset="0"/>
+                        </a:rPr>
+                        <a:t>Numeric</a:t>
+                      </a:r>
+                    </a:p>
+                  </a:txBody>
+                  <a:tcPr/>
+                </a:tc>
+                <a:extLst>
+                  <a:ext uri="{0D108BD9-81ED-4DB2-BD59-A6C34878D82A}">
+                    <a16:rowId xmlns:a16="http://schemas.microsoft.com/office/drawing/2014/main" val="2400888008"/>
+                  </a:ext>
+                </a:extLst>
+              </a:tr>
+              <a:tr h="429055">
+                <a:tc>
+                  <a:txBody>
+                    <a:bodyPr/>
+                    <a:lstStyle/>
+                    <a:p>
+                      <a:r>
+                        <a:rPr lang="en-US" dirty="0">
+                          <a:latin typeface="Rockwell Nova" panose="02060503020205020403" pitchFamily="18" charset="0"/>
+                        </a:rPr>
+                        <a:t>BMI</a:t>
+                      </a:r>
+                    </a:p>
+                  </a:txBody>
+                  <a:tcPr/>
+                </a:tc>
+                <a:tc>
+                  <a:txBody>
+                    <a:bodyPr/>
+                    <a:lstStyle/>
+                    <a:p>
+                      <a:r>
+                        <a:rPr lang="en-US" dirty="0">
+                          <a:latin typeface="Rockwell Nova" panose="02060503020205020403" pitchFamily="18" charset="0"/>
+                        </a:rPr>
+                        <a:t>Numeric</a:t>
+                      </a:r>
+                    </a:p>
+                  </a:txBody>
+                  <a:tcPr/>
+                </a:tc>
+                <a:extLst>
+                  <a:ext uri="{0D108BD9-81ED-4DB2-BD59-A6C34878D82A}">
+                    <a16:rowId xmlns:a16="http://schemas.microsoft.com/office/drawing/2014/main" val="271962487"/>
+                  </a:ext>
+                </a:extLst>
+              </a:tr>
+              <a:tr h="740561">
+                <a:tc>
+                  <a:txBody>
+                    <a:bodyPr/>
+                    <a:lstStyle/>
+                    <a:p>
+                      <a:r>
+                        <a:rPr lang="en-US" dirty="0">
+                          <a:latin typeface="Rockwell Nova" panose="02060503020205020403" pitchFamily="18" charset="0"/>
+                        </a:rPr>
+                        <a:t>Active</a:t>
+                      </a:r>
+                    </a:p>
+                  </a:txBody>
+                  <a:tcPr/>
+                </a:tc>
+                <a:tc>
+                  <a:txBody>
+                    <a:bodyPr/>
+                    <a:lstStyle/>
+                    <a:p>
+                      <a:r>
+                        <a:rPr lang="en-US" dirty="0">
+                          <a:latin typeface="Rockwell Nova" panose="02060503020205020403" pitchFamily="18" charset="0"/>
+                        </a:rPr>
+                        <a:t>Factor (Active, Inactive)</a:t>
+                      </a:r>
+                    </a:p>
+                  </a:txBody>
+                  <a:tcPr/>
+                </a:tc>
+                <a:extLst>
+                  <a:ext uri="{0D108BD9-81ED-4DB2-BD59-A6C34878D82A}">
+                    <a16:rowId xmlns:a16="http://schemas.microsoft.com/office/drawing/2014/main" val="1975659293"/>
+                  </a:ext>
+                </a:extLst>
+              </a:tr>
+              <a:tr h="740561">
+                <a:tc>
+                  <a:txBody>
+                    <a:bodyPr/>
+                    <a:lstStyle/>
+                    <a:p>
+                      <a:r>
+                        <a:rPr lang="en-US" dirty="0">
+                          <a:latin typeface="Rockwell Nova" panose="02060503020205020403" pitchFamily="18" charset="0"/>
+                        </a:rPr>
+                        <a:t>Target</a:t>
+                      </a:r>
+                    </a:p>
+                  </a:txBody>
+                  <a:tcPr/>
+                </a:tc>
+                <a:tc>
+                  <a:txBody>
+                    <a:bodyPr/>
+                    <a:lstStyle/>
+                    <a:p>
+                      <a:r>
+                        <a:rPr lang="en-US" dirty="0">
+                          <a:latin typeface="Rockwell Nova" panose="02060503020205020403" pitchFamily="18" charset="0"/>
+                        </a:rPr>
+                        <a:t>Factor (Positive, Negative)</a:t>
+                      </a:r>
+                    </a:p>
+                  </a:txBody>
+                  <a:tcPr/>
+                </a:tc>
+                <a:extLst>
+                  <a:ext uri="{0D108BD9-81ED-4DB2-BD59-A6C34878D82A}">
+                    <a16:rowId xmlns:a16="http://schemas.microsoft.com/office/drawing/2014/main" val="1469065141"/>
+                  </a:ext>
+                </a:extLst>
+              </a:tr>
+            </a:tbl>
+          </a:graphicData>
+        </a:graphic>
+      </p:graphicFrame>
+      <p:graphicFrame>
+        <p:nvGraphicFramePr>
+          <p:cNvPr id="8" name="Table 6">
+            <a:extLst>
+              <a:ext uri="{FF2B5EF4-FFF2-40B4-BE49-F238E27FC236}">
+                <a16:creationId xmlns:a16="http://schemas.microsoft.com/office/drawing/2014/main" id="{2E48C453-3898-42F5-8662-9FF7F0EE791A}"/>
+              </a:ext>
+            </a:extLst>
+          </p:cNvPr>
+          <p:cNvGraphicFramePr>
+            <a:graphicFrameLocks noGrp="1"/>
+          </p:cNvGraphicFramePr>
+          <p:nvPr>
+            <p:extLst>
+              <p:ext uri="{D42A27DB-BD31-4B8C-83A1-F6EECF244321}">
+                <p14:modId xmlns:p14="http://schemas.microsoft.com/office/powerpoint/2010/main" val="1250365023"/>
+              </p:ext>
+            </p:extLst>
+          </p:nvPr>
+        </p:nvGraphicFramePr>
+        <p:xfrm>
+          <a:off x="838201" y="1446468"/>
+          <a:ext cx="4803712" cy="4796012"/>
+        </p:xfrm>
+        <a:graphic>
+          <a:graphicData uri="http://schemas.openxmlformats.org/drawingml/2006/table">
+            <a:tbl>
+              <a:tblPr firstRow="1" bandRow="1">
+                <a:tableStyleId>{5C22544A-7EE6-4342-B048-85BDC9FD1C3A}</a:tableStyleId>
+              </a:tblPr>
+              <a:tblGrid>
+                <a:gridCol w="2401856">
+                  <a:extLst>
+                    <a:ext uri="{9D8B030D-6E8A-4147-A177-3AD203B41FA5}">
+                      <a16:colId xmlns:a16="http://schemas.microsoft.com/office/drawing/2014/main" val="2061229163"/>
+                    </a:ext>
+                  </a:extLst>
+                </a:gridCol>
+                <a:gridCol w="2401856">
+                  <a:extLst>
+                    <a:ext uri="{9D8B030D-6E8A-4147-A177-3AD203B41FA5}">
+                      <a16:colId xmlns:a16="http://schemas.microsoft.com/office/drawing/2014/main" val="194036185"/>
+                    </a:ext>
+                  </a:extLst>
+                </a:gridCol>
+              </a:tblGrid>
+              <a:tr h="309061">
+                <a:tc>
+                  <a:txBody>
+                    <a:bodyPr/>
+                    <a:lstStyle/>
+                    <a:p>
+                      <a:r>
+                        <a:rPr lang="en-US" dirty="0">
+                          <a:latin typeface="Rockwell Nova" panose="02060503020205020403" pitchFamily="18" charset="0"/>
+                        </a:rPr>
+                        <a:t>Feature</a:t>
+                      </a:r>
+                    </a:p>
+                  </a:txBody>
+                  <a:tcPr/>
+                </a:tc>
+                <a:tc>
+                  <a:txBody>
+                    <a:bodyPr/>
+                    <a:lstStyle/>
+                    <a:p>
+                      <a:r>
+                        <a:rPr lang="en-US" dirty="0">
+                          <a:latin typeface="Rockwell Nova" panose="02060503020205020403" pitchFamily="18" charset="0"/>
+                        </a:rPr>
+                        <a:t>Data Type</a:t>
+                      </a:r>
+                    </a:p>
+                  </a:txBody>
+                  <a:tcPr/>
+                </a:tc>
+                <a:extLst>
+                  <a:ext uri="{0D108BD9-81ED-4DB2-BD59-A6C34878D82A}">
+                    <a16:rowId xmlns:a16="http://schemas.microsoft.com/office/drawing/2014/main" val="3030823547"/>
+                  </a:ext>
+                </a:extLst>
+              </a:tr>
+              <a:tr h="540856">
+                <a:tc>
+                  <a:txBody>
+                    <a:bodyPr/>
+                    <a:lstStyle/>
+                    <a:p>
+                      <a:r>
+                        <a:rPr lang="en-US" dirty="0">
+                          <a:latin typeface="Rockwell Nova" panose="02060503020205020403" pitchFamily="18" charset="0"/>
+                        </a:rPr>
+                        <a:t>Gender</a:t>
+                      </a:r>
+                    </a:p>
+                  </a:txBody>
+                  <a:tcPr/>
+                </a:tc>
+                <a:tc>
+                  <a:txBody>
+                    <a:bodyPr/>
+                    <a:lstStyle/>
+                    <a:p>
+                      <a:r>
+                        <a:rPr lang="en-US" dirty="0">
+                          <a:latin typeface="Rockwell Nova" panose="02060503020205020403" pitchFamily="18" charset="0"/>
+                        </a:rPr>
+                        <a:t>Factor (Man, Woman)</a:t>
+                      </a:r>
+                    </a:p>
+                  </a:txBody>
+                  <a:tcPr/>
+                </a:tc>
+                <a:extLst>
+                  <a:ext uri="{0D108BD9-81ED-4DB2-BD59-A6C34878D82A}">
+                    <a16:rowId xmlns:a16="http://schemas.microsoft.com/office/drawing/2014/main" val="651407288"/>
+                  </a:ext>
+                </a:extLst>
+              </a:tr>
+              <a:tr h="1004447">
+                <a:tc>
+                  <a:txBody>
+                    <a:bodyPr/>
+                    <a:lstStyle/>
+                    <a:p>
+                      <a:r>
+                        <a:rPr lang="en-US" dirty="0">
+                          <a:latin typeface="Rockwell Nova" panose="02060503020205020403" pitchFamily="18" charset="0"/>
+                        </a:rPr>
+                        <a:t>Cholesterol</a:t>
+                      </a:r>
+                    </a:p>
+                  </a:txBody>
+                  <a:tcPr/>
+                </a:tc>
+                <a:tc>
+                  <a:txBody>
+                    <a:bodyPr/>
+                    <a:lstStyle/>
+                    <a:p>
+                      <a:r>
+                        <a:rPr lang="en-US" dirty="0">
+                          <a:latin typeface="Rockwell Nova" panose="02060503020205020403" pitchFamily="18" charset="0"/>
+                        </a:rPr>
+                        <a:t>Factor (Normal, Above Normal, Well Above Normal)</a:t>
+                      </a:r>
+                    </a:p>
+                  </a:txBody>
+                  <a:tcPr/>
+                </a:tc>
+                <a:extLst>
+                  <a:ext uri="{0D108BD9-81ED-4DB2-BD59-A6C34878D82A}">
+                    <a16:rowId xmlns:a16="http://schemas.microsoft.com/office/drawing/2014/main" val="3703804552"/>
+                  </a:ext>
+                </a:extLst>
+              </a:tr>
+              <a:tr h="1004447">
+                <a:tc>
+                  <a:txBody>
+                    <a:bodyPr/>
+                    <a:lstStyle/>
+                    <a:p>
+                      <a:r>
+                        <a:rPr lang="en-US" dirty="0">
+                          <a:latin typeface="Rockwell Nova" panose="02060503020205020403" pitchFamily="18" charset="0"/>
+                        </a:rPr>
+                        <a:t>Glucose</a:t>
+                      </a:r>
+                    </a:p>
+                  </a:txBody>
+                  <a:tcPr/>
+                </a:tc>
+                <a:tc>
+                  <a:txBody>
+                    <a:bodyPr/>
+                    <a:lstStyle/>
+                    <a:p>
+                      <a:pPr marL="0" marR="0" lvl="0" indent="0" algn="l" defTabSz="914400" rtl="0" eaLnBrk="1" fontAlgn="auto" latinLnBrk="0" hangingPunct="1">
+                        <a:lnSpc>
+                          <a:spcPct val="100000"/>
+                        </a:lnSpc>
+                        <a:spcBef>
+                          <a:spcPts val="0"/>
+                        </a:spcBef>
+                        <a:spcAft>
+                          <a:spcPts val="0"/>
+                        </a:spcAft>
+                        <a:buClrTx/>
+                        <a:buSzTx/>
+                        <a:buFontTx/>
+                        <a:buNone/>
+                        <a:tabLst/>
+                        <a:defRPr/>
+                      </a:pPr>
+                      <a:r>
+                        <a:rPr lang="en-US" dirty="0">
+                          <a:latin typeface="Rockwell Nova" panose="02060503020205020403" pitchFamily="18" charset="0"/>
+                        </a:rPr>
+                        <a:t>Factor (Normal, Above Normal, Well Above Normal)</a:t>
+                      </a:r>
+                    </a:p>
+                  </a:txBody>
+                  <a:tcPr/>
+                </a:tc>
+                <a:extLst>
+                  <a:ext uri="{0D108BD9-81ED-4DB2-BD59-A6C34878D82A}">
+                    <a16:rowId xmlns:a16="http://schemas.microsoft.com/office/drawing/2014/main" val="514567939"/>
+                  </a:ext>
+                </a:extLst>
+              </a:tr>
+              <a:tr h="540856">
+                <a:tc>
+                  <a:txBody>
+                    <a:bodyPr/>
+                    <a:lstStyle/>
+                    <a:p>
+                      <a:r>
+                        <a:rPr lang="en-US" dirty="0">
+                          <a:latin typeface="Rockwell Nova" panose="02060503020205020403" pitchFamily="18" charset="0"/>
+                        </a:rPr>
+                        <a:t>Smoking</a:t>
+                      </a:r>
+                    </a:p>
+                  </a:txBody>
+                  <a:tcPr/>
+                </a:tc>
+                <a:tc>
+                  <a:txBody>
+                    <a:bodyPr/>
+                    <a:lstStyle/>
+                    <a:p>
+                      <a:pPr marL="0" marR="0" lvl="0" indent="0" algn="l" defTabSz="914400" rtl="0" eaLnBrk="1" fontAlgn="auto" latinLnBrk="0" hangingPunct="1">
+                        <a:lnSpc>
+                          <a:spcPct val="100000"/>
+                        </a:lnSpc>
+                        <a:spcBef>
+                          <a:spcPts val="0"/>
+                        </a:spcBef>
+                        <a:spcAft>
+                          <a:spcPts val="0"/>
+                        </a:spcAft>
+                        <a:buClrTx/>
+                        <a:buSzTx/>
+                        <a:buFontTx/>
+                        <a:buNone/>
+                        <a:tabLst/>
+                        <a:defRPr/>
+                      </a:pPr>
+                      <a:r>
+                        <a:rPr lang="en-US" dirty="0">
+                          <a:latin typeface="Rockwell Nova" panose="02060503020205020403" pitchFamily="18" charset="0"/>
+                        </a:rPr>
+                        <a:t>Factor (Smoker, Non-smoker)</a:t>
+                      </a:r>
+                    </a:p>
+                  </a:txBody>
+                  <a:tcPr/>
+                </a:tc>
+                <a:extLst>
+                  <a:ext uri="{0D108BD9-81ED-4DB2-BD59-A6C34878D82A}">
+                    <a16:rowId xmlns:a16="http://schemas.microsoft.com/office/drawing/2014/main" val="2939277395"/>
+                  </a:ext>
+                </a:extLst>
+              </a:tr>
+              <a:tr h="772652">
+                <a:tc>
+                  <a:txBody>
+                    <a:bodyPr/>
+                    <a:lstStyle/>
+                    <a:p>
+                      <a:r>
+                        <a:rPr lang="en-US" dirty="0">
+                          <a:latin typeface="Rockwell Nova" panose="02060503020205020403" pitchFamily="18" charset="0"/>
+                        </a:rPr>
+                        <a:t>Alcohol</a:t>
+                      </a:r>
+                    </a:p>
+                  </a:txBody>
+                  <a:tcPr/>
+                </a:tc>
+                <a:tc>
+                  <a:txBody>
+                    <a:bodyPr/>
+                    <a:lstStyle/>
+                    <a:p>
+                      <a:pPr marL="0" marR="0" lvl="0" indent="0" algn="l" defTabSz="914400" rtl="0" eaLnBrk="1" fontAlgn="auto" latinLnBrk="0" hangingPunct="1">
+                        <a:lnSpc>
+                          <a:spcPct val="100000"/>
+                        </a:lnSpc>
+                        <a:spcBef>
+                          <a:spcPts val="0"/>
+                        </a:spcBef>
+                        <a:spcAft>
+                          <a:spcPts val="0"/>
+                        </a:spcAft>
+                        <a:buClrTx/>
+                        <a:buSzTx/>
+                        <a:buFontTx/>
+                        <a:buNone/>
+                        <a:tabLst/>
+                        <a:defRPr/>
+                      </a:pPr>
+                      <a:r>
+                        <a:rPr lang="en-US" dirty="0">
+                          <a:latin typeface="Rockwell Nova" panose="02060503020205020403" pitchFamily="18" charset="0"/>
+                        </a:rPr>
+                        <a:t>Factor (Alcoholic, Non-alcoholic)</a:t>
+                      </a:r>
+                    </a:p>
+                  </a:txBody>
+                  <a:tcPr/>
+                </a:tc>
+                <a:extLst>
+                  <a:ext uri="{0D108BD9-81ED-4DB2-BD59-A6C34878D82A}">
+                    <a16:rowId xmlns:a16="http://schemas.microsoft.com/office/drawing/2014/main" val="1850798226"/>
+                  </a:ext>
+                </a:extLst>
+              </a:tr>
+            </a:tbl>
+          </a:graphicData>
+        </a:graphic>
+      </p:graphicFrame>
     </p:spTree>
     <p:extLst>
       <p:ext uri="{BB962C8B-B14F-4D97-AF65-F5344CB8AC3E}">
-        <p14:creationId xmlns:p14="http://schemas.microsoft.com/office/powerpoint/2010/main" val="3088394074"/>
+        <p14:creationId xmlns:p14="http://schemas.microsoft.com/office/powerpoint/2010/main" val="981765586"/>
       </p:ext>
     </p:extLst>
   </p:cSld>
@@ -9988,15 +10855,15 @@
                 </a:solidFill>
                 <a:latin typeface="Rockwell Nova" panose="02060503020205020403" pitchFamily="18" charset="0"/>
               </a:rPr>
-              <a:t>(Density Plots)</a:t>
-            </a:r>
-            <a:endParaRPr lang="en-US" sz="2000" dirty="0">
+              <a:t>(Summary Statistics)</a:t>
+            </a:r>
+            <a:endParaRPr lang="en-US" sz="3200" dirty="0">
               <a:solidFill>
                 <a:schemeClr val="accent1">
                   <a:lumMod val="50000"/>
                 </a:schemeClr>
               </a:solidFill>
-              <a:latin typeface="Georgia Pro Cond" panose="02040506050405020303" pitchFamily="18" charset="0"/>
+              <a:latin typeface="Rockwell Nova" panose="02060503020205020403" pitchFamily="18" charset="0"/>
             </a:endParaRPr>
           </a:p>
         </p:txBody>
@@ -10070,10 +10937,10 @@
       </p:sp>
       <p:pic>
         <p:nvPicPr>
-          <p:cNvPr id="7" name="Picture 6" descr="A close up of a map&#10;&#10;Description automatically generated">
-            <a:extLst>
-              <a:ext uri="{FF2B5EF4-FFF2-40B4-BE49-F238E27FC236}">
-                <a16:creationId xmlns:a16="http://schemas.microsoft.com/office/drawing/2014/main" id="{7FD27441-CD8B-42CE-897E-1AC67F16DECC}"/>
+          <p:cNvPr id="11" name="Picture 10" descr="A screenshot of a cell phone&#10;&#10;Description automatically generated">
+            <a:extLst>
+              <a:ext uri="{FF2B5EF4-FFF2-40B4-BE49-F238E27FC236}">
+                <a16:creationId xmlns:a16="http://schemas.microsoft.com/office/drawing/2014/main" id="{E057102B-D1A5-4868-9E59-EE64B3EB5D3A}"/>
               </a:ext>
             </a:extLst>
           </p:cNvPr>
@@ -10096,66 +10963,30 @@
         </p:blipFill>
         <p:spPr>
           <a:xfrm>
-            <a:off x="723900" y="1656641"/>
-            <a:ext cx="5715000" cy="3333750"/>
+            <a:off x="898373" y="1690688"/>
+            <a:ext cx="10455427" cy="3078738"/>
           </a:xfrm>
           <a:prstGeom prst="rect">
             <a:avLst/>
           </a:prstGeom>
         </p:spPr>
       </p:pic>
-      <p:pic>
-        <p:nvPicPr>
-          <p:cNvPr id="9" name="Picture 8" descr="A close up of a map&#10;&#10;Description automatically generated">
-            <a:extLst>
-              <a:ext uri="{FF2B5EF4-FFF2-40B4-BE49-F238E27FC236}">
-                <a16:creationId xmlns:a16="http://schemas.microsoft.com/office/drawing/2014/main" id="{DC1F3836-0DDE-404F-B5D5-0E57EBF1F712}"/>
-              </a:ext>
-            </a:extLst>
-          </p:cNvPr>
-          <p:cNvPicPr>
-            <a:picLocks noChangeAspect="1"/>
-          </p:cNvPicPr>
+      <p:sp>
+        <p:nvSpPr>
+          <p:cNvPr id="13" name="TextBox 12">
+            <a:extLst>
+              <a:ext uri="{FF2B5EF4-FFF2-40B4-BE49-F238E27FC236}">
+                <a16:creationId xmlns:a16="http://schemas.microsoft.com/office/drawing/2014/main" id="{DF6940E6-3A9C-47AC-B7C7-F29F83BEB94E}"/>
+              </a:ext>
+            </a:extLst>
+          </p:cNvPr>
+          <p:cNvSpPr txBox="1"/>
           <p:nvPr/>
-        </p:nvPicPr>
-        <p:blipFill>
-          <a:blip r:embed="rId4">
-            <a:extLst>
-              <a:ext uri="{28A0092B-C50C-407E-A947-70E740481C1C}">
-                <a14:useLocalDpi xmlns:a14="http://schemas.microsoft.com/office/drawing/2010/main" val="0"/>
-              </a:ext>
-            </a:extLst>
-          </a:blip>
-          <a:stretch>
-            <a:fillRect/>
-          </a:stretch>
-        </p:blipFill>
+        </p:nvSpPr>
         <p:spPr>
           <a:xfrm>
-            <a:off x="6438900" y="1690688"/>
-            <a:ext cx="5715000" cy="3333750"/>
-          </a:xfrm>
-          <a:prstGeom prst="rect">
-            <a:avLst/>
-          </a:prstGeom>
-        </p:spPr>
-      </p:pic>
-      <p:sp>
-        <p:nvSpPr>
-          <p:cNvPr id="8" name="TextBox 7">
-            <a:extLst>
-              <a:ext uri="{FF2B5EF4-FFF2-40B4-BE49-F238E27FC236}">
-                <a16:creationId xmlns:a16="http://schemas.microsoft.com/office/drawing/2014/main" id="{30CD9B6C-A177-4E3F-8EF3-12CE11BDE130}"/>
-              </a:ext>
-            </a:extLst>
-          </p:cNvPr>
-          <p:cNvSpPr txBox="1"/>
-          <p:nvPr/>
-        </p:nvSpPr>
-        <p:spPr>
-          <a:xfrm>
-            <a:off x="838200" y="5058485"/>
-            <a:ext cx="10515600" cy="1200329"/>
+            <a:off x="898373" y="4973216"/>
+            <a:ext cx="10515600" cy="830997"/>
           </a:xfrm>
           <a:prstGeom prst="rect">
             <a:avLst/>
@@ -10177,7 +11008,7 @@
                 </a:solidFill>
                 <a:latin typeface="Rockwell Nova" panose="02060503020205020403" pitchFamily="18" charset="0"/>
               </a:rPr>
-              <a:t>Mean age of patients with CVDs was higher than those without. However, distribution of Height was normal and remained same for both classes.</a:t>
+              <a:t>It was evident from summary statistics that “Systole” &amp; “Diastole” had invalid negative values, and BMI had outliers.</a:t>
             </a:r>
           </a:p>
         </p:txBody>
@@ -10185,7 +11016,7 @@
     </p:spTree>
     <p:extLst>
       <p:ext uri="{BB962C8B-B14F-4D97-AF65-F5344CB8AC3E}">
-        <p14:creationId xmlns:p14="http://schemas.microsoft.com/office/powerpoint/2010/main" val="273446683"/>
+        <p14:creationId xmlns:p14="http://schemas.microsoft.com/office/powerpoint/2010/main" val="3088394074"/>
       </p:ext>
     </p:extLst>
   </p:cSld>

</xml_diff>

<commit_message>
presentation - recursive feature selection
</commit_message>
<xml_diff>
--- a/presentation.pptx
+++ b/presentation.pptx
@@ -25,8 +25,8 @@
     <p:sldId id="276" r:id="rId16"/>
     <p:sldId id="277" r:id="rId17"/>
     <p:sldId id="278" r:id="rId18"/>
-    <p:sldId id="280" r:id="rId19"/>
-    <p:sldId id="281" r:id="rId20"/>
+    <p:sldId id="283" r:id="rId19"/>
+    <p:sldId id="284" r:id="rId20"/>
     <p:sldId id="279" r:id="rId21"/>
     <p:sldId id="264" r:id="rId22"/>
     <p:sldId id="265" r:id="rId23"/>
@@ -134,6 +134,837 @@
     </p:ext>
   </p:extLst>
 </p:presentation>
+</file>
+
+<file path=ppt/charts/chart1.xml><?xml version="1.0" encoding="utf-8"?>
+<c:chartSpace xmlns:c="http://schemas.openxmlformats.org/drawingml/2006/chart" xmlns:a="http://schemas.openxmlformats.org/drawingml/2006/main" xmlns:r="http://schemas.openxmlformats.org/officeDocument/2006/relationships" xmlns:c16r2="http://schemas.microsoft.com/office/drawing/2015/06/chart">
+  <c:date1904 val="0"/>
+  <c:lang val="en-US"/>
+  <c:roundedCorners val="0"/>
+  <mc:AlternateContent xmlns:mc="http://schemas.openxmlformats.org/markup-compatibility/2006">
+    <mc:Choice xmlns:c14="http://schemas.microsoft.com/office/drawing/2007/8/2/chart" Requires="c14">
+      <c14:style val="102"/>
+    </mc:Choice>
+    <mc:Fallback>
+      <c:style val="2"/>
+    </mc:Fallback>
+  </mc:AlternateContent>
+  <c:chart>
+    <c:title>
+      <c:overlay val="0"/>
+      <c:spPr>
+        <a:noFill/>
+        <a:ln>
+          <a:noFill/>
+        </a:ln>
+        <a:effectLst/>
+      </c:spPr>
+      <c:txPr>
+        <a:bodyPr rot="0" spcFirstLastPara="1" vertOverflow="ellipsis" vert="horz" wrap="square" anchor="ctr" anchorCtr="1"/>
+        <a:lstStyle/>
+        <a:p>
+          <a:pPr>
+            <a:defRPr sz="2000" b="0" i="0" u="none" strike="noStrike" kern="1200" spc="0" baseline="0">
+              <a:solidFill>
+                <a:schemeClr val="tx1">
+                  <a:lumMod val="65000"/>
+                  <a:lumOff val="35000"/>
+                </a:schemeClr>
+              </a:solidFill>
+              <a:latin typeface="Rockwell Nova" panose="02060503020205020403" pitchFamily="18" charset="0"/>
+              <a:ea typeface="+mn-ea"/>
+              <a:cs typeface="+mn-cs"/>
+            </a:defRPr>
+          </a:pPr>
+          <a:endParaRPr lang="en-US"/>
+        </a:p>
+      </c:txPr>
+    </c:title>
+    <c:autoTitleDeleted val="0"/>
+    <c:plotArea>
+      <c:layout/>
+      <c:pieChart>
+        <c:varyColors val="1"/>
+        <c:ser>
+          <c:idx val="0"/>
+          <c:order val="0"/>
+          <c:tx>
+            <c:strRef>
+              <c:f>Sheet1!$B$1</c:f>
+              <c:strCache>
+                <c:ptCount val="1"/>
+                <c:pt idx="0">
+                  <c:v>Percentage of Data</c:v>
+                </c:pt>
+              </c:strCache>
+            </c:strRef>
+          </c:tx>
+          <c:explosion val="2"/>
+          <c:dPt>
+            <c:idx val="0"/>
+            <c:bubble3D val="0"/>
+            <c:spPr>
+              <a:solidFill>
+                <a:schemeClr val="accent1"/>
+              </a:solidFill>
+              <a:ln w="19050">
+                <a:solidFill>
+                  <a:schemeClr val="lt1"/>
+                </a:solidFill>
+              </a:ln>
+              <a:effectLst/>
+            </c:spPr>
+            <c:extLst>
+              <c:ext xmlns:c16="http://schemas.microsoft.com/office/drawing/2014/chart" uri="{C3380CC4-5D6E-409C-BE32-E72D297353CC}">
+                <c16:uniqueId val="{00000001-2397-4246-B646-85A446F7DA0C}"/>
+              </c:ext>
+            </c:extLst>
+          </c:dPt>
+          <c:dPt>
+            <c:idx val="1"/>
+            <c:bubble3D val="0"/>
+            <c:spPr>
+              <a:solidFill>
+                <a:schemeClr val="accent2"/>
+              </a:solidFill>
+              <a:ln w="19050">
+                <a:solidFill>
+                  <a:schemeClr val="lt1"/>
+                </a:solidFill>
+              </a:ln>
+              <a:effectLst/>
+            </c:spPr>
+          </c:dPt>
+          <c:dLbls>
+            <c:spPr>
+              <a:noFill/>
+              <a:ln>
+                <a:noFill/>
+              </a:ln>
+              <a:effectLst/>
+            </c:spPr>
+            <c:txPr>
+              <a:bodyPr rot="0" spcFirstLastPara="1" vertOverflow="ellipsis" vert="horz" wrap="square" lIns="38100" tIns="19050" rIns="38100" bIns="19050" anchor="ctr" anchorCtr="1">
+                <a:spAutoFit/>
+              </a:bodyPr>
+              <a:lstStyle/>
+              <a:p>
+                <a:pPr>
+                  <a:defRPr sz="1800" b="0" i="0" u="none" strike="noStrike" kern="1200" baseline="0">
+                    <a:solidFill>
+                      <a:schemeClr val="bg1"/>
+                    </a:solidFill>
+                    <a:latin typeface="Rockwell Nova" panose="02060503020205020403" pitchFamily="18" charset="0"/>
+                    <a:ea typeface="+mn-ea"/>
+                    <a:cs typeface="+mn-cs"/>
+                  </a:defRPr>
+                </a:pPr>
+                <a:endParaRPr lang="en-US"/>
+              </a:p>
+            </c:txPr>
+            <c:dLblPos val="bestFit"/>
+            <c:showLegendKey val="0"/>
+            <c:showVal val="1"/>
+            <c:showCatName val="0"/>
+            <c:showSerName val="0"/>
+            <c:showPercent val="0"/>
+            <c:showBubbleSize val="0"/>
+            <c:showLeaderLines val="1"/>
+            <c:leaderLines>
+              <c:spPr>
+                <a:ln w="9525" cap="flat" cmpd="sng" algn="ctr">
+                  <a:solidFill>
+                    <a:schemeClr val="tx1">
+                      <a:lumMod val="35000"/>
+                      <a:lumOff val="65000"/>
+                    </a:schemeClr>
+                  </a:solidFill>
+                  <a:round/>
+                </a:ln>
+                <a:effectLst/>
+              </c:spPr>
+            </c:leaderLines>
+            <c:extLst>
+              <c:ext xmlns:c15="http://schemas.microsoft.com/office/drawing/2012/chart" uri="{CE6537A1-D6FC-4f65-9D91-7224C49458BB}"/>
+            </c:extLst>
+          </c:dLbls>
+          <c:cat>
+            <c:strRef>
+              <c:f>Sheet1!$A$2:$A$3</c:f>
+              <c:strCache>
+                <c:ptCount val="2"/>
+                <c:pt idx="0">
+                  <c:v>Training Data</c:v>
+                </c:pt>
+                <c:pt idx="1">
+                  <c:v>Test Data</c:v>
+                </c:pt>
+              </c:strCache>
+            </c:strRef>
+          </c:cat>
+          <c:val>
+            <c:numRef>
+              <c:f>Sheet1!$B$2:$B$3</c:f>
+              <c:numCache>
+                <c:formatCode>General</c:formatCode>
+                <c:ptCount val="2"/>
+                <c:pt idx="0">
+                  <c:v>80</c:v>
+                </c:pt>
+                <c:pt idx="1">
+                  <c:v>20</c:v>
+                </c:pt>
+              </c:numCache>
+            </c:numRef>
+          </c:val>
+          <c:extLst>
+            <c:ext xmlns:c16="http://schemas.microsoft.com/office/drawing/2014/chart" uri="{C3380CC4-5D6E-409C-BE32-E72D297353CC}">
+              <c16:uniqueId val="{00000000-2397-4246-B646-85A446F7DA0C}"/>
+            </c:ext>
+          </c:extLst>
+        </c:ser>
+        <c:dLbls>
+          <c:dLblPos val="bestFit"/>
+          <c:showLegendKey val="0"/>
+          <c:showVal val="1"/>
+          <c:showCatName val="0"/>
+          <c:showSerName val="0"/>
+          <c:showPercent val="0"/>
+          <c:showBubbleSize val="0"/>
+          <c:showLeaderLines val="1"/>
+        </c:dLbls>
+        <c:firstSliceAng val="0"/>
+      </c:pieChart>
+      <c:spPr>
+        <a:noFill/>
+        <a:ln>
+          <a:noFill/>
+        </a:ln>
+        <a:effectLst/>
+      </c:spPr>
+    </c:plotArea>
+    <c:legend>
+      <c:legendPos val="b"/>
+      <c:overlay val="0"/>
+      <c:spPr>
+        <a:noFill/>
+        <a:ln>
+          <a:noFill/>
+        </a:ln>
+        <a:effectLst/>
+      </c:spPr>
+      <c:txPr>
+        <a:bodyPr rot="0" spcFirstLastPara="1" vertOverflow="ellipsis" vert="horz" wrap="square" anchor="ctr" anchorCtr="1"/>
+        <a:lstStyle/>
+        <a:p>
+          <a:pPr>
+            <a:defRPr sz="1400" b="0" i="0" u="none" strike="noStrike" kern="1200" baseline="0">
+              <a:solidFill>
+                <a:schemeClr val="tx1">
+                  <a:lumMod val="65000"/>
+                  <a:lumOff val="35000"/>
+                </a:schemeClr>
+              </a:solidFill>
+              <a:latin typeface="Rockwell Nova" panose="02060503020205020403" pitchFamily="18" charset="0"/>
+              <a:ea typeface="+mn-ea"/>
+              <a:cs typeface="+mn-cs"/>
+            </a:defRPr>
+          </a:pPr>
+          <a:endParaRPr lang="en-US"/>
+        </a:p>
+      </c:txPr>
+    </c:legend>
+    <c:plotVisOnly val="1"/>
+    <c:dispBlanksAs val="gap"/>
+    <c:extLst>
+      <c:ext xmlns:c16r3="http://schemas.microsoft.com/office/drawing/2017/03/chart" uri="{56B9EC1D-385E-4148-901F-78D8002777C0}">
+        <c16r3:dataDisplayOptions16>
+          <c16r3:dispNaAsBlank val="1"/>
+        </c16r3:dataDisplayOptions16>
+      </c:ext>
+    </c:extLst>
+    <c:showDLblsOverMax val="0"/>
+  </c:chart>
+  <c:spPr>
+    <a:noFill/>
+    <a:ln>
+      <a:noFill/>
+    </a:ln>
+    <a:effectLst/>
+  </c:spPr>
+  <c:txPr>
+    <a:bodyPr/>
+    <a:lstStyle/>
+    <a:p>
+      <a:pPr>
+        <a:defRPr/>
+      </a:pPr>
+      <a:endParaRPr lang="en-US"/>
+    </a:p>
+  </c:txPr>
+  <c:externalData r:id="rId3">
+    <c:autoUpdate val="0"/>
+  </c:externalData>
+</c:chartSpace>
+</file>
+
+<file path=ppt/charts/colors1.xml><?xml version="1.0" encoding="utf-8"?>
+<cs:colorStyle xmlns:cs="http://schemas.microsoft.com/office/drawing/2012/chartStyle" xmlns:a="http://schemas.openxmlformats.org/drawingml/2006/main" meth="cycle" id="10">
+  <a:schemeClr val="accent1"/>
+  <a:schemeClr val="accent2"/>
+  <a:schemeClr val="accent3"/>
+  <a:schemeClr val="accent4"/>
+  <a:schemeClr val="accent5"/>
+  <a:schemeClr val="accent6"/>
+  <cs:variation/>
+  <cs:variation>
+    <a:lumMod val="60000"/>
+  </cs:variation>
+  <cs:variation>
+    <a:lumMod val="80000"/>
+    <a:lumOff val="20000"/>
+  </cs:variation>
+  <cs:variation>
+    <a:lumMod val="80000"/>
+  </cs:variation>
+  <cs:variation>
+    <a:lumMod val="60000"/>
+    <a:lumOff val="40000"/>
+  </cs:variation>
+  <cs:variation>
+    <a:lumMod val="50000"/>
+  </cs:variation>
+  <cs:variation>
+    <a:lumMod val="70000"/>
+    <a:lumOff val="30000"/>
+  </cs:variation>
+  <cs:variation>
+    <a:lumMod val="70000"/>
+  </cs:variation>
+  <cs:variation>
+    <a:lumMod val="50000"/>
+    <a:lumOff val="50000"/>
+  </cs:variation>
+</cs:colorStyle>
+</file>
+
+<file path=ppt/charts/style1.xml><?xml version="1.0" encoding="utf-8"?>
+<cs:chartStyle xmlns:cs="http://schemas.microsoft.com/office/drawing/2012/chartStyle" xmlns:a="http://schemas.openxmlformats.org/drawingml/2006/main" id="251">
+  <cs:axisTitle>
+    <cs:lnRef idx="0"/>
+    <cs:fillRef idx="0"/>
+    <cs:effectRef idx="0"/>
+    <cs:fontRef idx="minor">
+      <a:schemeClr val="tx1">
+        <a:lumMod val="65000"/>
+        <a:lumOff val="35000"/>
+      </a:schemeClr>
+    </cs:fontRef>
+    <cs:defRPr sz="1330" kern="1200"/>
+  </cs:axisTitle>
+  <cs:categoryAxis>
+    <cs:lnRef idx="0"/>
+    <cs:fillRef idx="0"/>
+    <cs:effectRef idx="0"/>
+    <cs:fontRef idx="minor">
+      <a:schemeClr val="tx1">
+        <a:lumMod val="65000"/>
+        <a:lumOff val="35000"/>
+      </a:schemeClr>
+    </cs:fontRef>
+    <cs:spPr>
+      <a:ln w="9525" cap="flat" cmpd="sng" algn="ctr">
+        <a:solidFill>
+          <a:schemeClr val="tx1">
+            <a:lumMod val="15000"/>
+            <a:lumOff val="85000"/>
+          </a:schemeClr>
+        </a:solidFill>
+        <a:round/>
+      </a:ln>
+    </cs:spPr>
+    <cs:defRPr sz="1197" kern="1200"/>
+  </cs:categoryAxis>
+  <cs:chartArea mods="allowNoFillOverride allowNoLineOverride">
+    <cs:lnRef idx="0"/>
+    <cs:fillRef idx="0"/>
+    <cs:effectRef idx="0"/>
+    <cs:fontRef idx="minor">
+      <a:schemeClr val="tx1"/>
+    </cs:fontRef>
+    <cs:spPr>
+      <a:solidFill>
+        <a:schemeClr val="bg1"/>
+      </a:solidFill>
+      <a:ln w="9525" cap="flat" cmpd="sng" algn="ctr">
+        <a:solidFill>
+          <a:schemeClr val="tx1">
+            <a:lumMod val="15000"/>
+            <a:lumOff val="85000"/>
+          </a:schemeClr>
+        </a:solidFill>
+        <a:round/>
+      </a:ln>
+    </cs:spPr>
+    <cs:defRPr sz="1197" kern="1200"/>
+  </cs:chartArea>
+  <cs:dataLabel>
+    <cs:lnRef idx="0"/>
+    <cs:fillRef idx="0"/>
+    <cs:effectRef idx="0"/>
+    <cs:fontRef idx="minor">
+      <a:schemeClr val="tx1">
+        <a:lumMod val="75000"/>
+        <a:lumOff val="25000"/>
+      </a:schemeClr>
+    </cs:fontRef>
+    <cs:defRPr sz="1197" kern="1200"/>
+  </cs:dataLabel>
+  <cs:dataLabelCallout>
+    <cs:lnRef idx="0"/>
+    <cs:fillRef idx="0"/>
+    <cs:effectRef idx="0"/>
+    <cs:fontRef idx="minor">
+      <a:schemeClr val="dk1">
+        <a:lumMod val="65000"/>
+        <a:lumOff val="35000"/>
+      </a:schemeClr>
+    </cs:fontRef>
+    <cs:spPr>
+      <a:solidFill>
+        <a:schemeClr val="lt1"/>
+      </a:solidFill>
+      <a:ln>
+        <a:solidFill>
+          <a:schemeClr val="dk1">
+            <a:lumMod val="25000"/>
+            <a:lumOff val="75000"/>
+          </a:schemeClr>
+        </a:solidFill>
+      </a:ln>
+    </cs:spPr>
+    <cs:defRPr sz="1197" kern="1200"/>
+    <cs:bodyPr rot="0" spcFirstLastPara="1" vertOverflow="clip" horzOverflow="clip" vert="horz" wrap="square" lIns="36576" tIns="18288" rIns="36576" bIns="18288" anchor="ctr" anchorCtr="1">
+      <a:spAutoFit/>
+    </cs:bodyPr>
+  </cs:dataLabelCallout>
+  <cs:dataPoint>
+    <cs:lnRef idx="0"/>
+    <cs:fillRef idx="1">
+      <cs:styleClr val="auto"/>
+    </cs:fillRef>
+    <cs:effectRef idx="0"/>
+    <cs:fontRef idx="minor">
+      <a:schemeClr val="tx1"/>
+    </cs:fontRef>
+    <cs:spPr>
+      <a:ln w="19050">
+        <a:solidFill>
+          <a:schemeClr val="lt1"/>
+        </a:solidFill>
+      </a:ln>
+    </cs:spPr>
+  </cs:dataPoint>
+  <cs:dataPoint3D>
+    <cs:lnRef idx="0"/>
+    <cs:fillRef idx="1">
+      <cs:styleClr val="auto"/>
+    </cs:fillRef>
+    <cs:effectRef idx="0"/>
+    <cs:fontRef idx="minor">
+      <a:schemeClr val="tx1"/>
+    </cs:fontRef>
+    <cs:spPr>
+      <a:ln w="25400">
+        <a:solidFill>
+          <a:schemeClr val="lt1"/>
+        </a:solidFill>
+      </a:ln>
+    </cs:spPr>
+  </cs:dataPoint3D>
+  <cs:dataPointLine>
+    <cs:lnRef idx="0">
+      <cs:styleClr val="auto"/>
+    </cs:lnRef>
+    <cs:fillRef idx="0"/>
+    <cs:effectRef idx="0"/>
+    <cs:fontRef idx="minor">
+      <a:schemeClr val="tx1"/>
+    </cs:fontRef>
+    <cs:spPr>
+      <a:ln w="28575" cap="rnd">
+        <a:solidFill>
+          <a:schemeClr val="phClr"/>
+        </a:solidFill>
+        <a:round/>
+      </a:ln>
+    </cs:spPr>
+  </cs:dataPointLine>
+  <cs:dataPointMarker>
+    <cs:lnRef idx="0">
+      <cs:styleClr val="auto"/>
+    </cs:lnRef>
+    <cs:fillRef idx="1">
+      <cs:styleClr val="auto"/>
+    </cs:fillRef>
+    <cs:effectRef idx="0"/>
+    <cs:fontRef idx="minor">
+      <a:schemeClr val="tx1"/>
+    </cs:fontRef>
+    <cs:spPr>
+      <a:ln w="9525">
+        <a:solidFill>
+          <a:schemeClr val="phClr"/>
+        </a:solidFill>
+      </a:ln>
+    </cs:spPr>
+  </cs:dataPointMarker>
+  <cs:dataPointMarkerLayout symbol="circle" size="5"/>
+  <cs:dataPointWireframe>
+    <cs:lnRef idx="0">
+      <cs:styleClr val="auto"/>
+    </cs:lnRef>
+    <cs:fillRef idx="0"/>
+    <cs:effectRef idx="0"/>
+    <cs:fontRef idx="minor">
+      <a:schemeClr val="tx1"/>
+    </cs:fontRef>
+    <cs:spPr>
+      <a:ln w="9525" cap="rnd">
+        <a:solidFill>
+          <a:schemeClr val="phClr"/>
+        </a:solidFill>
+        <a:round/>
+      </a:ln>
+    </cs:spPr>
+  </cs:dataPointWireframe>
+  <cs:dataTable>
+    <cs:lnRef idx="0"/>
+    <cs:fillRef idx="0"/>
+    <cs:effectRef idx="0"/>
+    <cs:fontRef idx="minor">
+      <a:schemeClr val="tx1">
+        <a:lumMod val="65000"/>
+        <a:lumOff val="35000"/>
+      </a:schemeClr>
+    </cs:fontRef>
+    <cs:spPr>
+      <a:noFill/>
+      <a:ln w="9525" cap="flat" cmpd="sng" algn="ctr">
+        <a:solidFill>
+          <a:schemeClr val="tx1">
+            <a:lumMod val="15000"/>
+            <a:lumOff val="85000"/>
+          </a:schemeClr>
+        </a:solidFill>
+        <a:round/>
+      </a:ln>
+    </cs:spPr>
+    <cs:defRPr sz="1197" kern="1200"/>
+  </cs:dataTable>
+  <cs:downBar>
+    <cs:lnRef idx="0"/>
+    <cs:fillRef idx="0"/>
+    <cs:effectRef idx="0"/>
+    <cs:fontRef idx="minor">
+      <a:schemeClr val="tx1"/>
+    </cs:fontRef>
+    <cs:spPr>
+      <a:solidFill>
+        <a:schemeClr val="dk1">
+          <a:lumMod val="75000"/>
+          <a:lumOff val="25000"/>
+        </a:schemeClr>
+      </a:solidFill>
+      <a:ln w="9525" cap="flat" cmpd="sng" algn="ctr">
+        <a:solidFill>
+          <a:schemeClr val="tx1">
+            <a:lumMod val="65000"/>
+            <a:lumOff val="35000"/>
+          </a:schemeClr>
+        </a:solidFill>
+        <a:round/>
+      </a:ln>
+    </cs:spPr>
+  </cs:downBar>
+  <cs:dropLine>
+    <cs:lnRef idx="0"/>
+    <cs:fillRef idx="0"/>
+    <cs:effectRef idx="0"/>
+    <cs:fontRef idx="minor">
+      <a:schemeClr val="tx1"/>
+    </cs:fontRef>
+    <cs:spPr>
+      <a:ln w="9525" cap="flat" cmpd="sng" algn="ctr">
+        <a:solidFill>
+          <a:schemeClr val="tx1">
+            <a:lumMod val="35000"/>
+            <a:lumOff val="65000"/>
+          </a:schemeClr>
+        </a:solidFill>
+        <a:round/>
+      </a:ln>
+    </cs:spPr>
+  </cs:dropLine>
+  <cs:errorBar>
+    <cs:lnRef idx="0"/>
+    <cs:fillRef idx="0"/>
+    <cs:effectRef idx="0"/>
+    <cs:fontRef idx="minor">
+      <a:schemeClr val="tx1"/>
+    </cs:fontRef>
+    <cs:spPr>
+      <a:ln w="9525" cap="flat" cmpd="sng" algn="ctr">
+        <a:solidFill>
+          <a:schemeClr val="tx1">
+            <a:lumMod val="65000"/>
+            <a:lumOff val="35000"/>
+          </a:schemeClr>
+        </a:solidFill>
+        <a:round/>
+      </a:ln>
+    </cs:spPr>
+  </cs:errorBar>
+  <cs:floor>
+    <cs:lnRef idx="0"/>
+    <cs:fillRef idx="0"/>
+    <cs:effectRef idx="0"/>
+    <cs:fontRef idx="minor">
+      <a:schemeClr val="tx1"/>
+    </cs:fontRef>
+    <cs:spPr>
+      <a:noFill/>
+      <a:ln>
+        <a:noFill/>
+      </a:ln>
+    </cs:spPr>
+  </cs:floor>
+  <cs:gridlineMajor>
+    <cs:lnRef idx="0"/>
+    <cs:fillRef idx="0"/>
+    <cs:effectRef idx="0"/>
+    <cs:fontRef idx="minor">
+      <a:schemeClr val="tx1"/>
+    </cs:fontRef>
+    <cs:spPr>
+      <a:ln w="9525" cap="flat" cmpd="sng" algn="ctr">
+        <a:solidFill>
+          <a:schemeClr val="tx1">
+            <a:lumMod val="15000"/>
+            <a:lumOff val="85000"/>
+          </a:schemeClr>
+        </a:solidFill>
+        <a:round/>
+      </a:ln>
+    </cs:spPr>
+  </cs:gridlineMajor>
+  <cs:gridlineMinor>
+    <cs:lnRef idx="0"/>
+    <cs:fillRef idx="0"/>
+    <cs:effectRef idx="0"/>
+    <cs:fontRef idx="minor">
+      <a:schemeClr val="tx1"/>
+    </cs:fontRef>
+    <cs:spPr>
+      <a:ln w="9525" cap="flat" cmpd="sng" algn="ctr">
+        <a:solidFill>
+          <a:schemeClr val="tx1">
+            <a:lumMod val="5000"/>
+            <a:lumOff val="95000"/>
+          </a:schemeClr>
+        </a:solidFill>
+        <a:round/>
+      </a:ln>
+    </cs:spPr>
+  </cs:gridlineMinor>
+  <cs:hiLoLine>
+    <cs:lnRef idx="0"/>
+    <cs:fillRef idx="0"/>
+    <cs:effectRef idx="0"/>
+    <cs:fontRef idx="minor">
+      <a:schemeClr val="tx1"/>
+    </cs:fontRef>
+    <cs:spPr>
+      <a:ln w="9525" cap="flat" cmpd="sng" algn="ctr">
+        <a:solidFill>
+          <a:schemeClr val="tx1">
+            <a:lumMod val="50000"/>
+            <a:lumOff val="50000"/>
+          </a:schemeClr>
+        </a:solidFill>
+        <a:round/>
+      </a:ln>
+    </cs:spPr>
+  </cs:hiLoLine>
+  <cs:leaderLine>
+    <cs:lnRef idx="0"/>
+    <cs:fillRef idx="0"/>
+    <cs:effectRef idx="0"/>
+    <cs:fontRef idx="minor">
+      <a:schemeClr val="tx1"/>
+    </cs:fontRef>
+    <cs:spPr>
+      <a:ln w="9525" cap="flat" cmpd="sng" algn="ctr">
+        <a:solidFill>
+          <a:schemeClr val="tx1">
+            <a:lumMod val="35000"/>
+            <a:lumOff val="65000"/>
+          </a:schemeClr>
+        </a:solidFill>
+        <a:round/>
+      </a:ln>
+    </cs:spPr>
+  </cs:leaderLine>
+  <cs:legend>
+    <cs:lnRef idx="0"/>
+    <cs:fillRef idx="0"/>
+    <cs:effectRef idx="0"/>
+    <cs:fontRef idx="minor">
+      <a:schemeClr val="tx1">
+        <a:lumMod val="65000"/>
+        <a:lumOff val="35000"/>
+      </a:schemeClr>
+    </cs:fontRef>
+    <cs:defRPr sz="1197" kern="1200"/>
+  </cs:legend>
+  <cs:plotArea mods="allowNoFillOverride allowNoLineOverride">
+    <cs:lnRef idx="0"/>
+    <cs:fillRef idx="0"/>
+    <cs:effectRef idx="0"/>
+    <cs:fontRef idx="minor">
+      <a:schemeClr val="tx1"/>
+    </cs:fontRef>
+  </cs:plotArea>
+  <cs:plotArea3D mods="allowNoFillOverride allowNoLineOverride">
+    <cs:lnRef idx="0"/>
+    <cs:fillRef idx="0"/>
+    <cs:effectRef idx="0"/>
+    <cs:fontRef idx="minor">
+      <a:schemeClr val="tx1"/>
+    </cs:fontRef>
+  </cs:plotArea3D>
+  <cs:seriesAxis>
+    <cs:lnRef idx="0"/>
+    <cs:fillRef idx="0"/>
+    <cs:effectRef idx="0"/>
+    <cs:fontRef idx="minor">
+      <a:schemeClr val="tx1">
+        <a:lumMod val="65000"/>
+        <a:lumOff val="35000"/>
+      </a:schemeClr>
+    </cs:fontRef>
+    <cs:defRPr sz="1197" kern="1200"/>
+  </cs:seriesAxis>
+  <cs:seriesLine>
+    <cs:lnRef idx="0"/>
+    <cs:fillRef idx="0"/>
+    <cs:effectRef idx="0"/>
+    <cs:fontRef idx="minor">
+      <a:schemeClr val="tx1"/>
+    </cs:fontRef>
+    <cs:spPr>
+      <a:ln w="9525" cap="flat" cmpd="sng" algn="ctr">
+        <a:solidFill>
+          <a:schemeClr val="tx1">
+            <a:lumMod val="35000"/>
+            <a:lumOff val="65000"/>
+          </a:schemeClr>
+        </a:solidFill>
+        <a:round/>
+      </a:ln>
+    </cs:spPr>
+  </cs:seriesLine>
+  <cs:title>
+    <cs:lnRef idx="0"/>
+    <cs:fillRef idx="0"/>
+    <cs:effectRef idx="0"/>
+    <cs:fontRef idx="minor">
+      <a:schemeClr val="tx1">
+        <a:lumMod val="65000"/>
+        <a:lumOff val="35000"/>
+      </a:schemeClr>
+    </cs:fontRef>
+    <cs:defRPr sz="1862" b="0" kern="1200" spc="0" baseline="0"/>
+  </cs:title>
+  <cs:trendline>
+    <cs:lnRef idx="0">
+      <cs:styleClr val="auto"/>
+    </cs:lnRef>
+    <cs:fillRef idx="0"/>
+    <cs:effectRef idx="0"/>
+    <cs:fontRef idx="minor">
+      <a:schemeClr val="tx1"/>
+    </cs:fontRef>
+    <cs:spPr>
+      <a:ln w="19050" cap="rnd">
+        <a:solidFill>
+          <a:schemeClr val="phClr"/>
+        </a:solidFill>
+        <a:prstDash val="sysDot"/>
+      </a:ln>
+    </cs:spPr>
+  </cs:trendline>
+  <cs:trendlineLabel>
+    <cs:lnRef idx="0"/>
+    <cs:fillRef idx="0"/>
+    <cs:effectRef idx="0"/>
+    <cs:fontRef idx="minor">
+      <a:schemeClr val="tx1">
+        <a:lumMod val="65000"/>
+        <a:lumOff val="35000"/>
+      </a:schemeClr>
+    </cs:fontRef>
+    <cs:defRPr sz="1197" kern="1200"/>
+  </cs:trendlineLabel>
+  <cs:upBar>
+    <cs:lnRef idx="0"/>
+    <cs:fillRef idx="0"/>
+    <cs:effectRef idx="0"/>
+    <cs:fontRef idx="minor">
+      <a:schemeClr val="tx1"/>
+    </cs:fontRef>
+    <cs:spPr>
+      <a:solidFill>
+        <a:schemeClr val="lt1"/>
+      </a:solidFill>
+      <a:ln w="9525" cap="flat" cmpd="sng" algn="ctr">
+        <a:solidFill>
+          <a:schemeClr val="tx1">
+            <a:lumMod val="65000"/>
+            <a:lumOff val="35000"/>
+          </a:schemeClr>
+        </a:solidFill>
+        <a:round/>
+      </a:ln>
+    </cs:spPr>
+  </cs:upBar>
+  <cs:valueAxis>
+    <cs:lnRef idx="0"/>
+    <cs:fillRef idx="0"/>
+    <cs:effectRef idx="0"/>
+    <cs:fontRef idx="minor">
+      <a:schemeClr val="tx1">
+        <a:lumMod val="65000"/>
+        <a:lumOff val="35000"/>
+      </a:schemeClr>
+    </cs:fontRef>
+    <cs:defRPr sz="1197" kern="1200"/>
+  </cs:valueAxis>
+  <cs:wall>
+    <cs:lnRef idx="0"/>
+    <cs:fillRef idx="0"/>
+    <cs:effectRef idx="0"/>
+    <cs:fontRef idx="minor">
+      <a:schemeClr val="tx1"/>
+    </cs:fontRef>
+    <cs:spPr>
+      <a:noFill/>
+      <a:ln>
+        <a:noFill/>
+      </a:ln>
+    </cs:spPr>
+  </cs:wall>
+</cs:chartStyle>
 </file>
 
 <file path=ppt/notesMasters/notesMaster1.xml><?xml version="1.0" encoding="utf-8"?>
@@ -560,6 +1391,174 @@
     <p:extLst>
       <p:ext uri="{BB962C8B-B14F-4D97-AF65-F5344CB8AC3E}">
         <p14:creationId xmlns:p14="http://schemas.microsoft.com/office/powerpoint/2010/main" val="2387496407"/>
+      </p:ext>
+    </p:extLst>
+  </p:cSld>
+  <p:clrMapOvr>
+    <a:masterClrMapping/>
+  </p:clrMapOvr>
+</p:notes>
+</file>
+
+<file path=ppt/notesSlides/notesSlide10.xml><?xml version="1.0" encoding="utf-8"?>
+<p:notes xmlns:a="http://schemas.openxmlformats.org/drawingml/2006/main" xmlns:r="http://schemas.openxmlformats.org/officeDocument/2006/relationships" xmlns:p="http://schemas.openxmlformats.org/presentationml/2006/main">
+  <p:cSld>
+    <p:spTree>
+      <p:nvGrpSpPr>
+        <p:cNvPr id="1" name=""/>
+        <p:cNvGrpSpPr/>
+        <p:nvPr/>
+      </p:nvGrpSpPr>
+      <p:grpSpPr>
+        <a:xfrm>
+          <a:off x="0" y="0"/>
+          <a:ext cx="0" cy="0"/>
+          <a:chOff x="0" y="0"/>
+          <a:chExt cx="0" cy="0"/>
+        </a:xfrm>
+      </p:grpSpPr>
+      <p:sp>
+        <p:nvSpPr>
+          <p:cNvPr id="2" name="Slide Image Placeholder 1"/>
+          <p:cNvSpPr>
+            <a:spLocks noGrp="1" noRot="1" noChangeAspect="1"/>
+          </p:cNvSpPr>
+          <p:nvPr>
+            <p:ph type="sldImg"/>
+          </p:nvPr>
+        </p:nvSpPr>
+        <p:spPr/>
+      </p:sp>
+      <p:sp>
+        <p:nvSpPr>
+          <p:cNvPr id="3" name="Notes Placeholder 2"/>
+          <p:cNvSpPr>
+            <a:spLocks noGrp="1"/>
+          </p:cNvSpPr>
+          <p:nvPr>
+            <p:ph type="body" idx="1"/>
+          </p:nvPr>
+        </p:nvSpPr>
+        <p:spPr/>
+        <p:txBody>
+          <a:bodyPr/>
+          <a:lstStyle/>
+          <a:p>
+            <a:endParaRPr lang="en-US" dirty="0"/>
+          </a:p>
+        </p:txBody>
+      </p:sp>
+      <p:sp>
+        <p:nvSpPr>
+          <p:cNvPr id="4" name="Slide Number Placeholder 3"/>
+          <p:cNvSpPr>
+            <a:spLocks noGrp="1"/>
+          </p:cNvSpPr>
+          <p:nvPr>
+            <p:ph type="sldNum" sz="quarter" idx="5"/>
+          </p:nvPr>
+        </p:nvSpPr>
+        <p:spPr/>
+        <p:txBody>
+          <a:bodyPr/>
+          <a:lstStyle/>
+          <a:p>
+            <a:fld id="{CF8315F9-90FD-4DB5-9225-8838ABDCEE34}" type="slidenum">
+              <a:rPr lang="en-US" smtClean="0"/>
+              <a:t>18</a:t>
+            </a:fld>
+            <a:endParaRPr lang="en-US"/>
+          </a:p>
+        </p:txBody>
+      </p:sp>
+    </p:spTree>
+    <p:extLst>
+      <p:ext uri="{BB962C8B-B14F-4D97-AF65-F5344CB8AC3E}">
+        <p14:creationId xmlns:p14="http://schemas.microsoft.com/office/powerpoint/2010/main" val="3936118054"/>
+      </p:ext>
+    </p:extLst>
+  </p:cSld>
+  <p:clrMapOvr>
+    <a:masterClrMapping/>
+  </p:clrMapOvr>
+</p:notes>
+</file>
+
+<file path=ppt/notesSlides/notesSlide11.xml><?xml version="1.0" encoding="utf-8"?>
+<p:notes xmlns:a="http://schemas.openxmlformats.org/drawingml/2006/main" xmlns:r="http://schemas.openxmlformats.org/officeDocument/2006/relationships" xmlns:p="http://schemas.openxmlformats.org/presentationml/2006/main">
+  <p:cSld>
+    <p:spTree>
+      <p:nvGrpSpPr>
+        <p:cNvPr id="1" name=""/>
+        <p:cNvGrpSpPr/>
+        <p:nvPr/>
+      </p:nvGrpSpPr>
+      <p:grpSpPr>
+        <a:xfrm>
+          <a:off x="0" y="0"/>
+          <a:ext cx="0" cy="0"/>
+          <a:chOff x="0" y="0"/>
+          <a:chExt cx="0" cy="0"/>
+        </a:xfrm>
+      </p:grpSpPr>
+      <p:sp>
+        <p:nvSpPr>
+          <p:cNvPr id="2" name="Slide Image Placeholder 1"/>
+          <p:cNvSpPr>
+            <a:spLocks noGrp="1" noRot="1" noChangeAspect="1"/>
+          </p:cNvSpPr>
+          <p:nvPr>
+            <p:ph type="sldImg"/>
+          </p:nvPr>
+        </p:nvSpPr>
+        <p:spPr/>
+      </p:sp>
+      <p:sp>
+        <p:nvSpPr>
+          <p:cNvPr id="3" name="Notes Placeholder 2"/>
+          <p:cNvSpPr>
+            <a:spLocks noGrp="1"/>
+          </p:cNvSpPr>
+          <p:nvPr>
+            <p:ph type="body" idx="1"/>
+          </p:nvPr>
+        </p:nvSpPr>
+        <p:spPr/>
+        <p:txBody>
+          <a:bodyPr/>
+          <a:lstStyle/>
+          <a:p>
+            <a:endParaRPr lang="en-US" dirty="0"/>
+          </a:p>
+        </p:txBody>
+      </p:sp>
+      <p:sp>
+        <p:nvSpPr>
+          <p:cNvPr id="4" name="Slide Number Placeholder 3"/>
+          <p:cNvSpPr>
+            <a:spLocks noGrp="1"/>
+          </p:cNvSpPr>
+          <p:nvPr>
+            <p:ph type="sldNum" sz="quarter" idx="5"/>
+          </p:nvPr>
+        </p:nvSpPr>
+        <p:spPr/>
+        <p:txBody>
+          <a:bodyPr/>
+          <a:lstStyle/>
+          <a:p>
+            <a:fld id="{CF8315F9-90FD-4DB5-9225-8838ABDCEE34}" type="slidenum">
+              <a:rPr lang="en-US" smtClean="0"/>
+              <a:t>19</a:t>
+            </a:fld>
+            <a:endParaRPr lang="en-US"/>
+          </a:p>
+        </p:txBody>
+      </p:sp>
+    </p:spTree>
+    <p:extLst>
+      <p:ext uri="{BB962C8B-B14F-4D97-AF65-F5344CB8AC3E}">
+        <p14:creationId xmlns:p14="http://schemas.microsoft.com/office/powerpoint/2010/main" val="2988965871"/>
       </p:ext>
     </p:extLst>
   </p:cSld>
@@ -6133,7 +7132,7 @@
                 </a:solidFill>
                 <a:latin typeface="Rockwell Nova" panose="02060503020205020403" pitchFamily="18" charset="0"/>
               </a:rPr>
-              <a:t>Patients with high blood pressure had significantly higher rate of CVD. Also, frequency of disease was slightly higher in physically inactive patients.</a:t>
+              <a:t>Patients with high blood pressure had significantly higher rate of CVD. Also, frequency of CVDs was slightly higher in physically inactive patients.</a:t>
             </a:r>
           </a:p>
         </p:txBody>
@@ -6381,7 +7380,7 @@
         <p:spPr>
           <a:xfrm>
             <a:off x="838200" y="5058485"/>
-            <a:ext cx="10515600" cy="830997"/>
+            <a:ext cx="10515600" cy="1200329"/>
           </a:xfrm>
           <a:prstGeom prst="rect">
             <a:avLst/>
@@ -6403,7 +7402,7 @@
                 </a:solidFill>
                 <a:latin typeface="Rockwell Nova" panose="02060503020205020403" pitchFamily="18" charset="0"/>
               </a:rPr>
-              <a:t>Patients with cholesterol and glucose levels above and well above normal were more susceptible to cardiovascular diseases.</a:t>
+              <a:t>Patients with cholesterol and glucose levels above and well above normal were more susceptible to cardiovascular diseases than their counterparts.</a:t>
             </a:r>
           </a:p>
         </p:txBody>
@@ -6651,7 +7650,7 @@
         <p:spPr>
           <a:xfrm>
             <a:off x="838200" y="5058485"/>
-            <a:ext cx="10515600" cy="830997"/>
+            <a:ext cx="10515600" cy="1200329"/>
           </a:xfrm>
           <a:prstGeom prst="rect">
             <a:avLst/>
@@ -6673,7 +7672,7 @@
                 </a:solidFill>
                 <a:latin typeface="Rockwell Nova" panose="02060503020205020403" pitchFamily="18" charset="0"/>
               </a:rPr>
-              <a:t>CVDs were slightly more prevalent in male patients than their counterparts. Class distribution in the dataset was well balanced.</a:t>
+              <a:t>CVDs were slightly more prevalent in male patients than their counterparts (left). Class distribution in the dataset was well balanced (right).</a:t>
             </a:r>
           </a:p>
         </p:txBody>
@@ -6946,14 +7945,6 @@
 <file path=ppt/slides/slide18.xml><?xml version="1.0" encoding="utf-8"?>
 <p:sld xmlns:a="http://schemas.openxmlformats.org/drawingml/2006/main" xmlns:r="http://schemas.openxmlformats.org/officeDocument/2006/relationships" xmlns:p="http://schemas.openxmlformats.org/presentationml/2006/main">
   <p:cSld>
-    <p:bg>
-      <p:bgPr>
-        <a:solidFill>
-          <a:schemeClr val="bg1"/>
-        </a:solidFill>
-        <a:effectLst/>
-      </p:bgPr>
-    </p:bg>
     <p:spTree>
       <p:nvGrpSpPr>
         <p:cNvPr id="1" name=""/>
@@ -6973,7 +7964,7 @@
           <p:cNvPr id="2" name="Title 1">
             <a:extLst>
               <a:ext uri="{FF2B5EF4-FFF2-40B4-BE49-F238E27FC236}">
-                <a16:creationId xmlns:a16="http://schemas.microsoft.com/office/drawing/2014/main" id="{B532249E-CDED-47AF-864D-5220925EAA12}"/>
+                <a16:creationId xmlns:a16="http://schemas.microsoft.com/office/drawing/2014/main" id="{BB0D0921-96AE-4FEC-B1D7-21D5580C3F23}"/>
               </a:ext>
             </a:extLst>
           </p:cNvPr>
@@ -6984,173 +7975,166 @@
             <p:ph type="title"/>
           </p:nvPr>
         </p:nvSpPr>
-        <p:spPr>
-          <a:xfrm>
-            <a:off x="847344" y="300505"/>
-            <a:ext cx="10506456" cy="1197864"/>
-          </a:xfrm>
-        </p:spPr>
-        <p:txBody>
-          <a:bodyPr vert="horz" lIns="91440" tIns="45720" rIns="91440" bIns="45720" rtlCol="0" anchor="b">
+        <p:spPr/>
+        <p:txBody>
+          <a:bodyPr>
             <a:normAutofit/>
           </a:bodyPr>
           <a:lstStyle/>
           <a:p>
-            <a:pPr algn="ctr"/>
-            <a:endParaRPr lang="en-US" sz="5400"/>
+            <a:r>
+              <a:rPr lang="en-US" sz="3200" dirty="0">
+                <a:solidFill>
+                  <a:schemeClr val="accent1">
+                    <a:lumMod val="50000"/>
+                  </a:schemeClr>
+                </a:solidFill>
+                <a:latin typeface="Rockwell Nova" panose="02060503020205020403" pitchFamily="18" charset="0"/>
+              </a:rPr>
+              <a:t>DATA CLEANING</a:t>
+            </a:r>
+          </a:p>
+        </p:txBody>
+      </p:sp>
+      <p:sp>
+        <p:nvSpPr>
+          <p:cNvPr id="4" name="Date Placeholder 3">
+            <a:extLst>
+              <a:ext uri="{FF2B5EF4-FFF2-40B4-BE49-F238E27FC236}">
+                <a16:creationId xmlns:a16="http://schemas.microsoft.com/office/drawing/2014/main" id="{073D39D9-F71A-4C1E-A18F-01247A980266}"/>
+              </a:ext>
+            </a:extLst>
+          </p:cNvPr>
+          <p:cNvSpPr>
+            <a:spLocks noGrp="1"/>
+          </p:cNvSpPr>
+          <p:nvPr>
+            <p:ph type="dt" sz="half" idx="10"/>
+          </p:nvPr>
+        </p:nvSpPr>
+        <p:spPr/>
+        <p:txBody>
+          <a:bodyPr/>
+          <a:lstStyle/>
+          <a:p>
+            <a:r>
+              <a:rPr lang="en-US"/>
+              <a:t>12/4/2019</a:t>
+            </a:r>
+          </a:p>
+        </p:txBody>
+      </p:sp>
+      <p:sp>
+        <p:nvSpPr>
+          <p:cNvPr id="5" name="Slide Number Placeholder 4">
+            <a:extLst>
+              <a:ext uri="{FF2B5EF4-FFF2-40B4-BE49-F238E27FC236}">
+                <a16:creationId xmlns:a16="http://schemas.microsoft.com/office/drawing/2014/main" id="{B83B5B8B-B2BB-42F0-8C9F-0A36A51E1253}"/>
+              </a:ext>
+            </a:extLst>
+          </p:cNvPr>
+          <p:cNvSpPr>
+            <a:spLocks noGrp="1"/>
+          </p:cNvSpPr>
+          <p:nvPr>
+            <p:ph type="sldNum" sz="quarter" idx="12"/>
+          </p:nvPr>
+        </p:nvSpPr>
+        <p:spPr/>
+        <p:txBody>
+          <a:bodyPr/>
+          <a:lstStyle/>
+          <a:p>
+            <a:fld id="{87963F98-C10F-4FC1-8017-0839D2AC7CA3}" type="slidenum">
+              <a:rPr lang="en-US" smtClean="0"/>
+              <a:t>18</a:t>
+            </a:fld>
+            <a:endParaRPr lang="en-US"/>
           </a:p>
         </p:txBody>
       </p:sp>
       <p:pic>
         <p:nvPicPr>
-          <p:cNvPr id="6" name="Picture 5">
-            <a:extLst>
-              <a:ext uri="{FF2B5EF4-FFF2-40B4-BE49-F238E27FC236}">
-                <a16:creationId xmlns:a16="http://schemas.microsoft.com/office/drawing/2014/main" id="{14A1EFDA-0BF8-422C-A425-D201D5639725}"/>
-              </a:ext>
-            </a:extLst>
-          </p:cNvPr>
-          <p:cNvPicPr/>
+          <p:cNvPr id="9" name="Picture 8" descr="A screenshot of a cell phone&#10;&#10;Description automatically generated">
+            <a:extLst>
+              <a:ext uri="{FF2B5EF4-FFF2-40B4-BE49-F238E27FC236}">
+                <a16:creationId xmlns:a16="http://schemas.microsoft.com/office/drawing/2014/main" id="{3FC3BE05-DBBC-477F-8657-B22FBEA04347}"/>
+              </a:ext>
+            </a:extLst>
+          </p:cNvPr>
+          <p:cNvPicPr>
+            <a:picLocks noChangeAspect="1"/>
+          </p:cNvPicPr>
           <p:nvPr/>
         </p:nvPicPr>
         <p:blipFill>
-          <a:blip r:embed="rId2"/>
+          <a:blip r:embed="rId3">
+            <a:extLst>
+              <a:ext uri="{28A0092B-C50C-407E-A947-70E740481C1C}">
+                <a14:useLocalDpi xmlns:a14="http://schemas.microsoft.com/office/drawing/2010/main" val="0"/>
+              </a:ext>
+            </a:extLst>
+          </a:blip>
           <a:stretch>
             <a:fillRect/>
           </a:stretch>
         </p:blipFill>
-        <p:spPr bwMode="auto">
+        <p:spPr>
           <a:xfrm>
-            <a:off x="266163" y="2611483"/>
-            <a:ext cx="5681220" cy="3314045"/>
+            <a:off x="2398475" y="1690688"/>
+            <a:ext cx="7395049" cy="3381288"/>
           </a:xfrm>
           <a:prstGeom prst="rect">
             <a:avLst/>
           </a:prstGeom>
         </p:spPr>
       </p:pic>
-      <p:pic>
-        <p:nvPicPr>
-          <p:cNvPr id="10" name="Content Placeholder 9">
-            <a:extLst>
-              <a:ext uri="{FF2B5EF4-FFF2-40B4-BE49-F238E27FC236}">
-                <a16:creationId xmlns:a16="http://schemas.microsoft.com/office/drawing/2014/main" id="{794EE763-5533-45C8-9ED5-24DA937CFC37}"/>
-              </a:ext>
-            </a:extLst>
-          </p:cNvPr>
-          <p:cNvPicPr>
-            <a:picLocks noGrp="1"/>
-          </p:cNvPicPr>
-          <p:nvPr>
-            <p:ph idx="1"/>
-          </p:nvPr>
-        </p:nvPicPr>
-        <p:blipFill>
-          <a:blip r:embed="rId3"/>
-          <a:stretch>
-            <a:fillRect/>
-          </a:stretch>
-        </p:blipFill>
-        <p:spPr bwMode="auto">
+      <p:sp>
+        <p:nvSpPr>
+          <p:cNvPr id="10" name="TextBox 9">
+            <a:extLst>
+              <a:ext uri="{FF2B5EF4-FFF2-40B4-BE49-F238E27FC236}">
+                <a16:creationId xmlns:a16="http://schemas.microsoft.com/office/drawing/2014/main" id="{C183396C-B0D4-43EA-85D1-771B444483EF}"/>
+              </a:ext>
+            </a:extLst>
+          </p:cNvPr>
+          <p:cNvSpPr txBox="1"/>
+          <p:nvPr/>
+        </p:nvSpPr>
+        <p:spPr>
           <a:xfrm>
-            <a:off x="6244617" y="2611483"/>
-            <a:ext cx="5681219" cy="3314044"/>
+            <a:off x="838199" y="5156021"/>
+            <a:ext cx="10515600" cy="1200329"/>
           </a:xfrm>
           <a:prstGeom prst="rect">
             <a:avLst/>
           </a:prstGeom>
+          <a:noFill/>
         </p:spPr>
-      </p:pic>
-      <p:sp>
-        <p:nvSpPr>
-          <p:cNvPr id="4" name="Date Placeholder 3">
-            <a:extLst>
-              <a:ext uri="{FF2B5EF4-FFF2-40B4-BE49-F238E27FC236}">
-                <a16:creationId xmlns:a16="http://schemas.microsoft.com/office/drawing/2014/main" id="{352E8FAC-1DE0-4ABF-B8ED-F6548D7F0BD9}"/>
-              </a:ext>
-            </a:extLst>
-          </p:cNvPr>
-          <p:cNvSpPr>
-            <a:spLocks noGrp="1"/>
-          </p:cNvSpPr>
-          <p:nvPr>
-            <p:ph type="dt" sz="half" idx="10"/>
-          </p:nvPr>
-        </p:nvSpPr>
-        <p:spPr>
-          <a:xfrm>
-            <a:off x="838200" y="6356350"/>
-            <a:ext cx="2743200" cy="365125"/>
-          </a:xfrm>
-        </p:spPr>
-        <p:txBody>
-          <a:bodyPr vert="horz" lIns="91440" tIns="45720" rIns="91440" bIns="45720" rtlCol="0" anchor="ctr">
-            <a:normAutofit/>
+        <p:txBody>
+          <a:bodyPr wrap="square" rtlCol="0">
+            <a:spAutoFit/>
           </a:bodyPr>
           <a:lstStyle/>
           <a:p>
-            <a:pPr>
-              <a:spcAft>
-                <a:spcPts val="600"/>
-              </a:spcAft>
-            </a:pPr>
-            <a:r>
-              <a:rPr lang="en-US"/>
-              <a:t>12/4/2019</a:t>
-            </a:r>
-          </a:p>
-        </p:txBody>
-      </p:sp>
-      <p:sp>
-        <p:nvSpPr>
-          <p:cNvPr id="5" name="Slide Number Placeholder 4">
-            <a:extLst>
-              <a:ext uri="{FF2B5EF4-FFF2-40B4-BE49-F238E27FC236}">
-                <a16:creationId xmlns:a16="http://schemas.microsoft.com/office/drawing/2014/main" id="{15BAD214-7CDE-4606-98AA-DA4E80DFA1C3}"/>
-              </a:ext>
-            </a:extLst>
-          </p:cNvPr>
-          <p:cNvSpPr>
-            <a:spLocks noGrp="1"/>
-          </p:cNvSpPr>
-          <p:nvPr>
-            <p:ph type="sldNum" sz="quarter" idx="12"/>
-          </p:nvPr>
-        </p:nvSpPr>
-        <p:spPr>
-          <a:xfrm>
-            <a:off x="8610600" y="6356350"/>
-            <a:ext cx="2743200" cy="365125"/>
-          </a:xfrm>
-        </p:spPr>
-        <p:txBody>
-          <a:bodyPr vert="horz" lIns="91440" tIns="45720" rIns="91440" bIns="45720" rtlCol="0" anchor="ctr">
-            <a:normAutofit/>
-          </a:bodyPr>
-          <a:lstStyle/>
-          <a:p>
-            <a:pPr>
-              <a:spcAft>
-                <a:spcPts val="600"/>
-              </a:spcAft>
-            </a:pPr>
-            <a:fld id="{87963F98-C10F-4FC1-8017-0839D2AC7CA3}" type="slidenum">
-              <a:rPr lang="en-US"/>
-              <a:pPr>
-                <a:spcAft>
-                  <a:spcPts val="600"/>
-                </a:spcAft>
-              </a:pPr>
-              <a:t>18</a:t>
-            </a:fld>
-            <a:endParaRPr lang="en-US"/>
+            <a:r>
+              <a:rPr lang="en-US" sz="2400" dirty="0">
+                <a:solidFill>
+                  <a:schemeClr val="bg2">
+                    <a:lumMod val="25000"/>
+                  </a:schemeClr>
+                </a:solidFill>
+                <a:latin typeface="Rockwell Nova" panose="02060503020205020403" pitchFamily="18" charset="0"/>
+              </a:rPr>
+              <a:t>As seen in the summary statistics, invalid values and outliers of systolic and diastolic blood pressures, Weight, and Height has been removed after data cleaning.</a:t>
+            </a:r>
           </a:p>
         </p:txBody>
       </p:sp>
     </p:spTree>
     <p:extLst>
       <p:ext uri="{BB962C8B-B14F-4D97-AF65-F5344CB8AC3E}">
-        <p14:creationId xmlns:p14="http://schemas.microsoft.com/office/powerpoint/2010/main" val="496112990"/>
+        <p14:creationId xmlns:p14="http://schemas.microsoft.com/office/powerpoint/2010/main" val="4091667276"/>
       </p:ext>
     </p:extLst>
   </p:cSld>
@@ -7163,14 +8147,6 @@
 <file path=ppt/slides/slide19.xml><?xml version="1.0" encoding="utf-8"?>
 <p:sld xmlns:a="http://schemas.openxmlformats.org/drawingml/2006/main" xmlns:r="http://schemas.openxmlformats.org/officeDocument/2006/relationships" xmlns:p="http://schemas.openxmlformats.org/presentationml/2006/main">
   <p:cSld>
-    <p:bg>
-      <p:bgPr>
-        <a:solidFill>
-          <a:schemeClr val="bg1"/>
-        </a:solidFill>
-        <a:effectLst/>
-      </p:bgPr>
-    </p:bg>
     <p:spTree>
       <p:nvGrpSpPr>
         <p:cNvPr id="1" name=""/>
@@ -7185,436 +8161,260 @@
           <a:chExt cx="0" cy="0"/>
         </a:xfrm>
       </p:grpSpPr>
-      <p:sp useBgFill="1">
-        <p:nvSpPr>
-          <p:cNvPr id="11" name="Rectangle 10">
-            <a:extLst>
-              <a:ext uri="{FF2B5EF4-FFF2-40B4-BE49-F238E27FC236}">
-                <a16:creationId xmlns:a16="http://schemas.microsoft.com/office/drawing/2014/main" id="{92468898-5A6E-4D55-85EC-308E785EE06C}"/>
-              </a:ext>
-              <a:ext uri="{C183D7F6-B498-43B3-948B-1728B52AA6E4}">
-                <adec:decorative xmlns:adec="http://schemas.microsoft.com/office/drawing/2017/decorative" val="1"/>
-              </a:ext>
-            </a:extLst>
-          </p:cNvPr>
-          <p:cNvSpPr>
-            <a:spLocks noGrp="1" noRot="1" noChangeAspect="1" noMove="1" noResize="1" noEditPoints="1" noAdjustHandles="1" noChangeArrowheads="1" noChangeShapeType="1" noTextEdit="1"/>
-          </p:cNvSpPr>
-          <p:nvPr>
-            <p:extLst>
-              <p:ext uri="{386F3935-93C4-4BCD-93E2-E3B085C9AB24}">
-                <p16:designElem xmlns:p16="http://schemas.microsoft.com/office/powerpoint/2015/main" val="1"/>
-              </p:ext>
-            </p:extLst>
-          </p:nvPr>
+      <p:sp>
+        <p:nvSpPr>
+          <p:cNvPr id="2" name="Title 1">
+            <a:extLst>
+              <a:ext uri="{FF2B5EF4-FFF2-40B4-BE49-F238E27FC236}">
+                <a16:creationId xmlns:a16="http://schemas.microsoft.com/office/drawing/2014/main" id="{BB0D0921-96AE-4FEC-B1D7-21D5580C3F23}"/>
+              </a:ext>
+            </a:extLst>
+          </p:cNvPr>
+          <p:cNvSpPr>
+            <a:spLocks noGrp="1"/>
+          </p:cNvSpPr>
+          <p:nvPr>
+            <p:ph type="title"/>
+          </p:nvPr>
+        </p:nvSpPr>
+        <p:spPr/>
+        <p:txBody>
+          <a:bodyPr>
+            <a:normAutofit/>
+          </a:bodyPr>
+          <a:lstStyle/>
+          <a:p>
+            <a:r>
+              <a:rPr lang="en-US" sz="3200" dirty="0">
+                <a:solidFill>
+                  <a:schemeClr val="accent1">
+                    <a:lumMod val="50000"/>
+                  </a:schemeClr>
+                </a:solidFill>
+                <a:latin typeface="Rockwell Nova" panose="02060503020205020403" pitchFamily="18" charset="0"/>
+              </a:rPr>
+              <a:t>TRAIN/TEST SPLIT</a:t>
+            </a:r>
+          </a:p>
+        </p:txBody>
+      </p:sp>
+      <p:sp>
+        <p:nvSpPr>
+          <p:cNvPr id="4" name="Date Placeholder 3">
+            <a:extLst>
+              <a:ext uri="{FF2B5EF4-FFF2-40B4-BE49-F238E27FC236}">
+                <a16:creationId xmlns:a16="http://schemas.microsoft.com/office/drawing/2014/main" id="{073D39D9-F71A-4C1E-A18F-01247A980266}"/>
+              </a:ext>
+            </a:extLst>
+          </p:cNvPr>
+          <p:cNvSpPr>
+            <a:spLocks noGrp="1"/>
+          </p:cNvSpPr>
+          <p:nvPr>
+            <p:ph type="dt" sz="half" idx="10"/>
+          </p:nvPr>
+        </p:nvSpPr>
+        <p:spPr/>
+        <p:txBody>
+          <a:bodyPr/>
+          <a:lstStyle/>
+          <a:p>
+            <a:r>
+              <a:rPr lang="en-US"/>
+              <a:t>12/4/2019</a:t>
+            </a:r>
+          </a:p>
+        </p:txBody>
+      </p:sp>
+      <p:sp>
+        <p:nvSpPr>
+          <p:cNvPr id="5" name="Slide Number Placeholder 4">
+            <a:extLst>
+              <a:ext uri="{FF2B5EF4-FFF2-40B4-BE49-F238E27FC236}">
+                <a16:creationId xmlns:a16="http://schemas.microsoft.com/office/drawing/2014/main" id="{B83B5B8B-B2BB-42F0-8C9F-0A36A51E1253}"/>
+              </a:ext>
+            </a:extLst>
+          </p:cNvPr>
+          <p:cNvSpPr>
+            <a:spLocks noGrp="1"/>
+          </p:cNvSpPr>
+          <p:nvPr>
+            <p:ph type="sldNum" sz="quarter" idx="12"/>
+          </p:nvPr>
+        </p:nvSpPr>
+        <p:spPr/>
+        <p:txBody>
+          <a:bodyPr/>
+          <a:lstStyle/>
+          <a:p>
+            <a:fld id="{87963F98-C10F-4FC1-8017-0839D2AC7CA3}" type="slidenum">
+              <a:rPr lang="en-US" smtClean="0"/>
+              <a:t>19</a:t>
+            </a:fld>
+            <a:endParaRPr lang="en-US"/>
+          </a:p>
+        </p:txBody>
+      </p:sp>
+      <p:sp>
+        <p:nvSpPr>
+          <p:cNvPr id="10" name="TextBox 9">
+            <a:extLst>
+              <a:ext uri="{FF2B5EF4-FFF2-40B4-BE49-F238E27FC236}">
+                <a16:creationId xmlns:a16="http://schemas.microsoft.com/office/drawing/2014/main" id="{C183396C-B0D4-43EA-85D1-771B444483EF}"/>
+              </a:ext>
+            </a:extLst>
+          </p:cNvPr>
+          <p:cNvSpPr txBox="1"/>
+          <p:nvPr/>
         </p:nvSpPr>
         <p:spPr>
           <a:xfrm>
-            <a:off x="0" y="0"/>
-            <a:ext cx="12192000" cy="6858000"/>
+            <a:off x="838200" y="1690688"/>
+            <a:ext cx="6369996" cy="4893647"/>
           </a:xfrm>
           <a:prstGeom prst="rect">
             <a:avLst/>
           </a:prstGeom>
-          <a:ln>
-            <a:noFill/>
-          </a:ln>
+          <a:noFill/>
         </p:spPr>
-        <p:style>
-          <a:lnRef idx="2">
-            <a:schemeClr val="accent1">
-              <a:shade val="50000"/>
-            </a:schemeClr>
-          </a:lnRef>
-          <a:fillRef idx="1">
-            <a:schemeClr val="accent1"/>
-          </a:fillRef>
-          <a:effectRef idx="0">
-            <a:schemeClr val="accent1"/>
-          </a:effectRef>
-          <a:fontRef idx="minor">
-            <a:schemeClr val="lt1"/>
-          </a:fontRef>
-        </p:style>
-        <p:txBody>
-          <a:bodyPr rtlCol="0" anchor="ctr"/>
-          <a:lstStyle/>
-          <a:p>
-            <a:pPr algn="ctr"/>
-            <a:endParaRPr lang="en-US"/>
-          </a:p>
-        </p:txBody>
-      </p:sp>
-      <p:sp>
-        <p:nvSpPr>
-          <p:cNvPr id="2" name="Title 1">
-            <a:extLst>
-              <a:ext uri="{FF2B5EF4-FFF2-40B4-BE49-F238E27FC236}">
-                <a16:creationId xmlns:a16="http://schemas.microsoft.com/office/drawing/2014/main" id="{DCB00AE6-B37A-4700-A64F-27AC59BBDEED}"/>
-              </a:ext>
-            </a:extLst>
-          </p:cNvPr>
-          <p:cNvSpPr>
-            <a:spLocks noGrp="1"/>
-          </p:cNvSpPr>
-          <p:nvPr>
-            <p:ph type="title"/>
-          </p:nvPr>
-        </p:nvSpPr>
-        <p:spPr>
-          <a:xfrm>
-            <a:off x="429768" y="411480"/>
-            <a:ext cx="11201400" cy="1106424"/>
-          </a:xfrm>
-        </p:spPr>
-        <p:txBody>
-          <a:bodyPr>
-            <a:normAutofit/>
+        <p:txBody>
+          <a:bodyPr wrap="square" rtlCol="0">
+            <a:spAutoFit/>
           </a:bodyPr>
           <a:lstStyle/>
           <a:p>
-            <a:endParaRPr lang="en-US" sz="3600"/>
-          </a:p>
-        </p:txBody>
-      </p:sp>
-      <p:sp>
-        <p:nvSpPr>
-          <p:cNvPr id="13" name="Rectangle 12">
-            <a:extLst>
-              <a:ext uri="{FF2B5EF4-FFF2-40B4-BE49-F238E27FC236}">
-                <a16:creationId xmlns:a16="http://schemas.microsoft.com/office/drawing/2014/main" id="{3E23A947-2D45-4208-AE2B-64948C87A3EB}"/>
-              </a:ext>
-              <a:ext uri="{C183D7F6-B498-43B3-948B-1728B52AA6E4}">
-                <adec:decorative xmlns:adec="http://schemas.microsoft.com/office/drawing/2017/decorative" val="1"/>
-              </a:ext>
-            </a:extLst>
-          </p:cNvPr>
-          <p:cNvSpPr>
-            <a:spLocks noGrp="1" noRot="1" noChangeAspect="1" noMove="1" noResize="1" noEditPoints="1" noAdjustHandles="1" noChangeArrowheads="1" noChangeShapeType="1" noTextEdit="1"/>
-          </p:cNvSpPr>
+            <a:pPr marL="342900" indent="-342900">
+              <a:buFont typeface="Arial" panose="020B0604020202020204" pitchFamily="34" charset="0"/>
+              <a:buChar char="•"/>
+            </a:pPr>
+            <a:r>
+              <a:rPr lang="en-US" sz="2400" dirty="0">
+                <a:solidFill>
+                  <a:schemeClr val="bg2">
+                    <a:lumMod val="25000"/>
+                  </a:schemeClr>
+                </a:solidFill>
+                <a:latin typeface="Rockwell Nova" panose="02060503020205020403" pitchFamily="18" charset="0"/>
+              </a:rPr>
+              <a:t>We split the dataset into train and test right after data cleaning.</a:t>
+            </a:r>
+          </a:p>
+          <a:p>
+            <a:pPr marL="342900" indent="-342900">
+              <a:buFont typeface="Arial" panose="020B0604020202020204" pitchFamily="34" charset="0"/>
+              <a:buChar char="•"/>
+            </a:pPr>
+            <a:r>
+              <a:rPr lang="en-US" sz="2400" dirty="0">
+                <a:solidFill>
+                  <a:schemeClr val="bg2">
+                    <a:lumMod val="25000"/>
+                  </a:schemeClr>
+                </a:solidFill>
+                <a:latin typeface="Rockwell Nova" panose="02060503020205020403" pitchFamily="18" charset="0"/>
+              </a:rPr>
+              <a:t>80% of the data were kept for training and the rest was for testing.</a:t>
+            </a:r>
+          </a:p>
+          <a:p>
+            <a:pPr marL="342900" indent="-342900">
+              <a:buFont typeface="Arial" panose="020B0604020202020204" pitchFamily="34" charset="0"/>
+              <a:buChar char="•"/>
+            </a:pPr>
+            <a:r>
+              <a:rPr lang="en-US" sz="2400" dirty="0">
+                <a:solidFill>
+                  <a:schemeClr val="bg2">
+                    <a:lumMod val="25000"/>
+                  </a:schemeClr>
+                </a:solidFill>
+                <a:latin typeface="Rockwell Nova" panose="02060503020205020403" pitchFamily="18" charset="0"/>
+              </a:rPr>
+              <a:t>Ensured that class distribution was equal in both training and test data.</a:t>
+            </a:r>
+          </a:p>
+          <a:p>
+            <a:pPr marL="342900" indent="-342900">
+              <a:buFont typeface="Arial" panose="020B0604020202020204" pitchFamily="34" charset="0"/>
+              <a:buChar char="•"/>
+            </a:pPr>
+            <a:r>
+              <a:rPr lang="en-US" sz="2400" dirty="0">
+                <a:solidFill>
+                  <a:schemeClr val="bg2">
+                    <a:lumMod val="25000"/>
+                  </a:schemeClr>
+                </a:solidFill>
+                <a:latin typeface="Rockwell Nova" panose="02060503020205020403" pitchFamily="18" charset="0"/>
+              </a:rPr>
+              <a:t>Further feature selection and exploratory analysis were done using the training data only.</a:t>
+            </a:r>
+          </a:p>
+          <a:p>
+            <a:pPr marL="342900" indent="-342900">
+              <a:buFont typeface="Arial" panose="020B0604020202020204" pitchFamily="34" charset="0"/>
+              <a:buChar char="•"/>
+            </a:pPr>
+            <a:r>
+              <a:rPr lang="en-US" sz="2400" dirty="0">
+                <a:solidFill>
+                  <a:schemeClr val="bg2">
+                    <a:lumMod val="25000"/>
+                  </a:schemeClr>
+                </a:solidFill>
+                <a:latin typeface="Rockwell Nova" panose="02060503020205020403" pitchFamily="18" charset="0"/>
+              </a:rPr>
+              <a:t>Test dataset was never analyzed and solely kept for final evaluation to make mode validation more rigorous.</a:t>
+            </a:r>
+          </a:p>
+          <a:p>
+            <a:pPr marL="342900" indent="-342900">
+              <a:buFont typeface="Arial" panose="020B0604020202020204" pitchFamily="34" charset="0"/>
+              <a:buChar char="•"/>
+            </a:pPr>
+            <a:endParaRPr lang="en-US" sz="2400" dirty="0">
+              <a:solidFill>
+                <a:schemeClr val="bg2">
+                  <a:lumMod val="25000"/>
+                </a:schemeClr>
+              </a:solidFill>
+              <a:latin typeface="Rockwell Nova" panose="02060503020205020403" pitchFamily="18" charset="0"/>
+            </a:endParaRPr>
+          </a:p>
+        </p:txBody>
+      </p:sp>
+      <p:graphicFrame>
+        <p:nvGraphicFramePr>
+          <p:cNvPr id="7" name="Chart 6">
+            <a:extLst>
+              <a:ext uri="{FF2B5EF4-FFF2-40B4-BE49-F238E27FC236}">
+                <a16:creationId xmlns:a16="http://schemas.microsoft.com/office/drawing/2014/main" id="{A4AF4217-1158-4DBA-ACBA-832F9E29E02F}"/>
+              </a:ext>
+            </a:extLst>
+          </p:cNvPr>
+          <p:cNvGraphicFramePr/>
           <p:nvPr>
             <p:extLst>
-              <p:ext uri="{386F3935-93C4-4BCD-93E2-E3B085C9AB24}">
-                <p16:designElem xmlns:p16="http://schemas.microsoft.com/office/powerpoint/2015/main" val="1"/>
+              <p:ext uri="{D42A27DB-BD31-4B8C-83A1-F6EECF244321}">
+                <p14:modId xmlns:p14="http://schemas.microsoft.com/office/powerpoint/2010/main" val="2028414002"/>
               </p:ext>
             </p:extLst>
           </p:nvPr>
-        </p:nvSpPr>
-        <p:spPr>
-          <a:xfrm>
-            <a:off x="0" y="598458"/>
-            <a:ext cx="128016" cy="704088"/>
-          </a:xfrm>
-          <a:prstGeom prst="rect">
-            <a:avLst/>
-          </a:prstGeom>
-          <a:solidFill>
-            <a:schemeClr val="accent2"/>
-          </a:solidFill>
-          <a:ln>
-            <a:noFill/>
-          </a:ln>
-        </p:spPr>
-        <p:style>
-          <a:lnRef idx="2">
-            <a:schemeClr val="accent1">
-              <a:shade val="50000"/>
-            </a:schemeClr>
-          </a:lnRef>
-          <a:fillRef idx="1">
-            <a:schemeClr val="accent1"/>
-          </a:fillRef>
-          <a:effectRef idx="0">
-            <a:schemeClr val="accent1"/>
-          </a:effectRef>
-          <a:fontRef idx="minor">
-            <a:schemeClr val="lt1"/>
-          </a:fontRef>
-        </p:style>
-        <p:txBody>
-          <a:bodyPr rtlCol="0" anchor="ctr"/>
-          <a:lstStyle/>
-          <a:p>
-            <a:pPr algn="ctr"/>
-            <a:endParaRPr lang="en-US">
-              <a:solidFill>
-                <a:prstClr val="white"/>
-              </a:solidFill>
-              <a:latin typeface="Calibri" panose="020F0502020204030204"/>
-            </a:endParaRPr>
-          </a:p>
-        </p:txBody>
-      </p:sp>
-      <p:pic>
-        <p:nvPicPr>
-          <p:cNvPr id="6" name="Picture 5">
-            <a:extLst>
-              <a:ext uri="{FF2B5EF4-FFF2-40B4-BE49-F238E27FC236}">
-                <a16:creationId xmlns:a16="http://schemas.microsoft.com/office/drawing/2014/main" id="{0590760D-EABB-4440-9737-F834DDDF7E71}"/>
-              </a:ext>
-            </a:extLst>
-          </p:cNvPr>
-          <p:cNvPicPr/>
-          <p:nvPr/>
-        </p:nvPicPr>
-        <p:blipFill>
-          <a:blip r:embed="rId2"/>
-          <a:stretch>
-            <a:fillRect/>
-          </a:stretch>
-        </p:blipFill>
-        <p:spPr bwMode="auto">
-          <a:xfrm>
-            <a:off x="429768" y="2022729"/>
-            <a:ext cx="6702552" cy="3909822"/>
-          </a:xfrm>
-          <a:prstGeom prst="rect">
-            <a:avLst/>
-          </a:prstGeom>
-        </p:spPr>
-      </p:pic>
-      <p:sp useBgFill="1">
-        <p:nvSpPr>
-          <p:cNvPr id="15" name="Rectangle 14">
-            <a:extLst>
-              <a:ext uri="{FF2B5EF4-FFF2-40B4-BE49-F238E27FC236}">
-                <a16:creationId xmlns:a16="http://schemas.microsoft.com/office/drawing/2014/main" id="{E5BBB0F9-6A59-4D02-A9C7-A2D6516684CE}"/>
-              </a:ext>
-              <a:ext uri="{C183D7F6-B498-43B3-948B-1728B52AA6E4}">
-                <adec:decorative xmlns:adec="http://schemas.microsoft.com/office/drawing/2017/decorative" val="1"/>
-              </a:ext>
-            </a:extLst>
-          </p:cNvPr>
-          <p:cNvSpPr>
-            <a:spLocks noGrp="1" noRot="1" noChangeAspect="1" noMove="1" noResize="1" noEditPoints="1" noAdjustHandles="1" noChangeArrowheads="1" noChangeShapeType="1" noTextEdit="1"/>
-          </p:cNvSpPr>
-          <p:nvPr>
-            <p:extLst>
-              <p:ext uri="{386F3935-93C4-4BCD-93E2-E3B085C9AB24}">
-                <p16:designElem xmlns:p16="http://schemas.microsoft.com/office/powerpoint/2015/main" val="1"/>
-              </p:ext>
-            </p:extLst>
-          </p:nvPr>
-        </p:nvSpPr>
-        <p:spPr>
-          <a:xfrm>
-            <a:off x="7543801" y="1721922"/>
-            <a:ext cx="4218432" cy="4520560"/>
-          </a:xfrm>
-          <a:prstGeom prst="rect">
-            <a:avLst/>
-          </a:prstGeom>
-          <a:ln w="9525">
-            <a:solidFill>
-              <a:srgbClr val="EFEFEF"/>
-            </a:solidFill>
-          </a:ln>
-          <a:effectLst>
-            <a:outerShdw blurRad="50800" dist="38100" dir="2700000" algn="tl" rotWithShape="0">
-              <a:schemeClr val="bg1">
-                <a:lumMod val="85000"/>
-                <a:alpha val="30000"/>
-              </a:schemeClr>
-            </a:outerShdw>
-          </a:effectLst>
-        </p:spPr>
-        <p:style>
-          <a:lnRef idx="2">
-            <a:schemeClr val="accent1">
-              <a:shade val="50000"/>
-            </a:schemeClr>
-          </a:lnRef>
-          <a:fillRef idx="1">
-            <a:schemeClr val="accent1"/>
-          </a:fillRef>
-          <a:effectRef idx="0">
-            <a:schemeClr val="accent1"/>
-          </a:effectRef>
-          <a:fontRef idx="minor">
-            <a:schemeClr val="lt1"/>
-          </a:fontRef>
-        </p:style>
-        <p:txBody>
-          <a:bodyPr rtlCol="0" anchor="ctr"/>
-          <a:lstStyle/>
-          <a:p>
-            <a:pPr marL="0" marR="0" lvl="0" indent="0" algn="ctr" defTabSz="914400" rtl="0" eaLnBrk="1" fontAlgn="auto" latinLnBrk="0" hangingPunct="1">
-              <a:lnSpc>
-                <a:spcPct val="100000"/>
-              </a:lnSpc>
-              <a:spcBef>
-                <a:spcPts val="0"/>
-              </a:spcBef>
-              <a:spcAft>
-                <a:spcPts val="0"/>
-              </a:spcAft>
-              <a:buClrTx/>
-              <a:buSzTx/>
-              <a:buFontTx/>
-              <a:buNone/>
-              <a:tabLst/>
-              <a:defRPr/>
-            </a:pPr>
-            <a:endParaRPr kumimoji="0" lang="en-US" sz="1800" b="0" i="0" u="none" strike="noStrike" kern="1200" cap="none" spc="0" normalizeH="0" baseline="0" noProof="0">
-              <a:ln>
-                <a:noFill/>
-              </a:ln>
-              <a:solidFill>
-                <a:prstClr val="white"/>
-              </a:solidFill>
-              <a:effectLst/>
-              <a:uLnTx/>
-              <a:uFillTx/>
-              <a:latin typeface="Calibri" panose="020F0502020204030204"/>
-              <a:ea typeface="+mn-ea"/>
-              <a:cs typeface="+mn-cs"/>
-            </a:endParaRPr>
-          </a:p>
-        </p:txBody>
-      </p:sp>
-      <p:sp>
-        <p:nvSpPr>
-          <p:cNvPr id="3" name="Content Placeholder 2">
-            <a:extLst>
-              <a:ext uri="{FF2B5EF4-FFF2-40B4-BE49-F238E27FC236}">
-                <a16:creationId xmlns:a16="http://schemas.microsoft.com/office/drawing/2014/main" id="{E685463F-61AB-430E-B567-5AF4C2A5E271}"/>
-              </a:ext>
-            </a:extLst>
-          </p:cNvPr>
-          <p:cNvSpPr>
-            <a:spLocks noGrp="1"/>
-          </p:cNvSpPr>
-          <p:nvPr>
-            <p:ph idx="1"/>
-          </p:nvPr>
-        </p:nvSpPr>
-        <p:spPr>
-          <a:xfrm>
-            <a:off x="7938752" y="2020824"/>
-            <a:ext cx="3455097" cy="3959352"/>
-          </a:xfrm>
-        </p:spPr>
-        <p:txBody>
-          <a:bodyPr anchor="ctr">
-            <a:normAutofit/>
-          </a:bodyPr>
-          <a:lstStyle/>
-          <a:p>
-            <a:endParaRPr lang="en-US" sz="1800"/>
-          </a:p>
-        </p:txBody>
-      </p:sp>
-      <p:sp>
-        <p:nvSpPr>
-          <p:cNvPr id="4" name="Date Placeholder 3">
-            <a:extLst>
-              <a:ext uri="{FF2B5EF4-FFF2-40B4-BE49-F238E27FC236}">
-                <a16:creationId xmlns:a16="http://schemas.microsoft.com/office/drawing/2014/main" id="{6E31695E-3D58-4824-9B18-84111557ABB8}"/>
-              </a:ext>
-            </a:extLst>
-          </p:cNvPr>
-          <p:cNvSpPr>
-            <a:spLocks noGrp="1"/>
-          </p:cNvSpPr>
-          <p:nvPr>
-            <p:ph type="dt" sz="half" idx="10"/>
-          </p:nvPr>
-        </p:nvSpPr>
-        <p:spPr>
-          <a:xfrm>
-            <a:off x="841248" y="6356350"/>
-            <a:ext cx="2743200" cy="365125"/>
-          </a:xfrm>
-        </p:spPr>
-        <p:txBody>
-          <a:bodyPr>
-            <a:normAutofit/>
-          </a:bodyPr>
-          <a:lstStyle/>
-          <a:p>
-            <a:pPr>
-              <a:spcAft>
-                <a:spcPts val="600"/>
-              </a:spcAft>
-            </a:pPr>
-            <a:r>
-              <a:rPr lang="en-US">
-                <a:solidFill>
-                  <a:schemeClr val="tx1">
-                    <a:lumMod val="50000"/>
-                    <a:lumOff val="50000"/>
-                  </a:schemeClr>
-                </a:solidFill>
-              </a:rPr>
-              <a:t>12/4/2019</a:t>
-            </a:r>
-          </a:p>
-        </p:txBody>
-      </p:sp>
-      <p:sp>
-        <p:nvSpPr>
-          <p:cNvPr id="5" name="Slide Number Placeholder 4">
-            <a:extLst>
-              <a:ext uri="{FF2B5EF4-FFF2-40B4-BE49-F238E27FC236}">
-                <a16:creationId xmlns:a16="http://schemas.microsoft.com/office/drawing/2014/main" id="{CC3A4D84-D413-44DE-ABD8-884BFC70D8D0}"/>
-              </a:ext>
-            </a:extLst>
-          </p:cNvPr>
-          <p:cNvSpPr>
-            <a:spLocks noGrp="1"/>
-          </p:cNvSpPr>
-          <p:nvPr>
-            <p:ph type="sldNum" sz="quarter" idx="12"/>
-          </p:nvPr>
-        </p:nvSpPr>
-        <p:spPr>
-          <a:xfrm>
-            <a:off x="8595360" y="6356350"/>
-            <a:ext cx="2743200" cy="365125"/>
-          </a:xfrm>
-        </p:spPr>
-        <p:txBody>
-          <a:bodyPr>
-            <a:normAutofit/>
-          </a:bodyPr>
-          <a:lstStyle/>
-          <a:p>
-            <a:pPr>
-              <a:spcAft>
-                <a:spcPts val="600"/>
-              </a:spcAft>
-            </a:pPr>
-            <a:fld id="{87963F98-C10F-4FC1-8017-0839D2AC7CA3}" type="slidenum">
-              <a:rPr lang="en-US">
-                <a:solidFill>
-                  <a:schemeClr val="tx1">
-                    <a:lumMod val="50000"/>
-                    <a:lumOff val="50000"/>
-                  </a:schemeClr>
-                </a:solidFill>
-              </a:rPr>
-              <a:pPr>
-                <a:spcAft>
-                  <a:spcPts val="600"/>
-                </a:spcAft>
-              </a:pPr>
-              <a:t>19</a:t>
-            </a:fld>
-            <a:endParaRPr lang="en-US">
-              <a:solidFill>
-                <a:schemeClr val="tx1">
-                  <a:lumMod val="50000"/>
-                  <a:lumOff val="50000"/>
-                </a:schemeClr>
-              </a:solidFill>
-            </a:endParaRPr>
-          </a:p>
-        </p:txBody>
-      </p:sp>
+        </p:nvGraphicFramePr>
+        <p:xfrm>
+          <a:off x="5695440" y="1690688"/>
+          <a:ext cx="5830319" cy="4122931"/>
+        </p:xfrm>
+        <a:graphic>
+          <a:graphicData uri="http://schemas.openxmlformats.org/drawingml/2006/chart">
+            <c:chart xmlns:c="http://schemas.openxmlformats.org/drawingml/2006/chart" xmlns:r="http://schemas.openxmlformats.org/officeDocument/2006/relationships" r:id="rId3"/>
+          </a:graphicData>
+        </a:graphic>
+      </p:graphicFrame>
     </p:spTree>
     <p:extLst>
       <p:ext uri="{BB962C8B-B14F-4D97-AF65-F5344CB8AC3E}">
-        <p14:creationId xmlns:p14="http://schemas.microsoft.com/office/powerpoint/2010/main" val="2291633294"/>
+        <p14:creationId xmlns:p14="http://schemas.microsoft.com/office/powerpoint/2010/main" val="3731033968"/>
       </p:ext>
     </p:extLst>
   </p:cSld>
@@ -8003,8 +8803,27 @@
                 </a:solidFill>
                 <a:latin typeface="Rockwell Nova" panose="02060503020205020403" pitchFamily="18" charset="0"/>
               </a:rPr>
-              <a:t>FEATURE SELECTION</a:t>
-            </a:r>
+              <a:t>FEATURE SELECTION </a:t>
+            </a:r>
+            <a:r>
+              <a:rPr lang="en-US" sz="2000" dirty="0">
+                <a:solidFill>
+                  <a:schemeClr val="accent1">
+                    <a:lumMod val="50000"/>
+                  </a:schemeClr>
+                </a:solidFill>
+                <a:latin typeface="Rockwell Nova" panose="02060503020205020403" pitchFamily="18" charset="0"/>
+              </a:rPr>
+              <a:t>(Recursive Feature Elimination)</a:t>
+            </a:r>
+            <a:endParaRPr lang="en-US" sz="3200" dirty="0">
+              <a:solidFill>
+                <a:schemeClr val="accent1">
+                  <a:lumMod val="50000"/>
+                </a:schemeClr>
+              </a:solidFill>
+              <a:latin typeface="Rockwell Nova" panose="02060503020205020403" pitchFamily="18" charset="0"/>
+            </a:endParaRPr>
           </a:p>
         </p:txBody>
       </p:sp>
@@ -8023,7 +8842,7 @@
         <p:spPr>
           <a:xfrm>
             <a:off x="838200" y="1586204"/>
-            <a:ext cx="10993016" cy="4154984"/>
+            <a:ext cx="5422641" cy="3785652"/>
           </a:xfrm>
           <a:prstGeom prst="rect">
             <a:avLst/>
@@ -8049,7 +8868,7 @@
                 </a:solidFill>
                 <a:latin typeface="Rockwell Nova" panose="02060503020205020403" pitchFamily="18" charset="0"/>
               </a:rPr>
-              <a:t>From the exploratory analysis part, we found that Cholesterol, Blood Pressure, Weight, and Age explains the outcomes better.</a:t>
+              <a:t>We used Recursive Feature Elimination (RFE) to select the best features.</a:t>
             </a:r>
           </a:p>
           <a:p>
@@ -8066,7 +8885,7 @@
                 </a:solidFill>
                 <a:latin typeface="Rockwell Nova" panose="02060503020205020403" pitchFamily="18" charset="0"/>
               </a:rPr>
-              <a:t>However, individual evaluation and filtering of features can not discover hidden interactions between features.</a:t>
+              <a:t>RFE trains an algorithm using different subsets of features and selects the best combination.</a:t>
             </a:r>
           </a:p>
           <a:p>
@@ -8083,16 +8902,10 @@
                 </a:solidFill>
                 <a:latin typeface="Rockwell Nova" panose="02060503020205020403" pitchFamily="18" charset="0"/>
               </a:rPr>
-              <a:t>As precaution, we used Recursive Feature Elimination technique to select best features.</a:t>
-            </a:r>
-          </a:p>
-          <a:p>
-            <a:pPr marL="342900" indent="-342900">
-              <a:buFont typeface="Courier New" panose="02070309020205020404" pitchFamily="49" charset="0"/>
-              <a:buChar char="o"/>
-            </a:pPr>
-            <a:r>
-              <a:rPr lang="en-US" sz="2400" dirty="0">
+              <a:t>We used </a:t>
+            </a:r>
+            <a:r>
+              <a:rPr lang="en-US" sz="2400" i="1" dirty="0">
                 <a:solidFill>
                   <a:schemeClr val="bg2">
                     <a:lumMod val="25000"/>
@@ -8100,7 +8913,40 @@
                 </a:solidFill>
                 <a:latin typeface="Rockwell Nova" panose="02060503020205020403" pitchFamily="18" charset="0"/>
               </a:rPr>
-              <a:t>We trained and evaluated a Random Forest &amp; a Naïve Bayes model with 10-fold cross validation with different subsets of features &amp; selected the best one from them.</a:t>
+              <a:t>rfe()</a:t>
+            </a:r>
+            <a:r>
+              <a:rPr lang="en-US" sz="2400" dirty="0">
+                <a:solidFill>
+                  <a:schemeClr val="bg2">
+                    <a:lumMod val="25000"/>
+                  </a:schemeClr>
+                </a:solidFill>
+                <a:latin typeface="Rockwell Nova" panose="02060503020205020403" pitchFamily="18" charset="0"/>
+              </a:rPr>
+              <a:t> function of the </a:t>
+            </a:r>
+            <a:r>
+              <a:rPr lang="en-US" sz="2400" i="1" dirty="0">
+                <a:solidFill>
+                  <a:schemeClr val="bg2">
+                    <a:lumMod val="25000"/>
+                  </a:schemeClr>
+                </a:solidFill>
+                <a:latin typeface="Rockwell Nova" panose="02060503020205020403" pitchFamily="18" charset="0"/>
+              </a:rPr>
+              <a:t>caret</a:t>
+            </a:r>
+            <a:r>
+              <a:rPr lang="en-US" sz="2400" dirty="0">
+                <a:solidFill>
+                  <a:schemeClr val="bg2">
+                    <a:lumMod val="25000"/>
+                  </a:schemeClr>
+                </a:solidFill>
+                <a:latin typeface="Rockwell Nova" panose="02060503020205020403" pitchFamily="18" charset="0"/>
+              </a:rPr>
+              <a:t> package with Naïve Bayes algorithm.</a:t>
             </a:r>
           </a:p>
           <a:p>
@@ -8117,6 +8963,145 @@
               <a:latin typeface="Rockwell Nova" panose="02060503020205020403" pitchFamily="18" charset="0"/>
             </a:endParaRPr>
           </a:p>
+        </p:txBody>
+      </p:sp>
+      <p:sp>
+        <p:nvSpPr>
+          <p:cNvPr id="4" name="Date Placeholder 3">
+            <a:extLst>
+              <a:ext uri="{FF2B5EF4-FFF2-40B4-BE49-F238E27FC236}">
+                <a16:creationId xmlns:a16="http://schemas.microsoft.com/office/drawing/2014/main" id="{073D39D9-F71A-4C1E-A18F-01247A980266}"/>
+              </a:ext>
+            </a:extLst>
+          </p:cNvPr>
+          <p:cNvSpPr>
+            <a:spLocks noGrp="1"/>
+          </p:cNvSpPr>
+          <p:nvPr>
+            <p:ph type="dt" sz="half" idx="10"/>
+          </p:nvPr>
+        </p:nvSpPr>
+        <p:spPr/>
+        <p:txBody>
+          <a:bodyPr/>
+          <a:lstStyle/>
+          <a:p>
+            <a:r>
+              <a:rPr lang="en-US"/>
+              <a:t>12/4/2019</a:t>
+            </a:r>
+          </a:p>
+        </p:txBody>
+      </p:sp>
+      <p:sp>
+        <p:nvSpPr>
+          <p:cNvPr id="5" name="Slide Number Placeholder 4">
+            <a:extLst>
+              <a:ext uri="{FF2B5EF4-FFF2-40B4-BE49-F238E27FC236}">
+                <a16:creationId xmlns:a16="http://schemas.microsoft.com/office/drawing/2014/main" id="{B83B5B8B-B2BB-42F0-8C9F-0A36A51E1253}"/>
+              </a:ext>
+            </a:extLst>
+          </p:cNvPr>
+          <p:cNvSpPr>
+            <a:spLocks noGrp="1"/>
+          </p:cNvSpPr>
+          <p:nvPr>
+            <p:ph type="sldNum" sz="quarter" idx="12"/>
+          </p:nvPr>
+        </p:nvSpPr>
+        <p:spPr/>
+        <p:txBody>
+          <a:bodyPr/>
+          <a:lstStyle/>
+          <a:p>
+            <a:fld id="{87963F98-C10F-4FC1-8017-0839D2AC7CA3}" type="slidenum">
+              <a:rPr lang="en-US" smtClean="0"/>
+              <a:t>20</a:t>
+            </a:fld>
+            <a:endParaRPr lang="en-US"/>
+          </a:p>
+        </p:txBody>
+      </p:sp>
+      <p:pic>
+        <p:nvPicPr>
+          <p:cNvPr id="7" name="Picture 6" descr="A picture containing table, water, kitchen, man&#10;&#10;Description automatically generated">
+            <a:extLst>
+              <a:ext uri="{FF2B5EF4-FFF2-40B4-BE49-F238E27FC236}">
+                <a16:creationId xmlns:a16="http://schemas.microsoft.com/office/drawing/2014/main" id="{0FBC890D-6D25-431E-B212-E8D17CE091BB}"/>
+              </a:ext>
+            </a:extLst>
+          </p:cNvPr>
+          <p:cNvPicPr>
+            <a:picLocks noChangeAspect="1"/>
+          </p:cNvPicPr>
+          <p:nvPr/>
+        </p:nvPicPr>
+        <p:blipFill>
+          <a:blip r:embed="rId2">
+            <a:extLst>
+              <a:ext uri="{28A0092B-C50C-407E-A947-70E740481C1C}">
+                <a14:useLocalDpi xmlns:a14="http://schemas.microsoft.com/office/drawing/2010/main" val="0"/>
+              </a:ext>
+            </a:extLst>
+          </a:blip>
+          <a:stretch>
+            <a:fillRect/>
+          </a:stretch>
+        </p:blipFill>
+        <p:spPr>
+          <a:xfrm>
+            <a:off x="6580581" y="1586204"/>
+            <a:ext cx="5250635" cy="3215919"/>
+          </a:xfrm>
+          <a:prstGeom prst="rect">
+            <a:avLst/>
+          </a:prstGeom>
+        </p:spPr>
+      </p:pic>
+      <p:sp>
+        <p:nvSpPr>
+          <p:cNvPr id="8" name="TextBox 7">
+            <a:extLst>
+              <a:ext uri="{FF2B5EF4-FFF2-40B4-BE49-F238E27FC236}">
+                <a16:creationId xmlns:a16="http://schemas.microsoft.com/office/drawing/2014/main" id="{66C1E874-D9D0-47E4-A780-AFA366D01C5C}"/>
+              </a:ext>
+            </a:extLst>
+          </p:cNvPr>
+          <p:cNvSpPr txBox="1"/>
+          <p:nvPr/>
+        </p:nvSpPr>
+        <p:spPr>
+          <a:xfrm>
+            <a:off x="838200" y="5013315"/>
+            <a:ext cx="10993016" cy="1938992"/>
+          </a:xfrm>
+          <a:prstGeom prst="rect">
+            <a:avLst/>
+          </a:prstGeom>
+          <a:noFill/>
+        </p:spPr>
+        <p:txBody>
+          <a:bodyPr wrap="square" rtlCol="0">
+            <a:spAutoFit/>
+          </a:bodyPr>
+          <a:lstStyle/>
+          <a:p>
+            <a:pPr marL="342900" indent="-342900">
+              <a:buFont typeface="Courier New" panose="02070309020205020404" pitchFamily="49" charset="0"/>
+              <a:buChar char="o"/>
+            </a:pPr>
+            <a:r>
+              <a:rPr lang="en-US" sz="2400" dirty="0">
+                <a:solidFill>
+                  <a:schemeClr val="bg2">
+                    <a:lumMod val="25000"/>
+                  </a:schemeClr>
+                </a:solidFill>
+                <a:latin typeface="Rockwell Nova" panose="02060503020205020403" pitchFamily="18" charset="0"/>
+              </a:rPr>
+              <a:t>RFE yielded Systole, BloodPressure, Diastole, Age, BMI, Weight, and Cholesterol as the best features, and the performance did not improve using other features.</a:t>
+            </a:r>
+          </a:p>
           <a:p>
             <a:pPr marL="342900" indent="-342900">
               <a:buFont typeface="Courier New" panose="02070309020205020404" pitchFamily="49" charset="0"/>
@@ -8131,62 +9116,19 @@
               <a:latin typeface="Rockwell Nova" panose="02060503020205020403" pitchFamily="18" charset="0"/>
             </a:endParaRPr>
           </a:p>
-        </p:txBody>
-      </p:sp>
-      <p:sp>
-        <p:nvSpPr>
-          <p:cNvPr id="4" name="Date Placeholder 3">
-            <a:extLst>
-              <a:ext uri="{FF2B5EF4-FFF2-40B4-BE49-F238E27FC236}">
-                <a16:creationId xmlns:a16="http://schemas.microsoft.com/office/drawing/2014/main" id="{073D39D9-F71A-4C1E-A18F-01247A980266}"/>
-              </a:ext>
-            </a:extLst>
-          </p:cNvPr>
-          <p:cNvSpPr>
-            <a:spLocks noGrp="1"/>
-          </p:cNvSpPr>
-          <p:nvPr>
-            <p:ph type="dt" sz="half" idx="10"/>
-          </p:nvPr>
-        </p:nvSpPr>
-        <p:spPr/>
-        <p:txBody>
-          <a:bodyPr/>
-          <a:lstStyle/>
-          <a:p>
-            <a:r>
-              <a:rPr lang="en-US"/>
-              <a:t>12/4/2019</a:t>
-            </a:r>
-          </a:p>
-        </p:txBody>
-      </p:sp>
-      <p:sp>
-        <p:nvSpPr>
-          <p:cNvPr id="5" name="Slide Number Placeholder 4">
-            <a:extLst>
-              <a:ext uri="{FF2B5EF4-FFF2-40B4-BE49-F238E27FC236}">
-                <a16:creationId xmlns:a16="http://schemas.microsoft.com/office/drawing/2014/main" id="{B83B5B8B-B2BB-42F0-8C9F-0A36A51E1253}"/>
-              </a:ext>
-            </a:extLst>
-          </p:cNvPr>
-          <p:cNvSpPr>
-            <a:spLocks noGrp="1"/>
-          </p:cNvSpPr>
-          <p:nvPr>
-            <p:ph type="sldNum" sz="quarter" idx="12"/>
-          </p:nvPr>
-        </p:nvSpPr>
-        <p:spPr/>
-        <p:txBody>
-          <a:bodyPr/>
-          <a:lstStyle/>
-          <a:p>
-            <a:fld id="{87963F98-C10F-4FC1-8017-0839D2AC7CA3}" type="slidenum">
-              <a:rPr lang="en-US" smtClean="0"/>
-              <a:t>20</a:t>
-            </a:fld>
-            <a:endParaRPr lang="en-US"/>
+          <a:p>
+            <a:pPr marL="342900" indent="-342900">
+              <a:buFont typeface="Courier New" panose="02070309020205020404" pitchFamily="49" charset="0"/>
+              <a:buChar char="o"/>
+            </a:pPr>
+            <a:endParaRPr lang="en-US" sz="2400" dirty="0">
+              <a:solidFill>
+                <a:schemeClr val="bg2">
+                  <a:lumMod val="25000"/>
+                </a:schemeClr>
+              </a:solidFill>
+              <a:latin typeface="Rockwell Nova" panose="02060503020205020403" pitchFamily="18" charset="0"/>
+            </a:endParaRPr>
           </a:p>
         </p:txBody>
       </p:sp>

</xml_diff>

<commit_message>
presentation decision tree feature selection
</commit_message>
<xml_diff>
--- a/presentation.pptx
+++ b/presentation.pptx
@@ -5,7 +5,7 @@
     <p:sldMasterId id="2147483648" r:id="rId1"/>
   </p:sldMasterIdLst>
   <p:notesMasterIdLst>
-    <p:notesMasterId r:id="rId24"/>
+    <p:notesMasterId r:id="rId26"/>
   </p:notesMasterIdLst>
   <p:sldIdLst>
     <p:sldId id="256" r:id="rId2"/>
@@ -28,8 +28,10 @@
     <p:sldId id="283" r:id="rId19"/>
     <p:sldId id="284" r:id="rId20"/>
     <p:sldId id="279" r:id="rId21"/>
-    <p:sldId id="264" r:id="rId22"/>
-    <p:sldId id="265" r:id="rId23"/>
+    <p:sldId id="285" r:id="rId22"/>
+    <p:sldId id="286" r:id="rId23"/>
+    <p:sldId id="264" r:id="rId24"/>
+    <p:sldId id="265" r:id="rId25"/>
   </p:sldIdLst>
   <p:sldSz cx="12192000" cy="6858000"/>
   <p:notesSz cx="6858000" cy="9144000"/>
@@ -234,6 +236,11 @@
               </a:ln>
               <a:effectLst/>
             </c:spPr>
+            <c:extLst>
+              <c:ext xmlns:c16="http://schemas.microsoft.com/office/drawing/2014/chart" uri="{C3380CC4-5D6E-409C-BE32-E72D297353CC}">
+                <c16:uniqueId val="{00000003-D8C0-4C8E-B578-6C5A0D1DAA2A}"/>
+              </c:ext>
+            </c:extLst>
           </c:dPt>
           <c:dLbls>
             <c:spPr>
@@ -1568,6 +1575,90 @@
 </p:notes>
 </file>
 
+<file path=ppt/notesSlides/notesSlide12.xml><?xml version="1.0" encoding="utf-8"?>
+<p:notes xmlns:a="http://schemas.openxmlformats.org/drawingml/2006/main" xmlns:r="http://schemas.openxmlformats.org/officeDocument/2006/relationships" xmlns:p="http://schemas.openxmlformats.org/presentationml/2006/main">
+  <p:cSld>
+    <p:spTree>
+      <p:nvGrpSpPr>
+        <p:cNvPr id="1" name=""/>
+        <p:cNvGrpSpPr/>
+        <p:nvPr/>
+      </p:nvGrpSpPr>
+      <p:grpSpPr>
+        <a:xfrm>
+          <a:off x="0" y="0"/>
+          <a:ext cx="0" cy="0"/>
+          <a:chOff x="0" y="0"/>
+          <a:chExt cx="0" cy="0"/>
+        </a:xfrm>
+      </p:grpSpPr>
+      <p:sp>
+        <p:nvSpPr>
+          <p:cNvPr id="2" name="Slide Image Placeholder 1"/>
+          <p:cNvSpPr>
+            <a:spLocks noGrp="1" noRot="1" noChangeAspect="1"/>
+          </p:cNvSpPr>
+          <p:nvPr>
+            <p:ph type="sldImg"/>
+          </p:nvPr>
+        </p:nvSpPr>
+        <p:spPr/>
+      </p:sp>
+      <p:sp>
+        <p:nvSpPr>
+          <p:cNvPr id="3" name="Notes Placeholder 2"/>
+          <p:cNvSpPr>
+            <a:spLocks noGrp="1"/>
+          </p:cNvSpPr>
+          <p:nvPr>
+            <p:ph type="body" idx="1"/>
+          </p:nvPr>
+        </p:nvSpPr>
+        <p:spPr/>
+        <p:txBody>
+          <a:bodyPr/>
+          <a:lstStyle/>
+          <a:p>
+            <a:endParaRPr lang="en-US" dirty="0"/>
+          </a:p>
+        </p:txBody>
+      </p:sp>
+      <p:sp>
+        <p:nvSpPr>
+          <p:cNvPr id="4" name="Slide Number Placeholder 3"/>
+          <p:cNvSpPr>
+            <a:spLocks noGrp="1"/>
+          </p:cNvSpPr>
+          <p:nvPr>
+            <p:ph type="sldNum" sz="quarter" idx="5"/>
+          </p:nvPr>
+        </p:nvSpPr>
+        <p:spPr/>
+        <p:txBody>
+          <a:bodyPr/>
+          <a:lstStyle/>
+          <a:p>
+            <a:fld id="{CF8315F9-90FD-4DB5-9225-8838ABDCEE34}" type="slidenum">
+              <a:rPr lang="en-US" smtClean="0"/>
+              <a:t>22</a:t>
+            </a:fld>
+            <a:endParaRPr lang="en-US"/>
+          </a:p>
+        </p:txBody>
+      </p:sp>
+    </p:spTree>
+    <p:extLst>
+      <p:ext uri="{BB962C8B-B14F-4D97-AF65-F5344CB8AC3E}">
+        <p14:creationId xmlns:p14="http://schemas.microsoft.com/office/powerpoint/2010/main" val="805277229"/>
+      </p:ext>
+    </p:extLst>
+  </p:cSld>
+  <p:clrMapOvr>
+    <a:masterClrMapping/>
+  </p:clrMapOvr>
+</p:notes>
+</file>
+
 <file path=ppt/notesSlides/notesSlide2.xml><?xml version="1.0" encoding="utf-8"?>
 <p:notes xmlns:a="http://schemas.openxmlformats.org/drawingml/2006/main" xmlns:r="http://schemas.openxmlformats.org/officeDocument/2006/relationships" xmlns:p="http://schemas.openxmlformats.org/presentationml/2006/main">
   <p:cSld>
@@ -9167,7 +9258,7 @@
           <p:cNvPr id="2" name="Title 1">
             <a:extLst>
               <a:ext uri="{FF2B5EF4-FFF2-40B4-BE49-F238E27FC236}">
-                <a16:creationId xmlns:a16="http://schemas.microsoft.com/office/drawing/2014/main" id="{5E1A2851-B6DE-443C-B478-A5CE31ED592D}"/>
+                <a16:creationId xmlns:a16="http://schemas.microsoft.com/office/drawing/2014/main" id="{BB0D0921-96AE-4FEC-B1D7-21D5580C3F23}"/>
               </a:ext>
             </a:extLst>
           </p:cNvPr>
@@ -9192,19 +9283,118 @@
                     <a:lumMod val="50000"/>
                   </a:schemeClr>
                 </a:solidFill>
-                <a:latin typeface="Georgia Pro Cond" panose="02040506050405020303" pitchFamily="18" charset="0"/>
-              </a:rPr>
-              <a:t>MODELLING</a:t>
-            </a:r>
-          </a:p>
-        </p:txBody>
-      </p:sp>
-      <p:sp>
-        <p:nvSpPr>
-          <p:cNvPr id="3" name="Date Placeholder 2">
-            <a:extLst>
-              <a:ext uri="{FF2B5EF4-FFF2-40B4-BE49-F238E27FC236}">
-                <a16:creationId xmlns:a16="http://schemas.microsoft.com/office/drawing/2014/main" id="{6202BB9D-80AD-44A1-B3CA-66E5054E0B7C}"/>
+                <a:latin typeface="Rockwell Nova" panose="02060503020205020403" pitchFamily="18" charset="0"/>
+              </a:rPr>
+              <a:t>FEATURE SELECTION </a:t>
+            </a:r>
+            <a:r>
+              <a:rPr lang="en-US" sz="2000" dirty="0">
+                <a:solidFill>
+                  <a:schemeClr val="accent1">
+                    <a:lumMod val="50000"/>
+                  </a:schemeClr>
+                </a:solidFill>
+                <a:latin typeface="Rockwell Nova" panose="02060503020205020403" pitchFamily="18" charset="0"/>
+              </a:rPr>
+              <a:t>(Decision Tree)</a:t>
+            </a:r>
+            <a:endParaRPr lang="en-US" sz="3200" dirty="0">
+              <a:solidFill>
+                <a:schemeClr val="accent1">
+                  <a:lumMod val="50000"/>
+                </a:schemeClr>
+              </a:solidFill>
+              <a:latin typeface="Rockwell Nova" panose="02060503020205020403" pitchFamily="18" charset="0"/>
+            </a:endParaRPr>
+          </a:p>
+        </p:txBody>
+      </p:sp>
+      <p:sp>
+        <p:nvSpPr>
+          <p:cNvPr id="3" name="TextBox 2">
+            <a:extLst>
+              <a:ext uri="{FF2B5EF4-FFF2-40B4-BE49-F238E27FC236}">
+                <a16:creationId xmlns:a16="http://schemas.microsoft.com/office/drawing/2014/main" id="{844C0F2F-D499-47DB-987F-E7D869D73F1C}"/>
+              </a:ext>
+            </a:extLst>
+          </p:cNvPr>
+          <p:cNvSpPr txBox="1"/>
+          <p:nvPr/>
+        </p:nvSpPr>
+        <p:spPr>
+          <a:xfrm>
+            <a:off x="838199" y="4510670"/>
+            <a:ext cx="10515600" cy="1569660"/>
+          </a:xfrm>
+          <a:prstGeom prst="rect">
+            <a:avLst/>
+          </a:prstGeom>
+          <a:noFill/>
+        </p:spPr>
+        <p:txBody>
+          <a:bodyPr wrap="square" rtlCol="0">
+            <a:spAutoFit/>
+          </a:bodyPr>
+          <a:lstStyle/>
+          <a:p>
+            <a:pPr marL="342900" indent="-342900">
+              <a:buFont typeface="Courier New" panose="02070309020205020404" pitchFamily="49" charset="0"/>
+              <a:buChar char="o"/>
+            </a:pPr>
+            <a:r>
+              <a:rPr lang="en-US" sz="2400" dirty="0">
+                <a:solidFill>
+                  <a:schemeClr val="bg2">
+                    <a:lumMod val="25000"/>
+                  </a:schemeClr>
+                </a:solidFill>
+                <a:latin typeface="Rockwell Nova" panose="02060503020205020403" pitchFamily="18" charset="0"/>
+              </a:rPr>
+              <a:t>We checked for features with near zero variance but found none.</a:t>
+            </a:r>
+          </a:p>
+          <a:p>
+            <a:pPr marL="342900" indent="-342900">
+              <a:buFont typeface="Courier New" panose="02070309020205020404" pitchFamily="49" charset="0"/>
+              <a:buChar char="o"/>
+            </a:pPr>
+            <a:r>
+              <a:rPr lang="en-US" sz="2400" dirty="0">
+                <a:solidFill>
+                  <a:schemeClr val="bg2">
+                    <a:lumMod val="25000"/>
+                  </a:schemeClr>
+                </a:solidFill>
+                <a:latin typeface="Rockwell Nova" panose="02060503020205020403" pitchFamily="18" charset="0"/>
+              </a:rPr>
+              <a:t>We checked for linearly dependent features but found none.</a:t>
+            </a:r>
+          </a:p>
+          <a:p>
+            <a:pPr marL="342900" indent="-342900">
+              <a:buFont typeface="Courier New" panose="02070309020205020404" pitchFamily="49" charset="0"/>
+              <a:buChar char="o"/>
+            </a:pPr>
+            <a:r>
+              <a:rPr lang="en-US" sz="2400" dirty="0">
+                <a:solidFill>
+                  <a:schemeClr val="bg2">
+                    <a:lumMod val="25000"/>
+                  </a:schemeClr>
+                </a:solidFill>
+                <a:latin typeface="Rockwell Nova" panose="02060503020205020403" pitchFamily="18" charset="0"/>
+              </a:rPr>
+              <a:t>We checked for correlated features, and found that only BMI and weight are highly correlated, which was obvious.</a:t>
+            </a:r>
+          </a:p>
+        </p:txBody>
+      </p:sp>
+      <p:sp>
+        <p:nvSpPr>
+          <p:cNvPr id="4" name="Date Placeholder 3">
+            <a:extLst>
+              <a:ext uri="{FF2B5EF4-FFF2-40B4-BE49-F238E27FC236}">
+                <a16:creationId xmlns:a16="http://schemas.microsoft.com/office/drawing/2014/main" id="{073D39D9-F71A-4C1E-A18F-01247A980266}"/>
               </a:ext>
             </a:extLst>
           </p:cNvPr>
@@ -9232,7 +9422,7 @@
           <p:cNvPr id="5" name="Slide Number Placeholder 4">
             <a:extLst>
               <a:ext uri="{FF2B5EF4-FFF2-40B4-BE49-F238E27FC236}">
-                <a16:creationId xmlns:a16="http://schemas.microsoft.com/office/drawing/2014/main" id="{4646DC2E-D261-4A96-ACC8-B6992B7CB69A}"/>
+                <a16:creationId xmlns:a16="http://schemas.microsoft.com/office/drawing/2014/main" id="{B83B5B8B-B2BB-42F0-8C9F-0A36A51E1253}"/>
               </a:ext>
             </a:extLst>
           </p:cNvPr>
@@ -9256,10 +9446,382 @@
           </a:p>
         </p:txBody>
       </p:sp>
+      <p:graphicFrame>
+        <p:nvGraphicFramePr>
+          <p:cNvPr id="6" name="Table 8">
+            <a:extLst>
+              <a:ext uri="{FF2B5EF4-FFF2-40B4-BE49-F238E27FC236}">
+                <a16:creationId xmlns:a16="http://schemas.microsoft.com/office/drawing/2014/main" id="{F09EF98B-7A63-457F-A8EC-226D63863940}"/>
+              </a:ext>
+            </a:extLst>
+          </p:cNvPr>
+          <p:cNvGraphicFramePr>
+            <a:graphicFrameLocks noGrp="1"/>
+          </p:cNvGraphicFramePr>
+          <p:nvPr>
+            <p:extLst>
+              <p:ext uri="{D42A27DB-BD31-4B8C-83A1-F6EECF244321}">
+                <p14:modId xmlns:p14="http://schemas.microsoft.com/office/powerpoint/2010/main" val="542064288"/>
+              </p:ext>
+            </p:extLst>
+          </p:nvPr>
+        </p:nvGraphicFramePr>
+        <p:xfrm>
+          <a:off x="1168202" y="3388011"/>
+          <a:ext cx="9855593" cy="1042912"/>
+        </p:xfrm>
+        <a:graphic>
+          <a:graphicData uri="http://schemas.openxmlformats.org/drawingml/2006/table">
+            <a:tbl>
+              <a:tblPr firstCol="1">
+                <a:tableStyleId>{5C22544A-7EE6-4342-B048-85BDC9FD1C3A}</a:tableStyleId>
+              </a:tblPr>
+              <a:tblGrid>
+                <a:gridCol w="1738339">
+                  <a:extLst>
+                    <a:ext uri="{9D8B030D-6E8A-4147-A177-3AD203B41FA5}">
+                      <a16:colId xmlns:a16="http://schemas.microsoft.com/office/drawing/2014/main" val="3603662796"/>
+                    </a:ext>
+                  </a:extLst>
+                </a:gridCol>
+                <a:gridCol w="1175019">
+                  <a:extLst>
+                    <a:ext uri="{9D8B030D-6E8A-4147-A177-3AD203B41FA5}">
+                      <a16:colId xmlns:a16="http://schemas.microsoft.com/office/drawing/2014/main" val="1085636841"/>
+                    </a:ext>
+                  </a:extLst>
+                </a:gridCol>
+                <a:gridCol w="1981893">
+                  <a:extLst>
+                    <a:ext uri="{9D8B030D-6E8A-4147-A177-3AD203B41FA5}">
+                      <a16:colId xmlns:a16="http://schemas.microsoft.com/office/drawing/2014/main" val="2337802212"/>
+                    </a:ext>
+                  </a:extLst>
+                </a:gridCol>
+                <a:gridCol w="1224724">
+                  <a:extLst>
+                    <a:ext uri="{9D8B030D-6E8A-4147-A177-3AD203B41FA5}">
+                      <a16:colId xmlns:a16="http://schemas.microsoft.com/office/drawing/2014/main" val="1269004687"/>
+                    </a:ext>
+                  </a:extLst>
+                </a:gridCol>
+                <a:gridCol w="1034190">
+                  <a:extLst>
+                    <a:ext uri="{9D8B030D-6E8A-4147-A177-3AD203B41FA5}">
+                      <a16:colId xmlns:a16="http://schemas.microsoft.com/office/drawing/2014/main" val="3646290293"/>
+                    </a:ext>
+                  </a:extLst>
+                </a:gridCol>
+                <a:gridCol w="1133599">
+                  <a:extLst>
+                    <a:ext uri="{9D8B030D-6E8A-4147-A177-3AD203B41FA5}">
+                      <a16:colId xmlns:a16="http://schemas.microsoft.com/office/drawing/2014/main" val="117005064"/>
+                    </a:ext>
+                  </a:extLst>
+                </a:gridCol>
+                <a:gridCol w="1567829">
+                  <a:extLst>
+                    <a:ext uri="{9D8B030D-6E8A-4147-A177-3AD203B41FA5}">
+                      <a16:colId xmlns:a16="http://schemas.microsoft.com/office/drawing/2014/main" val="2575613395"/>
+                    </a:ext>
+                  </a:extLst>
+                </a:gridCol>
+              </a:tblGrid>
+              <a:tr h="521456">
+                <a:tc>
+                  <a:txBody>
+                    <a:bodyPr/>
+                    <a:lstStyle/>
+                    <a:p>
+                      <a:r>
+                        <a:rPr lang="en-US" dirty="0">
+                          <a:latin typeface="Rockwell Nova" panose="02060503020205020403" pitchFamily="18" charset="0"/>
+                        </a:rPr>
+                        <a:t>Feature</a:t>
+                      </a:r>
+                    </a:p>
+                  </a:txBody>
+                  <a:tcPr/>
+                </a:tc>
+                <a:tc>
+                  <a:txBody>
+                    <a:bodyPr/>
+                    <a:lstStyle/>
+                    <a:p>
+                      <a:r>
+                        <a:rPr lang="en-US" dirty="0">
+                          <a:latin typeface="Rockwell Nova" panose="02060503020205020403" pitchFamily="18" charset="0"/>
+                        </a:rPr>
+                        <a:t>Systole</a:t>
+                      </a:r>
+                    </a:p>
+                  </a:txBody>
+                  <a:tcPr/>
+                </a:tc>
+                <a:tc>
+                  <a:txBody>
+                    <a:bodyPr/>
+                    <a:lstStyle/>
+                    <a:p>
+                      <a:r>
+                        <a:rPr lang="en-US" dirty="0">
+                          <a:latin typeface="Rockwell Nova" panose="02060503020205020403" pitchFamily="18" charset="0"/>
+                        </a:rPr>
+                        <a:t>BloodPressure</a:t>
+                      </a:r>
+                    </a:p>
+                  </a:txBody>
+                  <a:tcPr/>
+                </a:tc>
+                <a:tc>
+                  <a:txBody>
+                    <a:bodyPr/>
+                    <a:lstStyle/>
+                    <a:p>
+                      <a:r>
+                        <a:rPr lang="en-US" dirty="0">
+                          <a:latin typeface="Rockwell Nova" panose="02060503020205020403" pitchFamily="18" charset="0"/>
+                        </a:rPr>
+                        <a:t>Diastole</a:t>
+                      </a:r>
+                    </a:p>
+                  </a:txBody>
+                  <a:tcPr/>
+                </a:tc>
+                <a:tc>
+                  <a:txBody>
+                    <a:bodyPr/>
+                    <a:lstStyle/>
+                    <a:p>
+                      <a:r>
+                        <a:rPr lang="en-US" dirty="0">
+                          <a:latin typeface="Rockwell Nova" panose="02060503020205020403" pitchFamily="18" charset="0"/>
+                        </a:rPr>
+                        <a:t>BMI</a:t>
+                      </a:r>
+                    </a:p>
+                  </a:txBody>
+                  <a:tcPr/>
+                </a:tc>
+                <a:tc>
+                  <a:txBody>
+                    <a:bodyPr/>
+                    <a:lstStyle/>
+                    <a:p>
+                      <a:r>
+                        <a:rPr lang="en-US" dirty="0">
+                          <a:latin typeface="Rockwell Nova" panose="02060503020205020403" pitchFamily="18" charset="0"/>
+                        </a:rPr>
+                        <a:t>Weight</a:t>
+                      </a:r>
+                    </a:p>
+                  </a:txBody>
+                  <a:tcPr/>
+                </a:tc>
+                <a:tc>
+                  <a:txBody>
+                    <a:bodyPr/>
+                    <a:lstStyle/>
+                    <a:p>
+                      <a:r>
+                        <a:rPr lang="en-US" dirty="0">
+                          <a:latin typeface="Rockwell Nova" panose="02060503020205020403" pitchFamily="18" charset="0"/>
+                        </a:rPr>
+                        <a:t>Cholesterol</a:t>
+                      </a:r>
+                    </a:p>
+                  </a:txBody>
+                  <a:tcPr/>
+                </a:tc>
+                <a:extLst>
+                  <a:ext uri="{0D108BD9-81ED-4DB2-BD59-A6C34878D82A}">
+                    <a16:rowId xmlns:a16="http://schemas.microsoft.com/office/drawing/2014/main" val="673406002"/>
+                  </a:ext>
+                </a:extLst>
+              </a:tr>
+              <a:tr h="521456">
+                <a:tc>
+                  <a:txBody>
+                    <a:bodyPr/>
+                    <a:lstStyle/>
+                    <a:p>
+                      <a:r>
+                        <a:rPr lang="en-US" dirty="0">
+                          <a:latin typeface="Rockwell Nova" panose="02060503020205020403" pitchFamily="18" charset="0"/>
+                        </a:rPr>
+                        <a:t>Importance</a:t>
+                      </a:r>
+                    </a:p>
+                  </a:txBody>
+                  <a:tcPr/>
+                </a:tc>
+                <a:tc>
+                  <a:txBody>
+                    <a:bodyPr/>
+                    <a:lstStyle/>
+                    <a:p>
+                      <a:r>
+                        <a:rPr lang="en-US" dirty="0">
+                          <a:latin typeface="Rockwell Nova" panose="02060503020205020403" pitchFamily="18" charset="0"/>
+                        </a:rPr>
+                        <a:t>4941.37</a:t>
+                      </a:r>
+                    </a:p>
+                  </a:txBody>
+                  <a:tcPr/>
+                </a:tc>
+                <a:tc>
+                  <a:txBody>
+                    <a:bodyPr/>
+                    <a:lstStyle/>
+                    <a:p>
+                      <a:r>
+                        <a:rPr lang="en-US" dirty="0">
+                          <a:latin typeface="Rockwell Nova" panose="02060503020205020403" pitchFamily="18" charset="0"/>
+                        </a:rPr>
+                        <a:t>3654.02</a:t>
+                      </a:r>
+                    </a:p>
+                  </a:txBody>
+                  <a:tcPr/>
+                </a:tc>
+                <a:tc>
+                  <a:txBody>
+                    <a:bodyPr/>
+                    <a:lstStyle/>
+                    <a:p>
+                      <a:r>
+                        <a:rPr lang="en-US" dirty="0">
+                          <a:latin typeface="Rockwell Nova" panose="02060503020205020403" pitchFamily="18" charset="0"/>
+                        </a:rPr>
+                        <a:t>2915.97</a:t>
+                      </a:r>
+                    </a:p>
+                  </a:txBody>
+                  <a:tcPr/>
+                </a:tc>
+                <a:tc>
+                  <a:txBody>
+                    <a:bodyPr/>
+                    <a:lstStyle/>
+                    <a:p>
+                      <a:r>
+                        <a:rPr lang="en-US" dirty="0">
+                          <a:latin typeface="Rockwell Nova" panose="02060503020205020403" pitchFamily="18" charset="0"/>
+                        </a:rPr>
+                        <a:t>465.89</a:t>
+                      </a:r>
+                    </a:p>
+                  </a:txBody>
+                  <a:tcPr/>
+                </a:tc>
+                <a:tc>
+                  <a:txBody>
+                    <a:bodyPr/>
+                    <a:lstStyle/>
+                    <a:p>
+                      <a:r>
+                        <a:rPr lang="en-US" dirty="0">
+                          <a:latin typeface="Rockwell Nova" panose="02060503020205020403" pitchFamily="18" charset="0"/>
+                        </a:rPr>
+                        <a:t>423.25</a:t>
+                      </a:r>
+                    </a:p>
+                  </a:txBody>
+                  <a:tcPr/>
+                </a:tc>
+                <a:tc>
+                  <a:txBody>
+                    <a:bodyPr/>
+                    <a:lstStyle/>
+                    <a:p>
+                      <a:r>
+                        <a:rPr lang="en-US" dirty="0">
+                          <a:latin typeface="Rockwell Nova" panose="02060503020205020403" pitchFamily="18" charset="0"/>
+                        </a:rPr>
+                        <a:t>405.60</a:t>
+                      </a:r>
+                    </a:p>
+                  </a:txBody>
+                  <a:tcPr/>
+                </a:tc>
+                <a:extLst>
+                  <a:ext uri="{0D108BD9-81ED-4DB2-BD59-A6C34878D82A}">
+                    <a16:rowId xmlns:a16="http://schemas.microsoft.com/office/drawing/2014/main" val="3685076478"/>
+                  </a:ext>
+                </a:extLst>
+              </a:tr>
+            </a:tbl>
+          </a:graphicData>
+        </a:graphic>
+      </p:graphicFrame>
+      <p:sp>
+        <p:nvSpPr>
+          <p:cNvPr id="10" name="TextBox 9">
+            <a:extLst>
+              <a:ext uri="{FF2B5EF4-FFF2-40B4-BE49-F238E27FC236}">
+                <a16:creationId xmlns:a16="http://schemas.microsoft.com/office/drawing/2014/main" id="{3F18858F-5154-40C7-9BF5-97BDFE76F46F}"/>
+              </a:ext>
+            </a:extLst>
+          </p:cNvPr>
+          <p:cNvSpPr txBox="1"/>
+          <p:nvPr/>
+        </p:nvSpPr>
+        <p:spPr>
+          <a:xfrm>
+            <a:off x="838199" y="1738604"/>
+            <a:ext cx="10515600" cy="1569660"/>
+          </a:xfrm>
+          <a:prstGeom prst="rect">
+            <a:avLst/>
+          </a:prstGeom>
+          <a:noFill/>
+        </p:spPr>
+        <p:txBody>
+          <a:bodyPr wrap="square" rtlCol="0">
+            <a:spAutoFit/>
+          </a:bodyPr>
+          <a:lstStyle/>
+          <a:p>
+            <a:pPr marL="342900" indent="-342900">
+              <a:buFont typeface="Courier New" panose="02070309020205020404" pitchFamily="49" charset="0"/>
+              <a:buChar char="o"/>
+            </a:pPr>
+            <a:r>
+              <a:rPr lang="en-US" sz="2400" dirty="0">
+                <a:solidFill>
+                  <a:schemeClr val="bg2">
+                    <a:lumMod val="25000"/>
+                  </a:schemeClr>
+                </a:solidFill>
+                <a:latin typeface="Rockwell Nova" panose="02060503020205020403" pitchFamily="18" charset="0"/>
+              </a:rPr>
+              <a:t>We also used Decision Tree to extract the best features that explain the class variance.</a:t>
+            </a:r>
+          </a:p>
+          <a:p>
+            <a:pPr marL="342900" indent="-342900">
+              <a:buFont typeface="Courier New" panose="02070309020205020404" pitchFamily="49" charset="0"/>
+              <a:buChar char="o"/>
+            </a:pPr>
+            <a:r>
+              <a:rPr lang="en-US" sz="2400" dirty="0">
+                <a:solidFill>
+                  <a:schemeClr val="bg2">
+                    <a:lumMod val="25000"/>
+                  </a:schemeClr>
+                </a:solidFill>
+                <a:latin typeface="Rockwell Nova" panose="02060503020205020403" pitchFamily="18" charset="0"/>
+              </a:rPr>
+              <a:t>Decision Tree yielded Systole, BloodPressure, Diastole, BMI, Weight, and Cholesterol as the best 6 features.</a:t>
+            </a:r>
+          </a:p>
+        </p:txBody>
+      </p:sp>
     </p:spTree>
     <p:extLst>
       <p:ext uri="{BB962C8B-B14F-4D97-AF65-F5344CB8AC3E}">
-        <p14:creationId xmlns:p14="http://schemas.microsoft.com/office/powerpoint/2010/main" val="1422923119"/>
+        <p14:creationId xmlns:p14="http://schemas.microsoft.com/office/powerpoint/2010/main" val="1635265990"/>
       </p:ext>
     </p:extLst>
   </p:cSld>
@@ -9291,6 +9853,296 @@
           <p:cNvPr id="2" name="Title 1">
             <a:extLst>
               <a:ext uri="{FF2B5EF4-FFF2-40B4-BE49-F238E27FC236}">
+                <a16:creationId xmlns:a16="http://schemas.microsoft.com/office/drawing/2014/main" id="{BB0D0921-96AE-4FEC-B1D7-21D5580C3F23}"/>
+              </a:ext>
+            </a:extLst>
+          </p:cNvPr>
+          <p:cNvSpPr>
+            <a:spLocks noGrp="1"/>
+          </p:cNvSpPr>
+          <p:nvPr>
+            <p:ph type="title"/>
+          </p:nvPr>
+        </p:nvSpPr>
+        <p:spPr/>
+        <p:txBody>
+          <a:bodyPr>
+            <a:normAutofit/>
+          </a:bodyPr>
+          <a:lstStyle/>
+          <a:p>
+            <a:r>
+              <a:rPr lang="en-US" sz="3200" dirty="0">
+                <a:solidFill>
+                  <a:schemeClr val="accent1">
+                    <a:lumMod val="50000"/>
+                  </a:schemeClr>
+                </a:solidFill>
+                <a:latin typeface="Rockwell Nova" panose="02060503020205020403" pitchFamily="18" charset="0"/>
+              </a:rPr>
+              <a:t>FEATURE SELECTION</a:t>
+            </a:r>
+          </a:p>
+        </p:txBody>
+      </p:sp>
+      <p:sp>
+        <p:nvSpPr>
+          <p:cNvPr id="4" name="Date Placeholder 3">
+            <a:extLst>
+              <a:ext uri="{FF2B5EF4-FFF2-40B4-BE49-F238E27FC236}">
+                <a16:creationId xmlns:a16="http://schemas.microsoft.com/office/drawing/2014/main" id="{073D39D9-F71A-4C1E-A18F-01247A980266}"/>
+              </a:ext>
+            </a:extLst>
+          </p:cNvPr>
+          <p:cNvSpPr>
+            <a:spLocks noGrp="1"/>
+          </p:cNvSpPr>
+          <p:nvPr>
+            <p:ph type="dt" sz="half" idx="10"/>
+          </p:nvPr>
+        </p:nvSpPr>
+        <p:spPr/>
+        <p:txBody>
+          <a:bodyPr/>
+          <a:lstStyle/>
+          <a:p>
+            <a:r>
+              <a:rPr lang="en-US"/>
+              <a:t>12/4/2019</a:t>
+            </a:r>
+          </a:p>
+        </p:txBody>
+      </p:sp>
+      <p:sp>
+        <p:nvSpPr>
+          <p:cNvPr id="5" name="Slide Number Placeholder 4">
+            <a:extLst>
+              <a:ext uri="{FF2B5EF4-FFF2-40B4-BE49-F238E27FC236}">
+                <a16:creationId xmlns:a16="http://schemas.microsoft.com/office/drawing/2014/main" id="{B83B5B8B-B2BB-42F0-8C9F-0A36A51E1253}"/>
+              </a:ext>
+            </a:extLst>
+          </p:cNvPr>
+          <p:cNvSpPr>
+            <a:spLocks noGrp="1"/>
+          </p:cNvSpPr>
+          <p:nvPr>
+            <p:ph type="sldNum" sz="quarter" idx="12"/>
+          </p:nvPr>
+        </p:nvSpPr>
+        <p:spPr/>
+        <p:txBody>
+          <a:bodyPr/>
+          <a:lstStyle/>
+          <a:p>
+            <a:fld id="{87963F98-C10F-4FC1-8017-0839D2AC7CA3}" type="slidenum">
+              <a:rPr lang="en-US" smtClean="0"/>
+              <a:t>22</a:t>
+            </a:fld>
+            <a:endParaRPr lang="en-US"/>
+          </a:p>
+        </p:txBody>
+      </p:sp>
+      <p:sp>
+        <p:nvSpPr>
+          <p:cNvPr id="10" name="TextBox 9">
+            <a:extLst>
+              <a:ext uri="{FF2B5EF4-FFF2-40B4-BE49-F238E27FC236}">
+                <a16:creationId xmlns:a16="http://schemas.microsoft.com/office/drawing/2014/main" id="{C183396C-B0D4-43EA-85D1-771B444483EF}"/>
+              </a:ext>
+            </a:extLst>
+          </p:cNvPr>
+          <p:cNvSpPr txBox="1"/>
+          <p:nvPr/>
+        </p:nvSpPr>
+        <p:spPr>
+          <a:xfrm>
+            <a:off x="838199" y="5156021"/>
+            <a:ext cx="10515600" cy="1200329"/>
+          </a:xfrm>
+          <a:prstGeom prst="rect">
+            <a:avLst/>
+          </a:prstGeom>
+          <a:noFill/>
+        </p:spPr>
+        <p:txBody>
+          <a:bodyPr wrap="square" rtlCol="0">
+            <a:spAutoFit/>
+          </a:bodyPr>
+          <a:lstStyle/>
+          <a:p>
+            <a:r>
+              <a:rPr lang="en-US" sz="2400" dirty="0">
+                <a:solidFill>
+                  <a:schemeClr val="bg2">
+                    <a:lumMod val="25000"/>
+                  </a:schemeClr>
+                </a:solidFill>
+                <a:latin typeface="Rockwell Nova" panose="02060503020205020403" pitchFamily="18" charset="0"/>
+              </a:rPr>
+              <a:t>As seen in the summary statistics, invalid values and outliers of systolic and diastolic blood pressures, Weight, and Height has been removed after data cleaning.</a:t>
+            </a:r>
+          </a:p>
+        </p:txBody>
+      </p:sp>
+    </p:spTree>
+    <p:extLst>
+      <p:ext uri="{BB962C8B-B14F-4D97-AF65-F5344CB8AC3E}">
+        <p14:creationId xmlns:p14="http://schemas.microsoft.com/office/powerpoint/2010/main" val="2883083118"/>
+      </p:ext>
+    </p:extLst>
+  </p:cSld>
+  <p:clrMapOvr>
+    <a:masterClrMapping/>
+  </p:clrMapOvr>
+</p:sld>
+</file>
+
+<file path=ppt/slides/slide23.xml><?xml version="1.0" encoding="utf-8"?>
+<p:sld xmlns:a="http://schemas.openxmlformats.org/drawingml/2006/main" xmlns:r="http://schemas.openxmlformats.org/officeDocument/2006/relationships" xmlns:p="http://schemas.openxmlformats.org/presentationml/2006/main">
+  <p:cSld>
+    <p:spTree>
+      <p:nvGrpSpPr>
+        <p:cNvPr id="1" name=""/>
+        <p:cNvGrpSpPr/>
+        <p:nvPr/>
+      </p:nvGrpSpPr>
+      <p:grpSpPr>
+        <a:xfrm>
+          <a:off x="0" y="0"/>
+          <a:ext cx="0" cy="0"/>
+          <a:chOff x="0" y="0"/>
+          <a:chExt cx="0" cy="0"/>
+        </a:xfrm>
+      </p:grpSpPr>
+      <p:sp>
+        <p:nvSpPr>
+          <p:cNvPr id="2" name="Title 1">
+            <a:extLst>
+              <a:ext uri="{FF2B5EF4-FFF2-40B4-BE49-F238E27FC236}">
+                <a16:creationId xmlns:a16="http://schemas.microsoft.com/office/drawing/2014/main" id="{5E1A2851-B6DE-443C-B478-A5CE31ED592D}"/>
+              </a:ext>
+            </a:extLst>
+          </p:cNvPr>
+          <p:cNvSpPr>
+            <a:spLocks noGrp="1"/>
+          </p:cNvSpPr>
+          <p:nvPr>
+            <p:ph type="title"/>
+          </p:nvPr>
+        </p:nvSpPr>
+        <p:spPr/>
+        <p:txBody>
+          <a:bodyPr>
+            <a:normAutofit/>
+          </a:bodyPr>
+          <a:lstStyle/>
+          <a:p>
+            <a:r>
+              <a:rPr lang="en-US" sz="3200" dirty="0">
+                <a:solidFill>
+                  <a:schemeClr val="accent1">
+                    <a:lumMod val="50000"/>
+                  </a:schemeClr>
+                </a:solidFill>
+                <a:latin typeface="Georgia Pro Cond" panose="02040506050405020303" pitchFamily="18" charset="0"/>
+              </a:rPr>
+              <a:t>MODELLING</a:t>
+            </a:r>
+          </a:p>
+        </p:txBody>
+      </p:sp>
+      <p:sp>
+        <p:nvSpPr>
+          <p:cNvPr id="3" name="Date Placeholder 2">
+            <a:extLst>
+              <a:ext uri="{FF2B5EF4-FFF2-40B4-BE49-F238E27FC236}">
+                <a16:creationId xmlns:a16="http://schemas.microsoft.com/office/drawing/2014/main" id="{6202BB9D-80AD-44A1-B3CA-66E5054E0B7C}"/>
+              </a:ext>
+            </a:extLst>
+          </p:cNvPr>
+          <p:cNvSpPr>
+            <a:spLocks noGrp="1"/>
+          </p:cNvSpPr>
+          <p:nvPr>
+            <p:ph type="dt" sz="half" idx="10"/>
+          </p:nvPr>
+        </p:nvSpPr>
+        <p:spPr/>
+        <p:txBody>
+          <a:bodyPr/>
+          <a:lstStyle/>
+          <a:p>
+            <a:r>
+              <a:rPr lang="en-US"/>
+              <a:t>12/4/2019</a:t>
+            </a:r>
+          </a:p>
+        </p:txBody>
+      </p:sp>
+      <p:sp>
+        <p:nvSpPr>
+          <p:cNvPr id="5" name="Slide Number Placeholder 4">
+            <a:extLst>
+              <a:ext uri="{FF2B5EF4-FFF2-40B4-BE49-F238E27FC236}">
+                <a16:creationId xmlns:a16="http://schemas.microsoft.com/office/drawing/2014/main" id="{4646DC2E-D261-4A96-ACC8-B6992B7CB69A}"/>
+              </a:ext>
+            </a:extLst>
+          </p:cNvPr>
+          <p:cNvSpPr>
+            <a:spLocks noGrp="1"/>
+          </p:cNvSpPr>
+          <p:nvPr>
+            <p:ph type="sldNum" sz="quarter" idx="12"/>
+          </p:nvPr>
+        </p:nvSpPr>
+        <p:spPr/>
+        <p:txBody>
+          <a:bodyPr/>
+          <a:lstStyle/>
+          <a:p>
+            <a:fld id="{87963F98-C10F-4FC1-8017-0839D2AC7CA3}" type="slidenum">
+              <a:rPr lang="en-US" smtClean="0"/>
+              <a:t>23</a:t>
+            </a:fld>
+            <a:endParaRPr lang="en-US"/>
+          </a:p>
+        </p:txBody>
+      </p:sp>
+    </p:spTree>
+    <p:extLst>
+      <p:ext uri="{BB962C8B-B14F-4D97-AF65-F5344CB8AC3E}">
+        <p14:creationId xmlns:p14="http://schemas.microsoft.com/office/powerpoint/2010/main" val="1422923119"/>
+      </p:ext>
+    </p:extLst>
+  </p:cSld>
+  <p:clrMapOvr>
+    <a:masterClrMapping/>
+  </p:clrMapOvr>
+</p:sld>
+</file>
+
+<file path=ppt/slides/slide24.xml><?xml version="1.0" encoding="utf-8"?>
+<p:sld xmlns:a="http://schemas.openxmlformats.org/drawingml/2006/main" xmlns:r="http://schemas.openxmlformats.org/officeDocument/2006/relationships" xmlns:p="http://schemas.openxmlformats.org/presentationml/2006/main">
+  <p:cSld>
+    <p:spTree>
+      <p:nvGrpSpPr>
+        <p:cNvPr id="1" name=""/>
+        <p:cNvGrpSpPr/>
+        <p:nvPr/>
+      </p:nvGrpSpPr>
+      <p:grpSpPr>
+        <a:xfrm>
+          <a:off x="0" y="0"/>
+          <a:ext cx="0" cy="0"/>
+          <a:chOff x="0" y="0"/>
+          <a:chExt cx="0" cy="0"/>
+        </a:xfrm>
+      </p:grpSpPr>
+      <p:sp>
+        <p:nvSpPr>
+          <p:cNvPr id="2" name="Title 1">
+            <a:extLst>
+              <a:ext uri="{FF2B5EF4-FFF2-40B4-BE49-F238E27FC236}">
                 <a16:creationId xmlns:a16="http://schemas.microsoft.com/office/drawing/2014/main" id="{5E1A2851-B6DE-443C-B478-A5CE31ED592D}"/>
               </a:ext>
             </a:extLst>
@@ -9410,7 +10262,7 @@
           <a:p>
             <a:fld id="{87963F98-C10F-4FC1-8017-0839D2AC7CA3}" type="slidenum">
               <a:rPr lang="en-US" smtClean="0"/>
-              <a:t>22</a:t>
+              <a:t>24</a:t>
             </a:fld>
             <a:endParaRPr lang="en-US"/>
           </a:p>
@@ -11928,7 +12780,7 @@
         <p:spPr>
           <a:xfrm>
             <a:off x="898373" y="4973216"/>
-            <a:ext cx="10515600" cy="830997"/>
+            <a:ext cx="10515600" cy="1200329"/>
           </a:xfrm>
           <a:prstGeom prst="rect">
             <a:avLst/>
@@ -11950,7 +12802,7 @@
                 </a:solidFill>
                 <a:latin typeface="Rockwell Nova" panose="02060503020205020403" pitchFamily="18" charset="0"/>
               </a:rPr>
-              <a:t>It was evident from summary statistics that “Systole” &amp; “Diastole” had invalid negative values, and BMI had outliers.</a:t>
+              <a:t>It was evident from summary statistics that Systole &amp; Diastole had some invalid negative values that needed to address, and BMI, Height, and Weight had some outliers.</a:t>
             </a:r>
           </a:p>
         </p:txBody>

</xml_diff>

<commit_message>
presentation adds jitter plots in feature selection
</commit_message>
<xml_diff>
--- a/presentation.pptx
+++ b/presentation.pptx
@@ -5,7 +5,7 @@
     <p:sldMasterId id="2147483648" r:id="rId1"/>
   </p:sldMasterIdLst>
   <p:notesMasterIdLst>
-    <p:notesMasterId r:id="rId26"/>
+    <p:notesMasterId r:id="rId30"/>
   </p:notesMasterIdLst>
   <p:sldIdLst>
     <p:sldId id="256" r:id="rId2"/>
@@ -30,8 +30,12 @@
     <p:sldId id="279" r:id="rId21"/>
     <p:sldId id="285" r:id="rId22"/>
     <p:sldId id="286" r:id="rId23"/>
-    <p:sldId id="264" r:id="rId24"/>
-    <p:sldId id="265" r:id="rId25"/>
+    <p:sldId id="287" r:id="rId24"/>
+    <p:sldId id="288" r:id="rId25"/>
+    <p:sldId id="289" r:id="rId26"/>
+    <p:sldId id="290" r:id="rId27"/>
+    <p:sldId id="264" r:id="rId28"/>
+    <p:sldId id="265" r:id="rId29"/>
   </p:sldIdLst>
   <p:sldSz cx="12192000" cy="6858000"/>
   <p:notesSz cx="6858000" cy="9144000"/>
@@ -1659,6 +1663,342 @@
 </p:notes>
 </file>
 
+<file path=ppt/notesSlides/notesSlide13.xml><?xml version="1.0" encoding="utf-8"?>
+<p:notes xmlns:a="http://schemas.openxmlformats.org/drawingml/2006/main" xmlns:r="http://schemas.openxmlformats.org/officeDocument/2006/relationships" xmlns:p="http://schemas.openxmlformats.org/presentationml/2006/main">
+  <p:cSld>
+    <p:spTree>
+      <p:nvGrpSpPr>
+        <p:cNvPr id="1" name=""/>
+        <p:cNvGrpSpPr/>
+        <p:nvPr/>
+      </p:nvGrpSpPr>
+      <p:grpSpPr>
+        <a:xfrm>
+          <a:off x="0" y="0"/>
+          <a:ext cx="0" cy="0"/>
+          <a:chOff x="0" y="0"/>
+          <a:chExt cx="0" cy="0"/>
+        </a:xfrm>
+      </p:grpSpPr>
+      <p:sp>
+        <p:nvSpPr>
+          <p:cNvPr id="2" name="Slide Image Placeholder 1"/>
+          <p:cNvSpPr>
+            <a:spLocks noGrp="1" noRot="1" noChangeAspect="1"/>
+          </p:cNvSpPr>
+          <p:nvPr>
+            <p:ph type="sldImg"/>
+          </p:nvPr>
+        </p:nvSpPr>
+        <p:spPr/>
+      </p:sp>
+      <p:sp>
+        <p:nvSpPr>
+          <p:cNvPr id="3" name="Notes Placeholder 2"/>
+          <p:cNvSpPr>
+            <a:spLocks noGrp="1"/>
+          </p:cNvSpPr>
+          <p:nvPr>
+            <p:ph type="body" idx="1"/>
+          </p:nvPr>
+        </p:nvSpPr>
+        <p:spPr/>
+        <p:txBody>
+          <a:bodyPr/>
+          <a:lstStyle/>
+          <a:p>
+            <a:endParaRPr lang="en-US" dirty="0"/>
+          </a:p>
+        </p:txBody>
+      </p:sp>
+      <p:sp>
+        <p:nvSpPr>
+          <p:cNvPr id="4" name="Slide Number Placeholder 3"/>
+          <p:cNvSpPr>
+            <a:spLocks noGrp="1"/>
+          </p:cNvSpPr>
+          <p:nvPr>
+            <p:ph type="sldNum" sz="quarter" idx="5"/>
+          </p:nvPr>
+        </p:nvSpPr>
+        <p:spPr/>
+        <p:txBody>
+          <a:bodyPr/>
+          <a:lstStyle/>
+          <a:p>
+            <a:fld id="{CF8315F9-90FD-4DB5-9225-8838ABDCEE34}" type="slidenum">
+              <a:rPr lang="en-US" smtClean="0"/>
+              <a:t>23</a:t>
+            </a:fld>
+            <a:endParaRPr lang="en-US"/>
+          </a:p>
+        </p:txBody>
+      </p:sp>
+    </p:spTree>
+    <p:extLst>
+      <p:ext uri="{BB962C8B-B14F-4D97-AF65-F5344CB8AC3E}">
+        <p14:creationId xmlns:p14="http://schemas.microsoft.com/office/powerpoint/2010/main" val="192092918"/>
+      </p:ext>
+    </p:extLst>
+  </p:cSld>
+  <p:clrMapOvr>
+    <a:masterClrMapping/>
+  </p:clrMapOvr>
+</p:notes>
+</file>
+
+<file path=ppt/notesSlides/notesSlide14.xml><?xml version="1.0" encoding="utf-8"?>
+<p:notes xmlns:a="http://schemas.openxmlformats.org/drawingml/2006/main" xmlns:r="http://schemas.openxmlformats.org/officeDocument/2006/relationships" xmlns:p="http://schemas.openxmlformats.org/presentationml/2006/main">
+  <p:cSld>
+    <p:spTree>
+      <p:nvGrpSpPr>
+        <p:cNvPr id="1" name=""/>
+        <p:cNvGrpSpPr/>
+        <p:nvPr/>
+      </p:nvGrpSpPr>
+      <p:grpSpPr>
+        <a:xfrm>
+          <a:off x="0" y="0"/>
+          <a:ext cx="0" cy="0"/>
+          <a:chOff x="0" y="0"/>
+          <a:chExt cx="0" cy="0"/>
+        </a:xfrm>
+      </p:grpSpPr>
+      <p:sp>
+        <p:nvSpPr>
+          <p:cNvPr id="2" name="Slide Image Placeholder 1"/>
+          <p:cNvSpPr>
+            <a:spLocks noGrp="1" noRot="1" noChangeAspect="1"/>
+          </p:cNvSpPr>
+          <p:nvPr>
+            <p:ph type="sldImg"/>
+          </p:nvPr>
+        </p:nvSpPr>
+        <p:spPr/>
+      </p:sp>
+      <p:sp>
+        <p:nvSpPr>
+          <p:cNvPr id="3" name="Notes Placeholder 2"/>
+          <p:cNvSpPr>
+            <a:spLocks noGrp="1"/>
+          </p:cNvSpPr>
+          <p:nvPr>
+            <p:ph type="body" idx="1"/>
+          </p:nvPr>
+        </p:nvSpPr>
+        <p:spPr/>
+        <p:txBody>
+          <a:bodyPr/>
+          <a:lstStyle/>
+          <a:p>
+            <a:endParaRPr lang="en-US" dirty="0"/>
+          </a:p>
+        </p:txBody>
+      </p:sp>
+      <p:sp>
+        <p:nvSpPr>
+          <p:cNvPr id="4" name="Slide Number Placeholder 3"/>
+          <p:cNvSpPr>
+            <a:spLocks noGrp="1"/>
+          </p:cNvSpPr>
+          <p:nvPr>
+            <p:ph type="sldNum" sz="quarter" idx="5"/>
+          </p:nvPr>
+        </p:nvSpPr>
+        <p:spPr/>
+        <p:txBody>
+          <a:bodyPr/>
+          <a:lstStyle/>
+          <a:p>
+            <a:fld id="{CF8315F9-90FD-4DB5-9225-8838ABDCEE34}" type="slidenum">
+              <a:rPr lang="en-US" smtClean="0"/>
+              <a:t>24</a:t>
+            </a:fld>
+            <a:endParaRPr lang="en-US"/>
+          </a:p>
+        </p:txBody>
+      </p:sp>
+    </p:spTree>
+    <p:extLst>
+      <p:ext uri="{BB962C8B-B14F-4D97-AF65-F5344CB8AC3E}">
+        <p14:creationId xmlns:p14="http://schemas.microsoft.com/office/powerpoint/2010/main" val="3663309496"/>
+      </p:ext>
+    </p:extLst>
+  </p:cSld>
+  <p:clrMapOvr>
+    <a:masterClrMapping/>
+  </p:clrMapOvr>
+</p:notes>
+</file>
+
+<file path=ppt/notesSlides/notesSlide15.xml><?xml version="1.0" encoding="utf-8"?>
+<p:notes xmlns:a="http://schemas.openxmlformats.org/drawingml/2006/main" xmlns:r="http://schemas.openxmlformats.org/officeDocument/2006/relationships" xmlns:p="http://schemas.openxmlformats.org/presentationml/2006/main">
+  <p:cSld>
+    <p:spTree>
+      <p:nvGrpSpPr>
+        <p:cNvPr id="1" name=""/>
+        <p:cNvGrpSpPr/>
+        <p:nvPr/>
+      </p:nvGrpSpPr>
+      <p:grpSpPr>
+        <a:xfrm>
+          <a:off x="0" y="0"/>
+          <a:ext cx="0" cy="0"/>
+          <a:chOff x="0" y="0"/>
+          <a:chExt cx="0" cy="0"/>
+        </a:xfrm>
+      </p:grpSpPr>
+      <p:sp>
+        <p:nvSpPr>
+          <p:cNvPr id="2" name="Slide Image Placeholder 1"/>
+          <p:cNvSpPr>
+            <a:spLocks noGrp="1" noRot="1" noChangeAspect="1"/>
+          </p:cNvSpPr>
+          <p:nvPr>
+            <p:ph type="sldImg"/>
+          </p:nvPr>
+        </p:nvSpPr>
+        <p:spPr/>
+      </p:sp>
+      <p:sp>
+        <p:nvSpPr>
+          <p:cNvPr id="3" name="Notes Placeholder 2"/>
+          <p:cNvSpPr>
+            <a:spLocks noGrp="1"/>
+          </p:cNvSpPr>
+          <p:nvPr>
+            <p:ph type="body" idx="1"/>
+          </p:nvPr>
+        </p:nvSpPr>
+        <p:spPr/>
+        <p:txBody>
+          <a:bodyPr/>
+          <a:lstStyle/>
+          <a:p>
+            <a:endParaRPr lang="en-US" dirty="0"/>
+          </a:p>
+        </p:txBody>
+      </p:sp>
+      <p:sp>
+        <p:nvSpPr>
+          <p:cNvPr id="4" name="Slide Number Placeholder 3"/>
+          <p:cNvSpPr>
+            <a:spLocks noGrp="1"/>
+          </p:cNvSpPr>
+          <p:nvPr>
+            <p:ph type="sldNum" sz="quarter" idx="5"/>
+          </p:nvPr>
+        </p:nvSpPr>
+        <p:spPr/>
+        <p:txBody>
+          <a:bodyPr/>
+          <a:lstStyle/>
+          <a:p>
+            <a:fld id="{CF8315F9-90FD-4DB5-9225-8838ABDCEE34}" type="slidenum">
+              <a:rPr lang="en-US" smtClean="0"/>
+              <a:t>25</a:t>
+            </a:fld>
+            <a:endParaRPr lang="en-US"/>
+          </a:p>
+        </p:txBody>
+      </p:sp>
+    </p:spTree>
+    <p:extLst>
+      <p:ext uri="{BB962C8B-B14F-4D97-AF65-F5344CB8AC3E}">
+        <p14:creationId xmlns:p14="http://schemas.microsoft.com/office/powerpoint/2010/main" val="499082142"/>
+      </p:ext>
+    </p:extLst>
+  </p:cSld>
+  <p:clrMapOvr>
+    <a:masterClrMapping/>
+  </p:clrMapOvr>
+</p:notes>
+</file>
+
+<file path=ppt/notesSlides/notesSlide16.xml><?xml version="1.0" encoding="utf-8"?>
+<p:notes xmlns:a="http://schemas.openxmlformats.org/drawingml/2006/main" xmlns:r="http://schemas.openxmlformats.org/officeDocument/2006/relationships" xmlns:p="http://schemas.openxmlformats.org/presentationml/2006/main">
+  <p:cSld>
+    <p:spTree>
+      <p:nvGrpSpPr>
+        <p:cNvPr id="1" name=""/>
+        <p:cNvGrpSpPr/>
+        <p:nvPr/>
+      </p:nvGrpSpPr>
+      <p:grpSpPr>
+        <a:xfrm>
+          <a:off x="0" y="0"/>
+          <a:ext cx="0" cy="0"/>
+          <a:chOff x="0" y="0"/>
+          <a:chExt cx="0" cy="0"/>
+        </a:xfrm>
+      </p:grpSpPr>
+      <p:sp>
+        <p:nvSpPr>
+          <p:cNvPr id="2" name="Slide Image Placeholder 1"/>
+          <p:cNvSpPr>
+            <a:spLocks noGrp="1" noRot="1" noChangeAspect="1"/>
+          </p:cNvSpPr>
+          <p:nvPr>
+            <p:ph type="sldImg"/>
+          </p:nvPr>
+        </p:nvSpPr>
+        <p:spPr/>
+      </p:sp>
+      <p:sp>
+        <p:nvSpPr>
+          <p:cNvPr id="3" name="Notes Placeholder 2"/>
+          <p:cNvSpPr>
+            <a:spLocks noGrp="1"/>
+          </p:cNvSpPr>
+          <p:nvPr>
+            <p:ph type="body" idx="1"/>
+          </p:nvPr>
+        </p:nvSpPr>
+        <p:spPr/>
+        <p:txBody>
+          <a:bodyPr/>
+          <a:lstStyle/>
+          <a:p>
+            <a:endParaRPr lang="en-US" dirty="0"/>
+          </a:p>
+        </p:txBody>
+      </p:sp>
+      <p:sp>
+        <p:nvSpPr>
+          <p:cNvPr id="4" name="Slide Number Placeholder 3"/>
+          <p:cNvSpPr>
+            <a:spLocks noGrp="1"/>
+          </p:cNvSpPr>
+          <p:nvPr>
+            <p:ph type="sldNum" sz="quarter" idx="5"/>
+          </p:nvPr>
+        </p:nvSpPr>
+        <p:spPr/>
+        <p:txBody>
+          <a:bodyPr/>
+          <a:lstStyle/>
+          <a:p>
+            <a:fld id="{CF8315F9-90FD-4DB5-9225-8838ABDCEE34}" type="slidenum">
+              <a:rPr lang="en-US" smtClean="0"/>
+              <a:t>26</a:t>
+            </a:fld>
+            <a:endParaRPr lang="en-US"/>
+          </a:p>
+        </p:txBody>
+      </p:sp>
+    </p:spTree>
+    <p:extLst>
+      <p:ext uri="{BB962C8B-B14F-4D97-AF65-F5344CB8AC3E}">
+        <p14:creationId xmlns:p14="http://schemas.microsoft.com/office/powerpoint/2010/main" val="3428971497"/>
+      </p:ext>
+    </p:extLst>
+  </p:cSld>
+  <p:clrMapOvr>
+    <a:masterClrMapping/>
+  </p:clrMapOvr>
+</p:notes>
+</file>
+
 <file path=ppt/notesSlides/notesSlide2.xml><?xml version="1.0" encoding="utf-8"?>
 <p:notes xmlns:a="http://schemas.openxmlformats.org/drawingml/2006/main" xmlns:r="http://schemas.openxmlformats.org/officeDocument/2006/relationships" xmlns:p="http://schemas.openxmlformats.org/presentationml/2006/main">
   <p:cSld>
@@ -9384,7 +9724,7 @@
                 </a:solidFill>
                 <a:latin typeface="Rockwell Nova" panose="02060503020205020403" pitchFamily="18" charset="0"/>
               </a:rPr>
-              <a:t>We checked for correlated features, and found that only BMI and weight are highly correlated, which was obvious.</a:t>
+              <a:t>We checked for correlated features and found that only BMI and weight are highly correlated, which was obvious.</a:t>
             </a:r>
           </a:p>
         </p:txBody>
@@ -9979,11 +10319,81 @@
                 </a:solidFill>
                 <a:latin typeface="Rockwell Nova" panose="02060503020205020403" pitchFamily="18" charset="0"/>
               </a:rPr>
-              <a:t>As seen in the summary statistics, invalid values and outliers of systolic and diastolic blood pressures, Weight, and Height has been removed after data cleaning.</a:t>
-            </a:r>
-          </a:p>
-        </p:txBody>
-      </p:sp>
+              <a:t>Patients diagnosed with CVDs had on average higher systolic blood pressure than normal patients (left), but jitter box plot shows there are lots of outliers and noisy data in both classes (right).</a:t>
+            </a:r>
+          </a:p>
+        </p:txBody>
+      </p:sp>
+      <p:pic>
+        <p:nvPicPr>
+          <p:cNvPr id="11" name="Picture 10">
+            <a:extLst>
+              <a:ext uri="{FF2B5EF4-FFF2-40B4-BE49-F238E27FC236}">
+                <a16:creationId xmlns:a16="http://schemas.microsoft.com/office/drawing/2014/main" id="{D8E77698-ED02-4945-8306-C19790656504}"/>
+              </a:ext>
+            </a:extLst>
+          </p:cNvPr>
+          <p:cNvPicPr>
+            <a:picLocks noChangeAspect="1"/>
+          </p:cNvPicPr>
+          <p:nvPr/>
+        </p:nvPicPr>
+        <p:blipFill>
+          <a:blip r:embed="rId3">
+            <a:extLst>
+              <a:ext uri="{28A0092B-C50C-407E-A947-70E740481C1C}">
+                <a14:useLocalDpi xmlns:a14="http://schemas.microsoft.com/office/drawing/2010/main" val="0"/>
+              </a:ext>
+            </a:extLst>
+          </a:blip>
+          <a:srcRect/>
+          <a:stretch/>
+        </p:blipFill>
+        <p:spPr>
+          <a:xfrm>
+            <a:off x="723900" y="1690688"/>
+            <a:ext cx="5715000" cy="3333750"/>
+          </a:xfrm>
+          <a:prstGeom prst="rect">
+            <a:avLst/>
+          </a:prstGeom>
+        </p:spPr>
+      </p:pic>
+      <p:pic>
+        <p:nvPicPr>
+          <p:cNvPr id="13" name="Picture 12">
+            <a:extLst>
+              <a:ext uri="{FF2B5EF4-FFF2-40B4-BE49-F238E27FC236}">
+                <a16:creationId xmlns:a16="http://schemas.microsoft.com/office/drawing/2014/main" id="{A005DDC1-F7DA-4AF6-9C09-EA8F1609A09B}"/>
+              </a:ext>
+            </a:extLst>
+          </p:cNvPr>
+          <p:cNvPicPr>
+            <a:picLocks noChangeAspect="1"/>
+          </p:cNvPicPr>
+          <p:nvPr/>
+        </p:nvPicPr>
+        <p:blipFill>
+          <a:blip r:embed="rId4">
+            <a:extLst>
+              <a:ext uri="{28A0092B-C50C-407E-A947-70E740481C1C}">
+                <a14:useLocalDpi xmlns:a14="http://schemas.microsoft.com/office/drawing/2010/main" val="0"/>
+              </a:ext>
+            </a:extLst>
+          </a:blip>
+          <a:srcRect/>
+          <a:stretch/>
+        </p:blipFill>
+        <p:spPr>
+          <a:xfrm>
+            <a:off x="6438900" y="1690688"/>
+            <a:ext cx="5715000" cy="3333750"/>
+          </a:xfrm>
+          <a:prstGeom prst="rect">
+            <a:avLst/>
+          </a:prstGeom>
+        </p:spPr>
+      </p:pic>
     </p:spTree>
     <p:extLst>
       <p:ext uri="{BB962C8B-B14F-4D97-AF65-F5344CB8AC3E}">
@@ -10019,7 +10429,7 @@
           <p:cNvPr id="2" name="Title 1">
             <a:extLst>
               <a:ext uri="{FF2B5EF4-FFF2-40B4-BE49-F238E27FC236}">
-                <a16:creationId xmlns:a16="http://schemas.microsoft.com/office/drawing/2014/main" id="{5E1A2851-B6DE-443C-B478-A5CE31ED592D}"/>
+                <a16:creationId xmlns:a16="http://schemas.microsoft.com/office/drawing/2014/main" id="{BB0D0921-96AE-4FEC-B1D7-21D5580C3F23}"/>
               </a:ext>
             </a:extLst>
           </p:cNvPr>
@@ -10044,19 +10454,19 @@
                     <a:lumMod val="50000"/>
                   </a:schemeClr>
                 </a:solidFill>
-                <a:latin typeface="Georgia Pro Cond" panose="02040506050405020303" pitchFamily="18" charset="0"/>
-              </a:rPr>
-              <a:t>MODELLING</a:t>
-            </a:r>
-          </a:p>
-        </p:txBody>
-      </p:sp>
-      <p:sp>
-        <p:nvSpPr>
-          <p:cNvPr id="3" name="Date Placeholder 2">
-            <a:extLst>
-              <a:ext uri="{FF2B5EF4-FFF2-40B4-BE49-F238E27FC236}">
-                <a16:creationId xmlns:a16="http://schemas.microsoft.com/office/drawing/2014/main" id="{6202BB9D-80AD-44A1-B3CA-66E5054E0B7C}"/>
+                <a:latin typeface="Rockwell Nova" panose="02060503020205020403" pitchFamily="18" charset="0"/>
+              </a:rPr>
+              <a:t>FEATURE SELECTION</a:t>
+            </a:r>
+          </a:p>
+        </p:txBody>
+      </p:sp>
+      <p:sp>
+        <p:nvSpPr>
+          <p:cNvPr id="4" name="Date Placeholder 3">
+            <a:extLst>
+              <a:ext uri="{FF2B5EF4-FFF2-40B4-BE49-F238E27FC236}">
+                <a16:creationId xmlns:a16="http://schemas.microsoft.com/office/drawing/2014/main" id="{073D39D9-F71A-4C1E-A18F-01247A980266}"/>
               </a:ext>
             </a:extLst>
           </p:cNvPr>
@@ -10084,7 +10494,7 @@
           <p:cNvPr id="5" name="Slide Number Placeholder 4">
             <a:extLst>
               <a:ext uri="{FF2B5EF4-FFF2-40B4-BE49-F238E27FC236}">
-                <a16:creationId xmlns:a16="http://schemas.microsoft.com/office/drawing/2014/main" id="{4646DC2E-D261-4A96-ACC8-B6992B7CB69A}"/>
+                <a16:creationId xmlns:a16="http://schemas.microsoft.com/office/drawing/2014/main" id="{B83B5B8B-B2BB-42F0-8C9F-0A36A51E1253}"/>
               </a:ext>
             </a:extLst>
           </p:cNvPr>
@@ -10108,10 +10518,122 @@
           </a:p>
         </p:txBody>
       </p:sp>
+      <p:sp>
+        <p:nvSpPr>
+          <p:cNvPr id="10" name="TextBox 9">
+            <a:extLst>
+              <a:ext uri="{FF2B5EF4-FFF2-40B4-BE49-F238E27FC236}">
+                <a16:creationId xmlns:a16="http://schemas.microsoft.com/office/drawing/2014/main" id="{C183396C-B0D4-43EA-85D1-771B444483EF}"/>
+              </a:ext>
+            </a:extLst>
+          </p:cNvPr>
+          <p:cNvSpPr txBox="1"/>
+          <p:nvPr/>
+        </p:nvSpPr>
+        <p:spPr>
+          <a:xfrm>
+            <a:off x="838199" y="5156021"/>
+            <a:ext cx="10515600" cy="1200329"/>
+          </a:xfrm>
+          <a:prstGeom prst="rect">
+            <a:avLst/>
+          </a:prstGeom>
+          <a:noFill/>
+        </p:spPr>
+        <p:txBody>
+          <a:bodyPr wrap="square" rtlCol="0">
+            <a:spAutoFit/>
+          </a:bodyPr>
+          <a:lstStyle/>
+          <a:p>
+            <a:r>
+              <a:rPr lang="en-US" sz="2400" dirty="0">
+                <a:solidFill>
+                  <a:schemeClr val="bg2">
+                    <a:lumMod val="25000"/>
+                  </a:schemeClr>
+                </a:solidFill>
+                <a:latin typeface="Rockwell Nova" panose="02060503020205020403" pitchFamily="18" charset="0"/>
+              </a:rPr>
+              <a:t>Mean diastolic blood pressure was same for both classes but the difference was in variance and outliers (left). Jitter box plot shows lots of variance and outliers in the positive class (right).</a:t>
+            </a:r>
+          </a:p>
+        </p:txBody>
+      </p:sp>
+      <p:pic>
+        <p:nvPicPr>
+          <p:cNvPr id="11" name="Picture 10">
+            <a:extLst>
+              <a:ext uri="{FF2B5EF4-FFF2-40B4-BE49-F238E27FC236}">
+                <a16:creationId xmlns:a16="http://schemas.microsoft.com/office/drawing/2014/main" id="{D8E77698-ED02-4945-8306-C19790656504}"/>
+              </a:ext>
+            </a:extLst>
+          </p:cNvPr>
+          <p:cNvPicPr>
+            <a:picLocks noChangeAspect="1"/>
+          </p:cNvPicPr>
+          <p:nvPr/>
+        </p:nvPicPr>
+        <p:blipFill>
+          <a:blip r:embed="rId3">
+            <a:extLst>
+              <a:ext uri="{28A0092B-C50C-407E-A947-70E740481C1C}">
+                <a14:useLocalDpi xmlns:a14="http://schemas.microsoft.com/office/drawing/2010/main" val="0"/>
+              </a:ext>
+            </a:extLst>
+          </a:blip>
+          <a:srcRect/>
+          <a:stretch/>
+        </p:blipFill>
+        <p:spPr>
+          <a:xfrm>
+            <a:off x="723900" y="1690688"/>
+            <a:ext cx="5715000" cy="3333750"/>
+          </a:xfrm>
+          <a:prstGeom prst="rect">
+            <a:avLst/>
+          </a:prstGeom>
+        </p:spPr>
+      </p:pic>
+      <p:pic>
+        <p:nvPicPr>
+          <p:cNvPr id="13" name="Picture 12">
+            <a:extLst>
+              <a:ext uri="{FF2B5EF4-FFF2-40B4-BE49-F238E27FC236}">
+                <a16:creationId xmlns:a16="http://schemas.microsoft.com/office/drawing/2014/main" id="{A005DDC1-F7DA-4AF6-9C09-EA8F1609A09B}"/>
+              </a:ext>
+            </a:extLst>
+          </p:cNvPr>
+          <p:cNvPicPr>
+            <a:picLocks noChangeAspect="1"/>
+          </p:cNvPicPr>
+          <p:nvPr/>
+        </p:nvPicPr>
+        <p:blipFill>
+          <a:blip r:embed="rId4">
+            <a:extLst>
+              <a:ext uri="{28A0092B-C50C-407E-A947-70E740481C1C}">
+                <a14:useLocalDpi xmlns:a14="http://schemas.microsoft.com/office/drawing/2010/main" val="0"/>
+              </a:ext>
+            </a:extLst>
+          </a:blip>
+          <a:srcRect/>
+          <a:stretch/>
+        </p:blipFill>
+        <p:spPr>
+          <a:xfrm>
+            <a:off x="6438900" y="1690688"/>
+            <a:ext cx="5715000" cy="3333750"/>
+          </a:xfrm>
+          <a:prstGeom prst="rect">
+            <a:avLst/>
+          </a:prstGeom>
+        </p:spPr>
+      </p:pic>
     </p:spTree>
     <p:extLst>
       <p:ext uri="{BB962C8B-B14F-4D97-AF65-F5344CB8AC3E}">
-        <p14:creationId xmlns:p14="http://schemas.microsoft.com/office/powerpoint/2010/main" val="1422923119"/>
+        <p14:creationId xmlns:p14="http://schemas.microsoft.com/office/powerpoint/2010/main" val="1932973468"/>
       </p:ext>
     </p:extLst>
   </p:cSld>
@@ -10143,6 +10665,838 @@
           <p:cNvPr id="2" name="Title 1">
             <a:extLst>
               <a:ext uri="{FF2B5EF4-FFF2-40B4-BE49-F238E27FC236}">
+                <a16:creationId xmlns:a16="http://schemas.microsoft.com/office/drawing/2014/main" id="{BB0D0921-96AE-4FEC-B1D7-21D5580C3F23}"/>
+              </a:ext>
+            </a:extLst>
+          </p:cNvPr>
+          <p:cNvSpPr>
+            <a:spLocks noGrp="1"/>
+          </p:cNvSpPr>
+          <p:nvPr>
+            <p:ph type="title"/>
+          </p:nvPr>
+        </p:nvSpPr>
+        <p:spPr/>
+        <p:txBody>
+          <a:bodyPr>
+            <a:normAutofit/>
+          </a:bodyPr>
+          <a:lstStyle/>
+          <a:p>
+            <a:r>
+              <a:rPr lang="en-US" sz="3200" dirty="0">
+                <a:solidFill>
+                  <a:schemeClr val="accent1">
+                    <a:lumMod val="50000"/>
+                  </a:schemeClr>
+                </a:solidFill>
+                <a:latin typeface="Rockwell Nova" panose="02060503020205020403" pitchFamily="18" charset="0"/>
+              </a:rPr>
+              <a:t>FEATURE SELECTION</a:t>
+            </a:r>
+          </a:p>
+        </p:txBody>
+      </p:sp>
+      <p:sp>
+        <p:nvSpPr>
+          <p:cNvPr id="4" name="Date Placeholder 3">
+            <a:extLst>
+              <a:ext uri="{FF2B5EF4-FFF2-40B4-BE49-F238E27FC236}">
+                <a16:creationId xmlns:a16="http://schemas.microsoft.com/office/drawing/2014/main" id="{073D39D9-F71A-4C1E-A18F-01247A980266}"/>
+              </a:ext>
+            </a:extLst>
+          </p:cNvPr>
+          <p:cNvSpPr>
+            <a:spLocks noGrp="1"/>
+          </p:cNvSpPr>
+          <p:nvPr>
+            <p:ph type="dt" sz="half" idx="10"/>
+          </p:nvPr>
+        </p:nvSpPr>
+        <p:spPr/>
+        <p:txBody>
+          <a:bodyPr/>
+          <a:lstStyle/>
+          <a:p>
+            <a:r>
+              <a:rPr lang="en-US"/>
+              <a:t>12/4/2019</a:t>
+            </a:r>
+          </a:p>
+        </p:txBody>
+      </p:sp>
+      <p:sp>
+        <p:nvSpPr>
+          <p:cNvPr id="5" name="Slide Number Placeholder 4">
+            <a:extLst>
+              <a:ext uri="{FF2B5EF4-FFF2-40B4-BE49-F238E27FC236}">
+                <a16:creationId xmlns:a16="http://schemas.microsoft.com/office/drawing/2014/main" id="{B83B5B8B-B2BB-42F0-8C9F-0A36A51E1253}"/>
+              </a:ext>
+            </a:extLst>
+          </p:cNvPr>
+          <p:cNvSpPr>
+            <a:spLocks noGrp="1"/>
+          </p:cNvSpPr>
+          <p:nvPr>
+            <p:ph type="sldNum" sz="quarter" idx="12"/>
+          </p:nvPr>
+        </p:nvSpPr>
+        <p:spPr/>
+        <p:txBody>
+          <a:bodyPr/>
+          <a:lstStyle/>
+          <a:p>
+            <a:fld id="{87963F98-C10F-4FC1-8017-0839D2AC7CA3}" type="slidenum">
+              <a:rPr lang="en-US" smtClean="0"/>
+              <a:t>24</a:t>
+            </a:fld>
+            <a:endParaRPr lang="en-US"/>
+          </a:p>
+        </p:txBody>
+      </p:sp>
+      <p:sp>
+        <p:nvSpPr>
+          <p:cNvPr id="10" name="TextBox 9">
+            <a:extLst>
+              <a:ext uri="{FF2B5EF4-FFF2-40B4-BE49-F238E27FC236}">
+                <a16:creationId xmlns:a16="http://schemas.microsoft.com/office/drawing/2014/main" id="{C183396C-B0D4-43EA-85D1-771B444483EF}"/>
+              </a:ext>
+            </a:extLst>
+          </p:cNvPr>
+          <p:cNvSpPr txBox="1"/>
+          <p:nvPr/>
+        </p:nvSpPr>
+        <p:spPr>
+          <a:xfrm>
+            <a:off x="838199" y="5156021"/>
+            <a:ext cx="10515600" cy="1200329"/>
+          </a:xfrm>
+          <a:prstGeom prst="rect">
+            <a:avLst/>
+          </a:prstGeom>
+          <a:noFill/>
+        </p:spPr>
+        <p:txBody>
+          <a:bodyPr wrap="square" rtlCol="0">
+            <a:spAutoFit/>
+          </a:bodyPr>
+          <a:lstStyle/>
+          <a:p>
+            <a:r>
+              <a:rPr lang="en-US" sz="2400" dirty="0">
+                <a:solidFill>
+                  <a:schemeClr val="bg2">
+                    <a:lumMod val="25000"/>
+                  </a:schemeClr>
+                </a:solidFill>
+                <a:latin typeface="Rockwell Nova" panose="02060503020205020403" pitchFamily="18" charset="0"/>
+              </a:rPr>
+              <a:t>Mean age of patients with CVDs was higher than those without (left). However, jitter box plot shows there is too much noisy data in both classes (right).</a:t>
+            </a:r>
+          </a:p>
+        </p:txBody>
+      </p:sp>
+      <p:pic>
+        <p:nvPicPr>
+          <p:cNvPr id="11" name="Picture 10">
+            <a:extLst>
+              <a:ext uri="{FF2B5EF4-FFF2-40B4-BE49-F238E27FC236}">
+                <a16:creationId xmlns:a16="http://schemas.microsoft.com/office/drawing/2014/main" id="{D8E77698-ED02-4945-8306-C19790656504}"/>
+              </a:ext>
+            </a:extLst>
+          </p:cNvPr>
+          <p:cNvPicPr>
+            <a:picLocks noChangeAspect="1"/>
+          </p:cNvPicPr>
+          <p:nvPr/>
+        </p:nvPicPr>
+        <p:blipFill>
+          <a:blip r:embed="rId3">
+            <a:extLst>
+              <a:ext uri="{28A0092B-C50C-407E-A947-70E740481C1C}">
+                <a14:useLocalDpi xmlns:a14="http://schemas.microsoft.com/office/drawing/2010/main" val="0"/>
+              </a:ext>
+            </a:extLst>
+          </a:blip>
+          <a:srcRect/>
+          <a:stretch/>
+        </p:blipFill>
+        <p:spPr>
+          <a:xfrm>
+            <a:off x="723900" y="1690688"/>
+            <a:ext cx="5715000" cy="3333750"/>
+          </a:xfrm>
+          <a:prstGeom prst="rect">
+            <a:avLst/>
+          </a:prstGeom>
+        </p:spPr>
+      </p:pic>
+      <p:pic>
+        <p:nvPicPr>
+          <p:cNvPr id="13" name="Picture 12">
+            <a:extLst>
+              <a:ext uri="{FF2B5EF4-FFF2-40B4-BE49-F238E27FC236}">
+                <a16:creationId xmlns:a16="http://schemas.microsoft.com/office/drawing/2014/main" id="{A005DDC1-F7DA-4AF6-9C09-EA8F1609A09B}"/>
+              </a:ext>
+            </a:extLst>
+          </p:cNvPr>
+          <p:cNvPicPr>
+            <a:picLocks noChangeAspect="1"/>
+          </p:cNvPicPr>
+          <p:nvPr/>
+        </p:nvPicPr>
+        <p:blipFill>
+          <a:blip r:embed="rId4">
+            <a:extLst>
+              <a:ext uri="{28A0092B-C50C-407E-A947-70E740481C1C}">
+                <a14:useLocalDpi xmlns:a14="http://schemas.microsoft.com/office/drawing/2010/main" val="0"/>
+              </a:ext>
+            </a:extLst>
+          </a:blip>
+          <a:srcRect/>
+          <a:stretch/>
+        </p:blipFill>
+        <p:spPr>
+          <a:xfrm>
+            <a:off x="6438900" y="1690688"/>
+            <a:ext cx="5715000" cy="3333750"/>
+          </a:xfrm>
+          <a:prstGeom prst="rect">
+            <a:avLst/>
+          </a:prstGeom>
+        </p:spPr>
+      </p:pic>
+    </p:spTree>
+    <p:extLst>
+      <p:ext uri="{BB962C8B-B14F-4D97-AF65-F5344CB8AC3E}">
+        <p14:creationId xmlns:p14="http://schemas.microsoft.com/office/powerpoint/2010/main" val="3688653486"/>
+      </p:ext>
+    </p:extLst>
+  </p:cSld>
+  <p:clrMapOvr>
+    <a:masterClrMapping/>
+  </p:clrMapOvr>
+</p:sld>
+</file>
+
+<file path=ppt/slides/slide25.xml><?xml version="1.0" encoding="utf-8"?>
+<p:sld xmlns:a="http://schemas.openxmlformats.org/drawingml/2006/main" xmlns:r="http://schemas.openxmlformats.org/officeDocument/2006/relationships" xmlns:p="http://schemas.openxmlformats.org/presentationml/2006/main">
+  <p:cSld>
+    <p:spTree>
+      <p:nvGrpSpPr>
+        <p:cNvPr id="1" name=""/>
+        <p:cNvGrpSpPr/>
+        <p:nvPr/>
+      </p:nvGrpSpPr>
+      <p:grpSpPr>
+        <a:xfrm>
+          <a:off x="0" y="0"/>
+          <a:ext cx="0" cy="0"/>
+          <a:chOff x="0" y="0"/>
+          <a:chExt cx="0" cy="0"/>
+        </a:xfrm>
+      </p:grpSpPr>
+      <p:sp>
+        <p:nvSpPr>
+          <p:cNvPr id="2" name="Title 1">
+            <a:extLst>
+              <a:ext uri="{FF2B5EF4-FFF2-40B4-BE49-F238E27FC236}">
+                <a16:creationId xmlns:a16="http://schemas.microsoft.com/office/drawing/2014/main" id="{BB0D0921-96AE-4FEC-B1D7-21D5580C3F23}"/>
+              </a:ext>
+            </a:extLst>
+          </p:cNvPr>
+          <p:cNvSpPr>
+            <a:spLocks noGrp="1"/>
+          </p:cNvSpPr>
+          <p:nvPr>
+            <p:ph type="title"/>
+          </p:nvPr>
+        </p:nvSpPr>
+        <p:spPr/>
+        <p:txBody>
+          <a:bodyPr>
+            <a:normAutofit/>
+          </a:bodyPr>
+          <a:lstStyle/>
+          <a:p>
+            <a:r>
+              <a:rPr lang="en-US" sz="3200" dirty="0">
+                <a:solidFill>
+                  <a:schemeClr val="accent1">
+                    <a:lumMod val="50000"/>
+                  </a:schemeClr>
+                </a:solidFill>
+                <a:latin typeface="Rockwell Nova" panose="02060503020205020403" pitchFamily="18" charset="0"/>
+              </a:rPr>
+              <a:t>FEATURE SELECTION</a:t>
+            </a:r>
+          </a:p>
+        </p:txBody>
+      </p:sp>
+      <p:sp>
+        <p:nvSpPr>
+          <p:cNvPr id="4" name="Date Placeholder 3">
+            <a:extLst>
+              <a:ext uri="{FF2B5EF4-FFF2-40B4-BE49-F238E27FC236}">
+                <a16:creationId xmlns:a16="http://schemas.microsoft.com/office/drawing/2014/main" id="{073D39D9-F71A-4C1E-A18F-01247A980266}"/>
+              </a:ext>
+            </a:extLst>
+          </p:cNvPr>
+          <p:cNvSpPr>
+            <a:spLocks noGrp="1"/>
+          </p:cNvSpPr>
+          <p:nvPr>
+            <p:ph type="dt" sz="half" idx="10"/>
+          </p:nvPr>
+        </p:nvSpPr>
+        <p:spPr/>
+        <p:txBody>
+          <a:bodyPr/>
+          <a:lstStyle/>
+          <a:p>
+            <a:r>
+              <a:rPr lang="en-US"/>
+              <a:t>12/4/2019</a:t>
+            </a:r>
+          </a:p>
+        </p:txBody>
+      </p:sp>
+      <p:sp>
+        <p:nvSpPr>
+          <p:cNvPr id="5" name="Slide Number Placeholder 4">
+            <a:extLst>
+              <a:ext uri="{FF2B5EF4-FFF2-40B4-BE49-F238E27FC236}">
+                <a16:creationId xmlns:a16="http://schemas.microsoft.com/office/drawing/2014/main" id="{B83B5B8B-B2BB-42F0-8C9F-0A36A51E1253}"/>
+              </a:ext>
+            </a:extLst>
+          </p:cNvPr>
+          <p:cNvSpPr>
+            <a:spLocks noGrp="1"/>
+          </p:cNvSpPr>
+          <p:nvPr>
+            <p:ph type="sldNum" sz="quarter" idx="12"/>
+          </p:nvPr>
+        </p:nvSpPr>
+        <p:spPr/>
+        <p:txBody>
+          <a:bodyPr/>
+          <a:lstStyle/>
+          <a:p>
+            <a:fld id="{87963F98-C10F-4FC1-8017-0839D2AC7CA3}" type="slidenum">
+              <a:rPr lang="en-US" smtClean="0"/>
+              <a:t>25</a:t>
+            </a:fld>
+            <a:endParaRPr lang="en-US"/>
+          </a:p>
+        </p:txBody>
+      </p:sp>
+      <p:sp>
+        <p:nvSpPr>
+          <p:cNvPr id="10" name="TextBox 9">
+            <a:extLst>
+              <a:ext uri="{FF2B5EF4-FFF2-40B4-BE49-F238E27FC236}">
+                <a16:creationId xmlns:a16="http://schemas.microsoft.com/office/drawing/2014/main" id="{C183396C-B0D4-43EA-85D1-771B444483EF}"/>
+              </a:ext>
+            </a:extLst>
+          </p:cNvPr>
+          <p:cNvSpPr txBox="1"/>
+          <p:nvPr/>
+        </p:nvSpPr>
+        <p:spPr>
+          <a:xfrm>
+            <a:off x="838199" y="5156021"/>
+            <a:ext cx="10515600" cy="1200329"/>
+          </a:xfrm>
+          <a:prstGeom prst="rect">
+            <a:avLst/>
+          </a:prstGeom>
+          <a:noFill/>
+        </p:spPr>
+        <p:txBody>
+          <a:bodyPr wrap="square" rtlCol="0">
+            <a:spAutoFit/>
+          </a:bodyPr>
+          <a:lstStyle/>
+          <a:p>
+            <a:r>
+              <a:rPr lang="en-US" sz="2400" dirty="0">
+                <a:solidFill>
+                  <a:schemeClr val="bg2">
+                    <a:lumMod val="25000"/>
+                  </a:schemeClr>
+                </a:solidFill>
+                <a:latin typeface="Rockwell Nova" panose="02060503020205020403" pitchFamily="18" charset="0"/>
+              </a:rPr>
+              <a:t>Patients with CVDs clearly had a higher average BMI than normal patients (left). But BMI too had lots of outliers and noisy data points as shown in the jitter box plot (right).</a:t>
+            </a:r>
+          </a:p>
+        </p:txBody>
+      </p:sp>
+      <p:pic>
+        <p:nvPicPr>
+          <p:cNvPr id="11" name="Picture 10">
+            <a:extLst>
+              <a:ext uri="{FF2B5EF4-FFF2-40B4-BE49-F238E27FC236}">
+                <a16:creationId xmlns:a16="http://schemas.microsoft.com/office/drawing/2014/main" id="{D8E77698-ED02-4945-8306-C19790656504}"/>
+              </a:ext>
+            </a:extLst>
+          </p:cNvPr>
+          <p:cNvPicPr>
+            <a:picLocks noChangeAspect="1"/>
+          </p:cNvPicPr>
+          <p:nvPr/>
+        </p:nvPicPr>
+        <p:blipFill>
+          <a:blip r:embed="rId3">
+            <a:extLst>
+              <a:ext uri="{28A0092B-C50C-407E-A947-70E740481C1C}">
+                <a14:useLocalDpi xmlns:a14="http://schemas.microsoft.com/office/drawing/2010/main" val="0"/>
+              </a:ext>
+            </a:extLst>
+          </a:blip>
+          <a:srcRect/>
+          <a:stretch/>
+        </p:blipFill>
+        <p:spPr>
+          <a:xfrm>
+            <a:off x="723900" y="1690688"/>
+            <a:ext cx="5715000" cy="3333750"/>
+          </a:xfrm>
+          <a:prstGeom prst="rect">
+            <a:avLst/>
+          </a:prstGeom>
+        </p:spPr>
+      </p:pic>
+      <p:pic>
+        <p:nvPicPr>
+          <p:cNvPr id="13" name="Picture 12">
+            <a:extLst>
+              <a:ext uri="{FF2B5EF4-FFF2-40B4-BE49-F238E27FC236}">
+                <a16:creationId xmlns:a16="http://schemas.microsoft.com/office/drawing/2014/main" id="{A005DDC1-F7DA-4AF6-9C09-EA8F1609A09B}"/>
+              </a:ext>
+            </a:extLst>
+          </p:cNvPr>
+          <p:cNvPicPr>
+            <a:picLocks noChangeAspect="1"/>
+          </p:cNvPicPr>
+          <p:nvPr/>
+        </p:nvPicPr>
+        <p:blipFill>
+          <a:blip r:embed="rId4">
+            <a:extLst>
+              <a:ext uri="{28A0092B-C50C-407E-A947-70E740481C1C}">
+                <a14:useLocalDpi xmlns:a14="http://schemas.microsoft.com/office/drawing/2010/main" val="0"/>
+              </a:ext>
+            </a:extLst>
+          </a:blip>
+          <a:srcRect/>
+          <a:stretch/>
+        </p:blipFill>
+        <p:spPr>
+          <a:xfrm>
+            <a:off x="6438900" y="1690688"/>
+            <a:ext cx="5715000" cy="3333750"/>
+          </a:xfrm>
+          <a:prstGeom prst="rect">
+            <a:avLst/>
+          </a:prstGeom>
+        </p:spPr>
+      </p:pic>
+    </p:spTree>
+    <p:extLst>
+      <p:ext uri="{BB962C8B-B14F-4D97-AF65-F5344CB8AC3E}">
+        <p14:creationId xmlns:p14="http://schemas.microsoft.com/office/powerpoint/2010/main" val="203942422"/>
+      </p:ext>
+    </p:extLst>
+  </p:cSld>
+  <p:clrMapOvr>
+    <a:masterClrMapping/>
+  </p:clrMapOvr>
+</p:sld>
+</file>
+
+<file path=ppt/slides/slide26.xml><?xml version="1.0" encoding="utf-8"?>
+<p:sld xmlns:a="http://schemas.openxmlformats.org/drawingml/2006/main" xmlns:r="http://schemas.openxmlformats.org/officeDocument/2006/relationships" xmlns:p="http://schemas.openxmlformats.org/presentationml/2006/main">
+  <p:cSld>
+    <p:spTree>
+      <p:nvGrpSpPr>
+        <p:cNvPr id="1" name=""/>
+        <p:cNvGrpSpPr/>
+        <p:nvPr/>
+      </p:nvGrpSpPr>
+      <p:grpSpPr>
+        <a:xfrm>
+          <a:off x="0" y="0"/>
+          <a:ext cx="0" cy="0"/>
+          <a:chOff x="0" y="0"/>
+          <a:chExt cx="0" cy="0"/>
+        </a:xfrm>
+      </p:grpSpPr>
+      <p:sp>
+        <p:nvSpPr>
+          <p:cNvPr id="2" name="Title 1">
+            <a:extLst>
+              <a:ext uri="{FF2B5EF4-FFF2-40B4-BE49-F238E27FC236}">
+                <a16:creationId xmlns:a16="http://schemas.microsoft.com/office/drawing/2014/main" id="{BB0D0921-96AE-4FEC-B1D7-21D5580C3F23}"/>
+              </a:ext>
+            </a:extLst>
+          </p:cNvPr>
+          <p:cNvSpPr>
+            <a:spLocks noGrp="1"/>
+          </p:cNvSpPr>
+          <p:nvPr>
+            <p:ph type="title"/>
+          </p:nvPr>
+        </p:nvSpPr>
+        <p:spPr/>
+        <p:txBody>
+          <a:bodyPr>
+            <a:normAutofit/>
+          </a:bodyPr>
+          <a:lstStyle/>
+          <a:p>
+            <a:r>
+              <a:rPr lang="en-US" sz="3200" dirty="0">
+                <a:solidFill>
+                  <a:schemeClr val="accent1">
+                    <a:lumMod val="50000"/>
+                  </a:schemeClr>
+                </a:solidFill>
+                <a:latin typeface="Rockwell Nova" panose="02060503020205020403" pitchFamily="18" charset="0"/>
+              </a:rPr>
+              <a:t>FEATURE SELECTION</a:t>
+            </a:r>
+          </a:p>
+        </p:txBody>
+      </p:sp>
+      <p:sp>
+        <p:nvSpPr>
+          <p:cNvPr id="4" name="Date Placeholder 3">
+            <a:extLst>
+              <a:ext uri="{FF2B5EF4-FFF2-40B4-BE49-F238E27FC236}">
+                <a16:creationId xmlns:a16="http://schemas.microsoft.com/office/drawing/2014/main" id="{073D39D9-F71A-4C1E-A18F-01247A980266}"/>
+              </a:ext>
+            </a:extLst>
+          </p:cNvPr>
+          <p:cNvSpPr>
+            <a:spLocks noGrp="1"/>
+          </p:cNvSpPr>
+          <p:nvPr>
+            <p:ph type="dt" sz="half" idx="10"/>
+          </p:nvPr>
+        </p:nvSpPr>
+        <p:spPr/>
+        <p:txBody>
+          <a:bodyPr/>
+          <a:lstStyle/>
+          <a:p>
+            <a:r>
+              <a:rPr lang="en-US"/>
+              <a:t>12/4/2019</a:t>
+            </a:r>
+          </a:p>
+        </p:txBody>
+      </p:sp>
+      <p:sp>
+        <p:nvSpPr>
+          <p:cNvPr id="5" name="Slide Number Placeholder 4">
+            <a:extLst>
+              <a:ext uri="{FF2B5EF4-FFF2-40B4-BE49-F238E27FC236}">
+                <a16:creationId xmlns:a16="http://schemas.microsoft.com/office/drawing/2014/main" id="{B83B5B8B-B2BB-42F0-8C9F-0A36A51E1253}"/>
+              </a:ext>
+            </a:extLst>
+          </p:cNvPr>
+          <p:cNvSpPr>
+            <a:spLocks noGrp="1"/>
+          </p:cNvSpPr>
+          <p:nvPr>
+            <p:ph type="sldNum" sz="quarter" idx="12"/>
+          </p:nvPr>
+        </p:nvSpPr>
+        <p:spPr/>
+        <p:txBody>
+          <a:bodyPr/>
+          <a:lstStyle/>
+          <a:p>
+            <a:fld id="{87963F98-C10F-4FC1-8017-0839D2AC7CA3}" type="slidenum">
+              <a:rPr lang="en-US" smtClean="0"/>
+              <a:t>26</a:t>
+            </a:fld>
+            <a:endParaRPr lang="en-US"/>
+          </a:p>
+        </p:txBody>
+      </p:sp>
+      <p:sp>
+        <p:nvSpPr>
+          <p:cNvPr id="10" name="TextBox 9">
+            <a:extLst>
+              <a:ext uri="{FF2B5EF4-FFF2-40B4-BE49-F238E27FC236}">
+                <a16:creationId xmlns:a16="http://schemas.microsoft.com/office/drawing/2014/main" id="{C183396C-B0D4-43EA-85D1-771B444483EF}"/>
+              </a:ext>
+            </a:extLst>
+          </p:cNvPr>
+          <p:cNvSpPr txBox="1"/>
+          <p:nvPr/>
+        </p:nvSpPr>
+        <p:spPr>
+          <a:xfrm>
+            <a:off x="838199" y="5156021"/>
+            <a:ext cx="10515600" cy="1200329"/>
+          </a:xfrm>
+          <a:prstGeom prst="rect">
+            <a:avLst/>
+          </a:prstGeom>
+          <a:noFill/>
+        </p:spPr>
+        <p:txBody>
+          <a:bodyPr wrap="square" rtlCol="0">
+            <a:spAutoFit/>
+          </a:bodyPr>
+          <a:lstStyle/>
+          <a:p>
+            <a:r>
+              <a:rPr lang="en-US" sz="2400" dirty="0">
+                <a:solidFill>
+                  <a:schemeClr val="bg2">
+                    <a:lumMod val="25000"/>
+                  </a:schemeClr>
+                </a:solidFill>
+                <a:latin typeface="Rockwell Nova" panose="02060503020205020403" pitchFamily="18" charset="0"/>
+              </a:rPr>
+              <a:t>Weights of patients with CVDs were higher than normal patients (left). But as usual there was lots of outliers and noisy data in both classes.</a:t>
+            </a:r>
+          </a:p>
+        </p:txBody>
+      </p:sp>
+      <p:pic>
+        <p:nvPicPr>
+          <p:cNvPr id="11" name="Picture 10">
+            <a:extLst>
+              <a:ext uri="{FF2B5EF4-FFF2-40B4-BE49-F238E27FC236}">
+                <a16:creationId xmlns:a16="http://schemas.microsoft.com/office/drawing/2014/main" id="{D8E77698-ED02-4945-8306-C19790656504}"/>
+              </a:ext>
+            </a:extLst>
+          </p:cNvPr>
+          <p:cNvPicPr>
+            <a:picLocks noChangeAspect="1"/>
+          </p:cNvPicPr>
+          <p:nvPr/>
+        </p:nvPicPr>
+        <p:blipFill>
+          <a:blip r:embed="rId3">
+            <a:extLst>
+              <a:ext uri="{28A0092B-C50C-407E-A947-70E740481C1C}">
+                <a14:useLocalDpi xmlns:a14="http://schemas.microsoft.com/office/drawing/2010/main" val="0"/>
+              </a:ext>
+            </a:extLst>
+          </a:blip>
+          <a:srcRect/>
+          <a:stretch/>
+        </p:blipFill>
+        <p:spPr>
+          <a:xfrm>
+            <a:off x="723900" y="1690688"/>
+            <a:ext cx="5715000" cy="3333750"/>
+          </a:xfrm>
+          <a:prstGeom prst="rect">
+            <a:avLst/>
+          </a:prstGeom>
+        </p:spPr>
+      </p:pic>
+      <p:pic>
+        <p:nvPicPr>
+          <p:cNvPr id="13" name="Picture 12">
+            <a:extLst>
+              <a:ext uri="{FF2B5EF4-FFF2-40B4-BE49-F238E27FC236}">
+                <a16:creationId xmlns:a16="http://schemas.microsoft.com/office/drawing/2014/main" id="{A005DDC1-F7DA-4AF6-9C09-EA8F1609A09B}"/>
+              </a:ext>
+            </a:extLst>
+          </p:cNvPr>
+          <p:cNvPicPr>
+            <a:picLocks noChangeAspect="1"/>
+          </p:cNvPicPr>
+          <p:nvPr/>
+        </p:nvPicPr>
+        <p:blipFill>
+          <a:blip r:embed="rId4">
+            <a:extLst>
+              <a:ext uri="{28A0092B-C50C-407E-A947-70E740481C1C}">
+                <a14:useLocalDpi xmlns:a14="http://schemas.microsoft.com/office/drawing/2010/main" val="0"/>
+              </a:ext>
+            </a:extLst>
+          </a:blip>
+          <a:srcRect/>
+          <a:stretch/>
+        </p:blipFill>
+        <p:spPr>
+          <a:xfrm>
+            <a:off x="6438900" y="1690688"/>
+            <a:ext cx="5715000" cy="3333750"/>
+          </a:xfrm>
+          <a:prstGeom prst="rect">
+            <a:avLst/>
+          </a:prstGeom>
+        </p:spPr>
+      </p:pic>
+    </p:spTree>
+    <p:extLst>
+      <p:ext uri="{BB962C8B-B14F-4D97-AF65-F5344CB8AC3E}">
+        <p14:creationId xmlns:p14="http://schemas.microsoft.com/office/powerpoint/2010/main" val="435246225"/>
+      </p:ext>
+    </p:extLst>
+  </p:cSld>
+  <p:clrMapOvr>
+    <a:masterClrMapping/>
+  </p:clrMapOvr>
+</p:sld>
+</file>
+
+<file path=ppt/slides/slide27.xml><?xml version="1.0" encoding="utf-8"?>
+<p:sld xmlns:a="http://schemas.openxmlformats.org/drawingml/2006/main" xmlns:r="http://schemas.openxmlformats.org/officeDocument/2006/relationships" xmlns:p="http://schemas.openxmlformats.org/presentationml/2006/main">
+  <p:cSld>
+    <p:spTree>
+      <p:nvGrpSpPr>
+        <p:cNvPr id="1" name=""/>
+        <p:cNvGrpSpPr/>
+        <p:nvPr/>
+      </p:nvGrpSpPr>
+      <p:grpSpPr>
+        <a:xfrm>
+          <a:off x="0" y="0"/>
+          <a:ext cx="0" cy="0"/>
+          <a:chOff x="0" y="0"/>
+          <a:chExt cx="0" cy="0"/>
+        </a:xfrm>
+      </p:grpSpPr>
+      <p:sp>
+        <p:nvSpPr>
+          <p:cNvPr id="2" name="Title 1">
+            <a:extLst>
+              <a:ext uri="{FF2B5EF4-FFF2-40B4-BE49-F238E27FC236}">
+                <a16:creationId xmlns:a16="http://schemas.microsoft.com/office/drawing/2014/main" id="{5E1A2851-B6DE-443C-B478-A5CE31ED592D}"/>
+              </a:ext>
+            </a:extLst>
+          </p:cNvPr>
+          <p:cNvSpPr>
+            <a:spLocks noGrp="1"/>
+          </p:cNvSpPr>
+          <p:nvPr>
+            <p:ph type="title"/>
+          </p:nvPr>
+        </p:nvSpPr>
+        <p:spPr/>
+        <p:txBody>
+          <a:bodyPr>
+            <a:normAutofit/>
+          </a:bodyPr>
+          <a:lstStyle/>
+          <a:p>
+            <a:r>
+              <a:rPr lang="en-US" sz="3200" dirty="0">
+                <a:solidFill>
+                  <a:schemeClr val="accent1">
+                    <a:lumMod val="50000"/>
+                  </a:schemeClr>
+                </a:solidFill>
+                <a:latin typeface="Georgia Pro Cond" panose="02040506050405020303" pitchFamily="18" charset="0"/>
+              </a:rPr>
+              <a:t>MODELLING</a:t>
+            </a:r>
+          </a:p>
+        </p:txBody>
+      </p:sp>
+      <p:sp>
+        <p:nvSpPr>
+          <p:cNvPr id="3" name="Date Placeholder 2">
+            <a:extLst>
+              <a:ext uri="{FF2B5EF4-FFF2-40B4-BE49-F238E27FC236}">
+                <a16:creationId xmlns:a16="http://schemas.microsoft.com/office/drawing/2014/main" id="{6202BB9D-80AD-44A1-B3CA-66E5054E0B7C}"/>
+              </a:ext>
+            </a:extLst>
+          </p:cNvPr>
+          <p:cNvSpPr>
+            <a:spLocks noGrp="1"/>
+          </p:cNvSpPr>
+          <p:nvPr>
+            <p:ph type="dt" sz="half" idx="10"/>
+          </p:nvPr>
+        </p:nvSpPr>
+        <p:spPr/>
+        <p:txBody>
+          <a:bodyPr/>
+          <a:lstStyle/>
+          <a:p>
+            <a:r>
+              <a:rPr lang="en-US"/>
+              <a:t>12/4/2019</a:t>
+            </a:r>
+          </a:p>
+        </p:txBody>
+      </p:sp>
+      <p:sp>
+        <p:nvSpPr>
+          <p:cNvPr id="5" name="Slide Number Placeholder 4">
+            <a:extLst>
+              <a:ext uri="{FF2B5EF4-FFF2-40B4-BE49-F238E27FC236}">
+                <a16:creationId xmlns:a16="http://schemas.microsoft.com/office/drawing/2014/main" id="{4646DC2E-D261-4A96-ACC8-B6992B7CB69A}"/>
+              </a:ext>
+            </a:extLst>
+          </p:cNvPr>
+          <p:cNvSpPr>
+            <a:spLocks noGrp="1"/>
+          </p:cNvSpPr>
+          <p:nvPr>
+            <p:ph type="sldNum" sz="quarter" idx="12"/>
+          </p:nvPr>
+        </p:nvSpPr>
+        <p:spPr/>
+        <p:txBody>
+          <a:bodyPr/>
+          <a:lstStyle/>
+          <a:p>
+            <a:fld id="{87963F98-C10F-4FC1-8017-0839D2AC7CA3}" type="slidenum">
+              <a:rPr lang="en-US" smtClean="0"/>
+              <a:t>27</a:t>
+            </a:fld>
+            <a:endParaRPr lang="en-US"/>
+          </a:p>
+        </p:txBody>
+      </p:sp>
+    </p:spTree>
+    <p:extLst>
+      <p:ext uri="{BB962C8B-B14F-4D97-AF65-F5344CB8AC3E}">
+        <p14:creationId xmlns:p14="http://schemas.microsoft.com/office/powerpoint/2010/main" val="1422923119"/>
+      </p:ext>
+    </p:extLst>
+  </p:cSld>
+  <p:clrMapOvr>
+    <a:masterClrMapping/>
+  </p:clrMapOvr>
+</p:sld>
+</file>
+
+<file path=ppt/slides/slide28.xml><?xml version="1.0" encoding="utf-8"?>
+<p:sld xmlns:a="http://schemas.openxmlformats.org/drawingml/2006/main" xmlns:r="http://schemas.openxmlformats.org/officeDocument/2006/relationships" xmlns:p="http://schemas.openxmlformats.org/presentationml/2006/main">
+  <p:cSld>
+    <p:spTree>
+      <p:nvGrpSpPr>
+        <p:cNvPr id="1" name=""/>
+        <p:cNvGrpSpPr/>
+        <p:nvPr/>
+      </p:nvGrpSpPr>
+      <p:grpSpPr>
+        <a:xfrm>
+          <a:off x="0" y="0"/>
+          <a:ext cx="0" cy="0"/>
+          <a:chOff x="0" y="0"/>
+          <a:chExt cx="0" cy="0"/>
+        </a:xfrm>
+      </p:grpSpPr>
+      <p:sp>
+        <p:nvSpPr>
+          <p:cNvPr id="2" name="Title 1">
+            <a:extLst>
+              <a:ext uri="{FF2B5EF4-FFF2-40B4-BE49-F238E27FC236}">
                 <a16:creationId xmlns:a16="http://schemas.microsoft.com/office/drawing/2014/main" id="{5E1A2851-B6DE-443C-B478-A5CE31ED592D}"/>
               </a:ext>
             </a:extLst>
@@ -10262,7 +11616,7 @@
           <a:p>
             <a:fld id="{87963F98-C10F-4FC1-8017-0839D2AC7CA3}" type="slidenum">
               <a:rPr lang="en-US" smtClean="0"/>
-              <a:t>24</a:t>
+              <a:t>28</a:t>
             </a:fld>
             <a:endParaRPr lang="en-US"/>
           </a:p>

</xml_diff>

<commit_message>
presentation - adds pairplot in feature selection
</commit_message>
<xml_diff>
--- a/presentation.pptx
+++ b/presentation.pptx
@@ -5,7 +5,7 @@
     <p:sldMasterId id="2147483648" r:id="rId1"/>
   </p:sldMasterIdLst>
   <p:notesMasterIdLst>
-    <p:notesMasterId r:id="rId30"/>
+    <p:notesMasterId r:id="rId31"/>
   </p:notesMasterIdLst>
   <p:sldIdLst>
     <p:sldId id="256" r:id="rId2"/>
@@ -34,8 +34,9 @@
     <p:sldId id="288" r:id="rId25"/>
     <p:sldId id="289" r:id="rId26"/>
     <p:sldId id="290" r:id="rId27"/>
-    <p:sldId id="264" r:id="rId28"/>
-    <p:sldId id="265" r:id="rId29"/>
+    <p:sldId id="291" r:id="rId28"/>
+    <p:sldId id="264" r:id="rId29"/>
+    <p:sldId id="265" r:id="rId30"/>
   </p:sldIdLst>
   <p:sldSz cx="12192000" cy="6858000"/>
   <p:notesSz cx="6858000" cy="9144000"/>
@@ -1999,6 +2000,90 @@
 </p:notes>
 </file>
 
+<file path=ppt/notesSlides/notesSlide17.xml><?xml version="1.0" encoding="utf-8"?>
+<p:notes xmlns:a="http://schemas.openxmlformats.org/drawingml/2006/main" xmlns:r="http://schemas.openxmlformats.org/officeDocument/2006/relationships" xmlns:p="http://schemas.openxmlformats.org/presentationml/2006/main">
+  <p:cSld>
+    <p:spTree>
+      <p:nvGrpSpPr>
+        <p:cNvPr id="1" name=""/>
+        <p:cNvGrpSpPr/>
+        <p:nvPr/>
+      </p:nvGrpSpPr>
+      <p:grpSpPr>
+        <a:xfrm>
+          <a:off x="0" y="0"/>
+          <a:ext cx="0" cy="0"/>
+          <a:chOff x="0" y="0"/>
+          <a:chExt cx="0" cy="0"/>
+        </a:xfrm>
+      </p:grpSpPr>
+      <p:sp>
+        <p:nvSpPr>
+          <p:cNvPr id="2" name="Slide Image Placeholder 1"/>
+          <p:cNvSpPr>
+            <a:spLocks noGrp="1" noRot="1" noChangeAspect="1"/>
+          </p:cNvSpPr>
+          <p:nvPr>
+            <p:ph type="sldImg"/>
+          </p:nvPr>
+        </p:nvSpPr>
+        <p:spPr/>
+      </p:sp>
+      <p:sp>
+        <p:nvSpPr>
+          <p:cNvPr id="3" name="Notes Placeholder 2"/>
+          <p:cNvSpPr>
+            <a:spLocks noGrp="1"/>
+          </p:cNvSpPr>
+          <p:nvPr>
+            <p:ph type="body" idx="1"/>
+          </p:nvPr>
+        </p:nvSpPr>
+        <p:spPr/>
+        <p:txBody>
+          <a:bodyPr/>
+          <a:lstStyle/>
+          <a:p>
+            <a:endParaRPr lang="en-US" dirty="0"/>
+          </a:p>
+        </p:txBody>
+      </p:sp>
+      <p:sp>
+        <p:nvSpPr>
+          <p:cNvPr id="4" name="Slide Number Placeholder 3"/>
+          <p:cNvSpPr>
+            <a:spLocks noGrp="1"/>
+          </p:cNvSpPr>
+          <p:nvPr>
+            <p:ph type="sldNum" sz="quarter" idx="5"/>
+          </p:nvPr>
+        </p:nvSpPr>
+        <p:spPr/>
+        <p:txBody>
+          <a:bodyPr/>
+          <a:lstStyle/>
+          <a:p>
+            <a:fld id="{CF8315F9-90FD-4DB5-9225-8838ABDCEE34}" type="slidenum">
+              <a:rPr lang="en-US" smtClean="0"/>
+              <a:t>27</a:t>
+            </a:fld>
+            <a:endParaRPr lang="en-US"/>
+          </a:p>
+        </p:txBody>
+      </p:sp>
+    </p:spTree>
+    <p:extLst>
+      <p:ext uri="{BB962C8B-B14F-4D97-AF65-F5344CB8AC3E}">
+        <p14:creationId xmlns:p14="http://schemas.microsoft.com/office/powerpoint/2010/main" val="1779460353"/>
+      </p:ext>
+    </p:extLst>
+  </p:cSld>
+  <p:clrMapOvr>
+    <a:masterClrMapping/>
+  </p:clrMapOvr>
+</p:notes>
+</file>
+
 <file path=ppt/notesSlides/notesSlide2.xml><?xml version="1.0" encoding="utf-8"?>
 <p:notes xmlns:a="http://schemas.openxmlformats.org/drawingml/2006/main" xmlns:r="http://schemas.openxmlformats.org/officeDocument/2006/relationships" xmlns:p="http://schemas.openxmlformats.org/presentationml/2006/main">
   <p:cSld>
@@ -11373,7 +11458,7 @@
           <p:cNvPr id="2" name="Title 1">
             <a:extLst>
               <a:ext uri="{FF2B5EF4-FFF2-40B4-BE49-F238E27FC236}">
-                <a16:creationId xmlns:a16="http://schemas.microsoft.com/office/drawing/2014/main" id="{5E1A2851-B6DE-443C-B478-A5CE31ED592D}"/>
+                <a16:creationId xmlns:a16="http://schemas.microsoft.com/office/drawing/2014/main" id="{BB0D0921-96AE-4FEC-B1D7-21D5580C3F23}"/>
               </a:ext>
             </a:extLst>
           </p:cNvPr>
@@ -11398,19 +11483,19 @@
                     <a:lumMod val="50000"/>
                   </a:schemeClr>
                 </a:solidFill>
-                <a:latin typeface="Georgia Pro Cond" panose="02040506050405020303" pitchFamily="18" charset="0"/>
-              </a:rPr>
-              <a:t>MODELLING</a:t>
-            </a:r>
-          </a:p>
-        </p:txBody>
-      </p:sp>
-      <p:sp>
-        <p:nvSpPr>
-          <p:cNvPr id="3" name="Date Placeholder 2">
-            <a:extLst>
-              <a:ext uri="{FF2B5EF4-FFF2-40B4-BE49-F238E27FC236}">
-                <a16:creationId xmlns:a16="http://schemas.microsoft.com/office/drawing/2014/main" id="{6202BB9D-80AD-44A1-B3CA-66E5054E0B7C}"/>
+                <a:latin typeface="Rockwell Nova" panose="02060503020205020403" pitchFamily="18" charset="0"/>
+              </a:rPr>
+              <a:t>FEATURE SELECTION</a:t>
+            </a:r>
+          </a:p>
+        </p:txBody>
+      </p:sp>
+      <p:sp>
+        <p:nvSpPr>
+          <p:cNvPr id="4" name="Date Placeholder 3">
+            <a:extLst>
+              <a:ext uri="{FF2B5EF4-FFF2-40B4-BE49-F238E27FC236}">
+                <a16:creationId xmlns:a16="http://schemas.microsoft.com/office/drawing/2014/main" id="{073D39D9-F71A-4C1E-A18F-01247A980266}"/>
               </a:ext>
             </a:extLst>
           </p:cNvPr>
@@ -11438,7 +11523,7 @@
           <p:cNvPr id="5" name="Slide Number Placeholder 4">
             <a:extLst>
               <a:ext uri="{FF2B5EF4-FFF2-40B4-BE49-F238E27FC236}">
-                <a16:creationId xmlns:a16="http://schemas.microsoft.com/office/drawing/2014/main" id="{4646DC2E-D261-4A96-ACC8-B6992B7CB69A}"/>
+                <a16:creationId xmlns:a16="http://schemas.microsoft.com/office/drawing/2014/main" id="{B83B5B8B-B2BB-42F0-8C9F-0A36A51E1253}"/>
               </a:ext>
             </a:extLst>
           </p:cNvPr>
@@ -11462,10 +11547,122 @@
           </a:p>
         </p:txBody>
       </p:sp>
+      <p:sp>
+        <p:nvSpPr>
+          <p:cNvPr id="10" name="TextBox 9">
+            <a:extLst>
+              <a:ext uri="{FF2B5EF4-FFF2-40B4-BE49-F238E27FC236}">
+                <a16:creationId xmlns:a16="http://schemas.microsoft.com/office/drawing/2014/main" id="{C183396C-B0D4-43EA-85D1-771B444483EF}"/>
+              </a:ext>
+            </a:extLst>
+          </p:cNvPr>
+          <p:cNvSpPr txBox="1"/>
+          <p:nvPr/>
+        </p:nvSpPr>
+        <p:spPr>
+          <a:xfrm>
+            <a:off x="838200" y="1574161"/>
+            <a:ext cx="4473080" cy="4154984"/>
+          </a:xfrm>
+          <a:prstGeom prst="rect">
+            <a:avLst/>
+          </a:prstGeom>
+          <a:noFill/>
+        </p:spPr>
+        <p:txBody>
+          <a:bodyPr wrap="square" rtlCol="0">
+            <a:spAutoFit/>
+          </a:bodyPr>
+          <a:lstStyle/>
+          <a:p>
+            <a:pPr marL="342900" indent="-342900">
+              <a:buFont typeface="Arial" panose="020B0604020202020204" pitchFamily="34" charset="0"/>
+              <a:buChar char="•"/>
+            </a:pPr>
+            <a:r>
+              <a:rPr lang="en-US" sz="2400" dirty="0">
+                <a:solidFill>
+                  <a:schemeClr val="bg2">
+                    <a:lumMod val="25000"/>
+                  </a:schemeClr>
+                </a:solidFill>
+                <a:latin typeface="Rockwell Nova" panose="02060503020205020403" pitchFamily="18" charset="0"/>
+              </a:rPr>
+              <a:t>As seen in the pair plot of the selected numeric features, all of them can explain a certain portion of the class variance.</a:t>
+            </a:r>
+          </a:p>
+          <a:p>
+            <a:pPr marL="342900" indent="-342900">
+              <a:buFont typeface="Arial" panose="020B0604020202020204" pitchFamily="34" charset="0"/>
+              <a:buChar char="•"/>
+            </a:pPr>
+            <a:endParaRPr lang="en-US" sz="2400" dirty="0">
+              <a:solidFill>
+                <a:schemeClr val="bg2">
+                  <a:lumMod val="25000"/>
+                </a:schemeClr>
+              </a:solidFill>
+              <a:latin typeface="Rockwell Nova" panose="02060503020205020403" pitchFamily="18" charset="0"/>
+            </a:endParaRPr>
+          </a:p>
+          <a:p>
+            <a:pPr marL="342900" indent="-342900">
+              <a:buFont typeface="Arial" panose="020B0604020202020204" pitchFamily="34" charset="0"/>
+              <a:buChar char="•"/>
+            </a:pPr>
+            <a:r>
+              <a:rPr lang="en-US" sz="2400" dirty="0">
+                <a:solidFill>
+                  <a:schemeClr val="bg2">
+                    <a:lumMod val="25000"/>
+                  </a:schemeClr>
+                </a:solidFill>
+                <a:latin typeface="Rockwell Nova" panose="02060503020205020403" pitchFamily="18" charset="0"/>
+              </a:rPr>
+              <a:t>However, they all featured lots of outliers and noises, which should make the prediction task challenging.</a:t>
+            </a:r>
+          </a:p>
+        </p:txBody>
+      </p:sp>
+      <p:pic>
+        <p:nvPicPr>
+          <p:cNvPr id="11" name="Picture 10">
+            <a:extLst>
+              <a:ext uri="{FF2B5EF4-FFF2-40B4-BE49-F238E27FC236}">
+                <a16:creationId xmlns:a16="http://schemas.microsoft.com/office/drawing/2014/main" id="{D8E77698-ED02-4945-8306-C19790656504}"/>
+              </a:ext>
+            </a:extLst>
+          </p:cNvPr>
+          <p:cNvPicPr>
+            <a:picLocks noChangeAspect="1"/>
+          </p:cNvPicPr>
+          <p:nvPr/>
+        </p:nvPicPr>
+        <p:blipFill>
+          <a:blip r:embed="rId3">
+            <a:extLst>
+              <a:ext uri="{28A0092B-C50C-407E-A947-70E740481C1C}">
+                <a14:useLocalDpi xmlns:a14="http://schemas.microsoft.com/office/drawing/2010/main" val="0"/>
+              </a:ext>
+            </a:extLst>
+          </a:blip>
+          <a:srcRect/>
+          <a:stretch/>
+        </p:blipFill>
+        <p:spPr>
+          <a:xfrm>
+            <a:off x="5311280" y="1407995"/>
+            <a:ext cx="6598640" cy="4948980"/>
+          </a:xfrm>
+          <a:prstGeom prst="rect">
+            <a:avLst/>
+          </a:prstGeom>
+        </p:spPr>
+      </p:pic>
     </p:spTree>
     <p:extLst>
       <p:ext uri="{BB962C8B-B14F-4D97-AF65-F5344CB8AC3E}">
-        <p14:creationId xmlns:p14="http://schemas.microsoft.com/office/powerpoint/2010/main" val="1422923119"/>
+        <p14:creationId xmlns:p14="http://schemas.microsoft.com/office/powerpoint/2010/main" val="1427317392"/>
       </p:ext>
     </p:extLst>
   </p:cSld>
@@ -11524,6 +11721,130 @@
                 </a:solidFill>
                 <a:latin typeface="Georgia Pro Cond" panose="02040506050405020303" pitchFamily="18" charset="0"/>
               </a:rPr>
+              <a:t>MODELLING</a:t>
+            </a:r>
+          </a:p>
+        </p:txBody>
+      </p:sp>
+      <p:sp>
+        <p:nvSpPr>
+          <p:cNvPr id="3" name="Date Placeholder 2">
+            <a:extLst>
+              <a:ext uri="{FF2B5EF4-FFF2-40B4-BE49-F238E27FC236}">
+                <a16:creationId xmlns:a16="http://schemas.microsoft.com/office/drawing/2014/main" id="{6202BB9D-80AD-44A1-B3CA-66E5054E0B7C}"/>
+              </a:ext>
+            </a:extLst>
+          </p:cNvPr>
+          <p:cNvSpPr>
+            <a:spLocks noGrp="1"/>
+          </p:cNvSpPr>
+          <p:nvPr>
+            <p:ph type="dt" sz="half" idx="10"/>
+          </p:nvPr>
+        </p:nvSpPr>
+        <p:spPr/>
+        <p:txBody>
+          <a:bodyPr/>
+          <a:lstStyle/>
+          <a:p>
+            <a:r>
+              <a:rPr lang="en-US"/>
+              <a:t>12/4/2019</a:t>
+            </a:r>
+          </a:p>
+        </p:txBody>
+      </p:sp>
+      <p:sp>
+        <p:nvSpPr>
+          <p:cNvPr id="5" name="Slide Number Placeholder 4">
+            <a:extLst>
+              <a:ext uri="{FF2B5EF4-FFF2-40B4-BE49-F238E27FC236}">
+                <a16:creationId xmlns:a16="http://schemas.microsoft.com/office/drawing/2014/main" id="{4646DC2E-D261-4A96-ACC8-B6992B7CB69A}"/>
+              </a:ext>
+            </a:extLst>
+          </p:cNvPr>
+          <p:cNvSpPr>
+            <a:spLocks noGrp="1"/>
+          </p:cNvSpPr>
+          <p:nvPr>
+            <p:ph type="sldNum" sz="quarter" idx="12"/>
+          </p:nvPr>
+        </p:nvSpPr>
+        <p:spPr/>
+        <p:txBody>
+          <a:bodyPr/>
+          <a:lstStyle/>
+          <a:p>
+            <a:fld id="{87963F98-C10F-4FC1-8017-0839D2AC7CA3}" type="slidenum">
+              <a:rPr lang="en-US" smtClean="0"/>
+              <a:t>28</a:t>
+            </a:fld>
+            <a:endParaRPr lang="en-US"/>
+          </a:p>
+        </p:txBody>
+      </p:sp>
+    </p:spTree>
+    <p:extLst>
+      <p:ext uri="{BB962C8B-B14F-4D97-AF65-F5344CB8AC3E}">
+        <p14:creationId xmlns:p14="http://schemas.microsoft.com/office/powerpoint/2010/main" val="1422923119"/>
+      </p:ext>
+    </p:extLst>
+  </p:cSld>
+  <p:clrMapOvr>
+    <a:masterClrMapping/>
+  </p:clrMapOvr>
+</p:sld>
+</file>
+
+<file path=ppt/slides/slide29.xml><?xml version="1.0" encoding="utf-8"?>
+<p:sld xmlns:a="http://schemas.openxmlformats.org/drawingml/2006/main" xmlns:r="http://schemas.openxmlformats.org/officeDocument/2006/relationships" xmlns:p="http://schemas.openxmlformats.org/presentationml/2006/main">
+  <p:cSld>
+    <p:spTree>
+      <p:nvGrpSpPr>
+        <p:cNvPr id="1" name=""/>
+        <p:cNvGrpSpPr/>
+        <p:nvPr/>
+      </p:nvGrpSpPr>
+      <p:grpSpPr>
+        <a:xfrm>
+          <a:off x="0" y="0"/>
+          <a:ext cx="0" cy="0"/>
+          <a:chOff x="0" y="0"/>
+          <a:chExt cx="0" cy="0"/>
+        </a:xfrm>
+      </p:grpSpPr>
+      <p:sp>
+        <p:nvSpPr>
+          <p:cNvPr id="2" name="Title 1">
+            <a:extLst>
+              <a:ext uri="{FF2B5EF4-FFF2-40B4-BE49-F238E27FC236}">
+                <a16:creationId xmlns:a16="http://schemas.microsoft.com/office/drawing/2014/main" id="{5E1A2851-B6DE-443C-B478-A5CE31ED592D}"/>
+              </a:ext>
+            </a:extLst>
+          </p:cNvPr>
+          <p:cNvSpPr>
+            <a:spLocks noGrp="1"/>
+          </p:cNvSpPr>
+          <p:nvPr>
+            <p:ph type="title"/>
+          </p:nvPr>
+        </p:nvSpPr>
+        <p:spPr/>
+        <p:txBody>
+          <a:bodyPr>
+            <a:normAutofit/>
+          </a:bodyPr>
+          <a:lstStyle/>
+          <a:p>
+            <a:r>
+              <a:rPr lang="en-US" sz="3200" dirty="0">
+                <a:solidFill>
+                  <a:schemeClr val="accent1">
+                    <a:lumMod val="50000"/>
+                  </a:schemeClr>
+                </a:solidFill>
+                <a:latin typeface="Georgia Pro Cond" panose="02040506050405020303" pitchFamily="18" charset="0"/>
+              </a:rPr>
               <a:t>EVALUATION</a:t>
             </a:r>
           </a:p>
@@ -11616,7 +11937,7 @@
           <a:p>
             <a:fld id="{87963F98-C10F-4FC1-8017-0839D2AC7CA3}" type="slidenum">
               <a:rPr lang="en-US" smtClean="0"/>
-              <a:t>28</a:t>
+              <a:t>29</a:t>
             </a:fld>
             <a:endParaRPr lang="en-US"/>
           </a:p>

</xml_diff>